<commit_message>
refine queries and format code with autowrap (#37)
</commit_message>
<xml_diff>
--- a/patterns/transaction-write.pptx
+++ b/patterns/transaction-write.pptx
@@ -234,7 +234,7 @@
           <a:p>
             <a:fld id="{CAD4BD24-A097-4F9D-85E9-6A2A24CA2D98}" type="datetimeFigureOut">
               <a:rPr lang="zh-CN" altLang="en-US" smtClean="0"/>
-              <a:t>2022/11/14</a:t>
+              <a:t>2022/11/17</a:t>
             </a:fld>
             <a:endParaRPr lang="zh-CN" altLang="en-US"/>
           </a:p>
@@ -3292,6 +3292,180 @@
           </p:txBody>
         </p:sp>
       </p:grpSp>
+      <p:sp>
+        <p:nvSpPr>
+          <p:cNvPr id="2" name="Cross 1">
+            <a:extLst>
+              <a:ext uri="{FF2B5EF4-FFF2-40B4-BE49-F238E27FC236}">
+                <a16:creationId xmlns:a16="http://schemas.microsoft.com/office/drawing/2014/main" id="{7F0E216C-8081-EB22-0A1C-F55CAE5567FB}"/>
+              </a:ext>
+            </a:extLst>
+          </p:cNvPr>
+          <p:cNvSpPr/>
+          <p:nvPr/>
+        </p:nvSpPr>
+        <p:spPr>
+          <a:xfrm>
+            <a:off x="1743075" y="2220077"/>
+            <a:ext cx="180000" cy="180000"/>
+          </a:xfrm>
+          <a:prstGeom prst="plus">
+            <a:avLst>
+              <a:gd name="adj" fmla="val 33021"/>
+            </a:avLst>
+          </a:prstGeom>
+          <a:solidFill>
+            <a:schemeClr val="tx1"/>
+          </a:solidFill>
+          <a:ln>
+            <a:noFill/>
+          </a:ln>
+        </p:spPr>
+        <p:style>
+          <a:lnRef idx="2">
+            <a:schemeClr val="accent1">
+              <a:shade val="50000"/>
+            </a:schemeClr>
+          </a:lnRef>
+          <a:fillRef idx="1">
+            <a:schemeClr val="accent1"/>
+          </a:fillRef>
+          <a:effectRef idx="0">
+            <a:schemeClr val="accent1"/>
+          </a:effectRef>
+          <a:fontRef idx="minor">
+            <a:schemeClr val="lt1"/>
+          </a:fontRef>
+        </p:style>
+        <p:txBody>
+          <a:bodyPr rtlCol="0" anchor="ctr"/>
+          <a:lstStyle/>
+          <a:p>
+            <a:pPr algn="ctr"/>
+            <a:endParaRPr lang="en-CN">
+              <a:solidFill>
+                <a:schemeClr val="tx1"/>
+              </a:solidFill>
+            </a:endParaRPr>
+          </a:p>
+        </p:txBody>
+      </p:sp>
+      <p:sp>
+        <p:nvSpPr>
+          <p:cNvPr id="7" name="Cross 6">
+            <a:extLst>
+              <a:ext uri="{FF2B5EF4-FFF2-40B4-BE49-F238E27FC236}">
+                <a16:creationId xmlns:a16="http://schemas.microsoft.com/office/drawing/2014/main" id="{97B94FAA-0D92-09CE-C55D-9D56B6784BFD}"/>
+              </a:ext>
+            </a:extLst>
+          </p:cNvPr>
+          <p:cNvSpPr/>
+          <p:nvPr/>
+        </p:nvSpPr>
+        <p:spPr>
+          <a:xfrm>
+            <a:off x="7552671" y="2220077"/>
+            <a:ext cx="180000" cy="180000"/>
+          </a:xfrm>
+          <a:prstGeom prst="plus">
+            <a:avLst>
+              <a:gd name="adj" fmla="val 33021"/>
+            </a:avLst>
+          </a:prstGeom>
+          <a:solidFill>
+            <a:schemeClr val="tx1"/>
+          </a:solidFill>
+          <a:ln>
+            <a:noFill/>
+          </a:ln>
+        </p:spPr>
+        <p:style>
+          <a:lnRef idx="2">
+            <a:schemeClr val="accent1">
+              <a:shade val="50000"/>
+            </a:schemeClr>
+          </a:lnRef>
+          <a:fillRef idx="1">
+            <a:schemeClr val="accent1"/>
+          </a:fillRef>
+          <a:effectRef idx="0">
+            <a:schemeClr val="accent1"/>
+          </a:effectRef>
+          <a:fontRef idx="minor">
+            <a:schemeClr val="lt1"/>
+          </a:fontRef>
+        </p:style>
+        <p:txBody>
+          <a:bodyPr rtlCol="0" anchor="ctr"/>
+          <a:lstStyle/>
+          <a:p>
+            <a:pPr algn="ctr"/>
+            <a:endParaRPr lang="en-CN">
+              <a:solidFill>
+                <a:schemeClr val="tx1"/>
+              </a:solidFill>
+            </a:endParaRPr>
+          </a:p>
+        </p:txBody>
+      </p:sp>
+      <p:sp>
+        <p:nvSpPr>
+          <p:cNvPr id="9" name="Cross 8">
+            <a:extLst>
+              <a:ext uri="{FF2B5EF4-FFF2-40B4-BE49-F238E27FC236}">
+                <a16:creationId xmlns:a16="http://schemas.microsoft.com/office/drawing/2014/main" id="{B41A4442-733B-F248-83BD-78048EADD0B0}"/>
+              </a:ext>
+            </a:extLst>
+          </p:cNvPr>
+          <p:cNvSpPr/>
+          <p:nvPr/>
+        </p:nvSpPr>
+        <p:spPr>
+          <a:xfrm>
+            <a:off x="6096000" y="2231751"/>
+            <a:ext cx="180000" cy="180000"/>
+          </a:xfrm>
+          <a:prstGeom prst="plus">
+            <a:avLst>
+              <a:gd name="adj" fmla="val 33021"/>
+            </a:avLst>
+          </a:prstGeom>
+          <a:solidFill>
+            <a:schemeClr val="tx1"/>
+          </a:solidFill>
+          <a:ln>
+            <a:noFill/>
+          </a:ln>
+        </p:spPr>
+        <p:style>
+          <a:lnRef idx="2">
+            <a:schemeClr val="accent1">
+              <a:shade val="50000"/>
+            </a:schemeClr>
+          </a:lnRef>
+          <a:fillRef idx="1">
+            <a:schemeClr val="accent1"/>
+          </a:fillRef>
+          <a:effectRef idx="0">
+            <a:schemeClr val="accent1"/>
+          </a:effectRef>
+          <a:fontRef idx="minor">
+            <a:schemeClr val="lt1"/>
+          </a:fontRef>
+        </p:style>
+        <p:txBody>
+          <a:bodyPr rtlCol="0" anchor="ctr"/>
+          <a:lstStyle/>
+          <a:p>
+            <a:pPr algn="ctr"/>
+            <a:endParaRPr lang="en-CN">
+              <a:solidFill>
+                <a:schemeClr val="tx1"/>
+              </a:solidFill>
+            </a:endParaRPr>
+          </a:p>
+        </p:txBody>
+      </p:sp>
     </p:spTree>
     <p:extLst>
       <p:ext uri="{BB962C8B-B14F-4D97-AF65-F5344CB8AC3E}">
@@ -3401,9 +3575,25 @@
                     <a:sysClr val="windowText" lastClr="000000"/>
                   </a:solidFill>
                 </a:rPr>
+                <a:t>acc:</a:t>
+              </a:r>
+              <a:r>
+                <a:rPr kumimoji="1" lang="zh-CN" altLang="en-US" b="1" dirty="0">
+                  <a:solidFill>
+                    <a:sysClr val="windowText" lastClr="000000"/>
+                  </a:solidFill>
+                </a:rPr>
+                <a:t> </a:t>
+              </a:r>
+              <a:r>
+                <a:rPr kumimoji="1" lang="en-US" altLang="zh-CN" dirty="0">
+                  <a:solidFill>
+                    <a:sysClr val="windowText" lastClr="000000"/>
+                  </a:solidFill>
+                </a:rPr>
                 <a:t>Account</a:t>
               </a:r>
-              <a:endParaRPr kumimoji="1" lang="zh-CN" altLang="en-US" sz="1600" b="1" dirty="0">
+              <a:endParaRPr kumimoji="1" lang="zh-CN" altLang="en-US" sz="1600" dirty="0">
                 <a:solidFill>
                   <a:sysClr val="windowText" lastClr="000000"/>
                 </a:solidFill>
@@ -3460,14 +3650,14 @@
             <a:p>
               <a:pPr algn="ctr"/>
               <a:r>
-                <a:rPr kumimoji="1" lang="en-US" altLang="zh-CN" sz="1600" dirty="0">
+                <a:rPr kumimoji="1" lang="en-US" altLang="zh-CN" sz="1600" dirty="0" err="1">
                   <a:solidFill>
                     <a:sysClr val="windowText" lastClr="000000"/>
                   </a:solidFill>
                   <a:latin typeface="DengXian" panose="02010600030101010101" pitchFamily="2" charset="-122"/>
                   <a:ea typeface="DengXian" panose="02010600030101010101" pitchFamily="2" charset="-122"/>
                 </a:rPr>
-                <a:t>id</a:t>
+                <a:t>acc.id</a:t>
               </a:r>
               <a:r>
                 <a:rPr kumimoji="1" lang="zh-CN" altLang="en-US" sz="1600" dirty="0">
@@ -3487,7 +3677,7 @@
                   <a:latin typeface="DengXian" panose="02010600030101010101" pitchFamily="2" charset="-122"/>
                   <a:ea typeface="DengXian" panose="02010600030101010101" pitchFamily="2" charset="-122"/>
                 </a:rPr>
-                <a:t>&lt;-</a:t>
+                <a:t>=</a:t>
               </a:r>
               <a:r>
                 <a:rPr kumimoji="1" lang="zh-CN" altLang="en-US" sz="1600" dirty="0">
@@ -3500,6 +3690,16 @@
                 <a:t> </a:t>
               </a:r>
               <a:r>
+                <a:rPr kumimoji="1" lang="en-US" altLang="zh-CN" sz="1600" dirty="0">
+                  <a:solidFill>
+                    <a:sysClr val="windowText" lastClr="000000"/>
+                  </a:solidFill>
+                  <a:latin typeface="DengXian" panose="02010600030101010101" pitchFamily="2" charset="-122"/>
+                  <a:ea typeface="DengXian" panose="02010600030101010101" pitchFamily="2" charset="-122"/>
+                </a:rPr>
+                <a:t>${</a:t>
+              </a:r>
+              <a:r>
                 <a:rPr kumimoji="1" lang="en-US" altLang="zh-CN" sz="1600" dirty="0" err="1">
                   <a:solidFill>
                     <a:sysClr val="windowText" lastClr="000000"/>
@@ -3509,13 +3709,16 @@
                 </a:rPr>
                 <a:t>accountId</a:t>
               </a:r>
-              <a:endParaRPr kumimoji="1" lang="en-US" altLang="zh-CN" sz="1600" dirty="0">
-                <a:solidFill>
-                  <a:sysClr val="windowText" lastClr="000000"/>
-                </a:solidFill>
-                <a:latin typeface="DengXian" panose="02010600030101010101" pitchFamily="2" charset="-122"/>
-                <a:ea typeface="DengXian" panose="02010600030101010101" pitchFamily="2" charset="-122"/>
-              </a:endParaRPr>
+              <a:r>
+                <a:rPr kumimoji="1" lang="en-US" altLang="zh-CN" sz="1600" dirty="0">
+                  <a:solidFill>
+                    <a:sysClr val="windowText" lastClr="000000"/>
+                  </a:solidFill>
+                  <a:latin typeface="DengXian" panose="02010600030101010101" pitchFamily="2" charset="-122"/>
+                  <a:ea typeface="DengXian" panose="02010600030101010101" pitchFamily="2" charset="-122"/>
+                </a:rPr>
+                <a:t>}</a:t>
+              </a:r>
             </a:p>
             <a:p>
               <a:pPr algn="ctr"/>
@@ -3682,9 +3885,25 @@
                     <a:sysClr val="windowText" lastClr="000000"/>
                   </a:solidFill>
                 </a:rPr>
+                <a:t>med:</a:t>
+              </a:r>
+              <a:r>
+                <a:rPr kumimoji="1" lang="zh-CN" altLang="en-US" b="1" dirty="0">
+                  <a:solidFill>
+                    <a:sysClr val="windowText" lastClr="000000"/>
+                  </a:solidFill>
+                </a:rPr>
+                <a:t> </a:t>
+              </a:r>
+              <a:r>
+                <a:rPr kumimoji="1" lang="en-US" altLang="zh-CN" dirty="0">
+                  <a:solidFill>
+                    <a:sysClr val="windowText" lastClr="000000"/>
+                  </a:solidFill>
+                </a:rPr>
                 <a:t>Medium</a:t>
               </a:r>
-              <a:endParaRPr kumimoji="1" lang="zh-CN" altLang="en-US" sz="1600" b="1" dirty="0">
+              <a:endParaRPr kumimoji="1" lang="zh-CN" altLang="en-US" sz="1600" dirty="0">
                 <a:solidFill>
                   <a:sysClr val="windowText" lastClr="000000"/>
                 </a:solidFill>
@@ -3741,14 +3960,14 @@
             <a:p>
               <a:pPr algn="ctr"/>
               <a:r>
-                <a:rPr kumimoji="1" lang="en-US" altLang="zh-CN" sz="1600" dirty="0">
+                <a:rPr kumimoji="1" lang="en-US" altLang="zh-CN" sz="1600" dirty="0" err="1">
                   <a:solidFill>
                     <a:sysClr val="windowText" lastClr="000000"/>
                   </a:solidFill>
                   <a:latin typeface="DengXian" panose="02010600030101010101" pitchFamily="2" charset="-122"/>
                   <a:ea typeface="DengXian" panose="02010600030101010101" pitchFamily="2" charset="-122"/>
                 </a:rPr>
-                <a:t>id</a:t>
+                <a:t>med.id</a:t>
               </a:r>
               <a:r>
                 <a:rPr kumimoji="1" lang="zh-CN" altLang="en-US" sz="1600" dirty="0">
@@ -3768,7 +3987,7 @@
                   <a:latin typeface="DengXian" panose="02010600030101010101" pitchFamily="2" charset="-122"/>
                   <a:ea typeface="DengXian" panose="02010600030101010101" pitchFamily="2" charset="-122"/>
                 </a:rPr>
-                <a:t>&lt;-</a:t>
+                <a:t>=</a:t>
               </a:r>
               <a:r>
                 <a:rPr kumimoji="1" lang="zh-CN" altLang="en-US" sz="1600" dirty="0">
@@ -3781,6 +4000,16 @@
                 <a:t> </a:t>
               </a:r>
               <a:r>
+                <a:rPr kumimoji="1" lang="en-US" altLang="zh-CN" sz="1600" dirty="0">
+                  <a:solidFill>
+                    <a:sysClr val="windowText" lastClr="000000"/>
+                  </a:solidFill>
+                  <a:latin typeface="DengXian" panose="02010600030101010101" pitchFamily="2" charset="-122"/>
+                  <a:ea typeface="DengXian" panose="02010600030101010101" pitchFamily="2" charset="-122"/>
+                </a:rPr>
+                <a:t>${</a:t>
+              </a:r>
+              <a:r>
                 <a:rPr kumimoji="1" lang="en-US" altLang="zh-CN" sz="1600" dirty="0" err="1">
                   <a:solidFill>
                     <a:sysClr val="windowText" lastClr="000000"/>
@@ -3790,13 +4019,16 @@
                 </a:rPr>
                 <a:t>mediumId</a:t>
               </a:r>
-              <a:endParaRPr kumimoji="1" lang="en-US" altLang="zh-CN" sz="1600" dirty="0">
-                <a:solidFill>
-                  <a:sysClr val="windowText" lastClr="000000"/>
-                </a:solidFill>
-                <a:latin typeface="DengXian" panose="02010600030101010101" pitchFamily="2" charset="-122"/>
-                <a:ea typeface="DengXian" panose="02010600030101010101" pitchFamily="2" charset="-122"/>
-              </a:endParaRPr>
+              <a:r>
+                <a:rPr kumimoji="1" lang="en-US" altLang="zh-CN" sz="1600" dirty="0">
+                  <a:solidFill>
+                    <a:sysClr val="windowText" lastClr="000000"/>
+                  </a:solidFill>
+                  <a:latin typeface="DengXian" panose="02010600030101010101" pitchFamily="2" charset="-122"/>
+                  <a:ea typeface="DengXian" panose="02010600030101010101" pitchFamily="2" charset="-122"/>
+                </a:rPr>
+                <a:t>}</a:t>
+              </a:r>
             </a:p>
             <a:p>
               <a:pPr algn="ctr"/>
@@ -3983,9 +4215,25 @@
                       <a:sysClr val="windowText" lastClr="000000"/>
                     </a:solidFill>
                   </a:rPr>
+                  <a:t>p1:</a:t>
+                </a:r>
+                <a:r>
+                  <a:rPr kumimoji="1" lang="zh-CN" altLang="en-US" b="1" dirty="0">
+                    <a:solidFill>
+                      <a:sysClr val="windowText" lastClr="000000"/>
+                    </a:solidFill>
+                  </a:rPr>
+                  <a:t> </a:t>
+                </a:r>
+                <a:r>
+                  <a:rPr kumimoji="1" lang="en-US" altLang="zh-CN" dirty="0">
+                    <a:solidFill>
+                      <a:sysClr val="windowText" lastClr="000000"/>
+                    </a:solidFill>
+                  </a:rPr>
                   <a:t>Person</a:t>
                 </a:r>
-                <a:endParaRPr kumimoji="1" lang="zh-CN" altLang="en-US" sz="1600" b="1" dirty="0">
+                <a:endParaRPr kumimoji="1" lang="zh-CN" altLang="en-US" sz="1600" dirty="0">
                   <a:solidFill>
                     <a:sysClr val="windowText" lastClr="000000"/>
                   </a:solidFill>
@@ -4049,7 +4297,7 @@
                     <a:latin typeface="DengXian" panose="02010600030101010101" pitchFamily="2" charset="-122"/>
                     <a:ea typeface="DengXian" panose="02010600030101010101" pitchFamily="2" charset="-122"/>
                   </a:rPr>
-                  <a:t>id</a:t>
+                  <a:t>p1.id</a:t>
                 </a:r>
                 <a:r>
                   <a:rPr kumimoji="1" lang="zh-CN" altLang="en-US" sz="1600" dirty="0">
@@ -4069,7 +4317,7 @@
                     <a:latin typeface="DengXian" panose="02010600030101010101" pitchFamily="2" charset="-122"/>
                     <a:ea typeface="DengXian" panose="02010600030101010101" pitchFamily="2" charset="-122"/>
                   </a:rPr>
-                  <a:t>&lt;-</a:t>
+                  <a:t>=</a:t>
                 </a:r>
                 <a:r>
                   <a:rPr kumimoji="1" lang="zh-CN" altLang="en-US" sz="1600" dirty="0">
@@ -4089,7 +4337,7 @@
                     <a:latin typeface="DengXian" panose="02010600030101010101" pitchFamily="2" charset="-122"/>
                     <a:ea typeface="DengXian" panose="02010600030101010101" pitchFamily="2" charset="-122"/>
                   </a:rPr>
-                  <a:t>pid1</a:t>
+                  <a:t>${pid1}</a:t>
                 </a:r>
               </a:p>
             </p:txBody>
@@ -4335,9 +4583,25 @@
                       <a:sysClr val="windowText" lastClr="000000"/>
                     </a:solidFill>
                   </a:rPr>
+                  <a:t>p2:</a:t>
+                </a:r>
+                <a:r>
+                  <a:rPr kumimoji="1" lang="zh-CN" altLang="en-US" b="1" dirty="0">
+                    <a:solidFill>
+                      <a:sysClr val="windowText" lastClr="000000"/>
+                    </a:solidFill>
+                  </a:rPr>
+                  <a:t> </a:t>
+                </a:r>
+                <a:r>
+                  <a:rPr kumimoji="1" lang="en-US" altLang="zh-CN" dirty="0">
+                    <a:solidFill>
+                      <a:sysClr val="windowText" lastClr="000000"/>
+                    </a:solidFill>
+                  </a:rPr>
                   <a:t>Person</a:t>
                 </a:r>
-                <a:endParaRPr kumimoji="1" lang="zh-CN" altLang="en-US" sz="1600" b="1" dirty="0">
+                <a:endParaRPr kumimoji="1" lang="zh-CN" altLang="en-US" sz="1600" dirty="0">
                   <a:solidFill>
                     <a:sysClr val="windowText" lastClr="000000"/>
                   </a:solidFill>
@@ -4401,7 +4665,7 @@
                     <a:latin typeface="DengXian" panose="02010600030101010101" pitchFamily="2" charset="-122"/>
                     <a:ea typeface="DengXian" panose="02010600030101010101" pitchFamily="2" charset="-122"/>
                   </a:rPr>
-                  <a:t>id</a:t>
+                  <a:t>p2.id</a:t>
                 </a:r>
                 <a:r>
                   <a:rPr kumimoji="1" lang="zh-CN" altLang="en-US" sz="1600" dirty="0">
@@ -4421,7 +4685,7 @@
                     <a:latin typeface="DengXian" panose="02010600030101010101" pitchFamily="2" charset="-122"/>
                     <a:ea typeface="DengXian" panose="02010600030101010101" pitchFamily="2" charset="-122"/>
                   </a:rPr>
-                  <a:t>&lt;-</a:t>
+                  <a:t>=</a:t>
                 </a:r>
                 <a:r>
                   <a:rPr kumimoji="1" lang="zh-CN" altLang="en-US" sz="1600" dirty="0">
@@ -4441,13 +4705,71 @@
                     <a:latin typeface="DengXian" panose="02010600030101010101" pitchFamily="2" charset="-122"/>
                     <a:ea typeface="DengXian" panose="02010600030101010101" pitchFamily="2" charset="-122"/>
                   </a:rPr>
-                  <a:t>pid2</a:t>
+                  <a:t>${pid2}</a:t>
                 </a:r>
               </a:p>
             </p:txBody>
           </p:sp>
         </p:grpSp>
       </p:grpSp>
+      <p:sp>
+        <p:nvSpPr>
+          <p:cNvPr id="2" name="Cross 1">
+            <a:extLst>
+              <a:ext uri="{FF2B5EF4-FFF2-40B4-BE49-F238E27FC236}">
+                <a16:creationId xmlns:a16="http://schemas.microsoft.com/office/drawing/2014/main" id="{6707C5A1-D79E-8A0D-4EAD-A5DC3BD17699}"/>
+              </a:ext>
+            </a:extLst>
+          </p:cNvPr>
+          <p:cNvSpPr/>
+          <p:nvPr/>
+        </p:nvSpPr>
+        <p:spPr>
+          <a:xfrm>
+            <a:off x="6712734" y="2767255"/>
+            <a:ext cx="180000" cy="180000"/>
+          </a:xfrm>
+          <a:prstGeom prst="plus">
+            <a:avLst>
+              <a:gd name="adj" fmla="val 33021"/>
+            </a:avLst>
+          </a:prstGeom>
+          <a:solidFill>
+            <a:schemeClr val="tx1"/>
+          </a:solidFill>
+          <a:ln>
+            <a:noFill/>
+          </a:ln>
+        </p:spPr>
+        <p:style>
+          <a:lnRef idx="2">
+            <a:schemeClr val="accent1">
+              <a:shade val="50000"/>
+            </a:schemeClr>
+          </a:lnRef>
+          <a:fillRef idx="1">
+            <a:schemeClr val="accent1"/>
+          </a:fillRef>
+          <a:effectRef idx="0">
+            <a:schemeClr val="accent1"/>
+          </a:effectRef>
+          <a:fontRef idx="minor">
+            <a:schemeClr val="lt1"/>
+          </a:fontRef>
+        </p:style>
+        <p:txBody>
+          <a:bodyPr rtlCol="0" anchor="ctr"/>
+          <a:lstStyle/>
+          <a:p>
+            <a:pPr algn="ctr"/>
+            <a:endParaRPr lang="en-CN">
+              <a:solidFill>
+                <a:schemeClr val="tx1"/>
+              </a:solidFill>
+            </a:endParaRPr>
+          </a:p>
+        </p:txBody>
+      </p:sp>
     </p:spTree>
     <p:extLst>
       <p:ext uri="{BB962C8B-B14F-4D97-AF65-F5344CB8AC3E}">
@@ -4704,12 +5026,28 @@
               <a:p>
                 <a:pPr algn="ctr"/>
                 <a:r>
+                  <a:rPr lang="en-US" altLang="zh-CN" sz="1400" dirty="0" err="1">
+                    <a:solidFill>
+                      <a:schemeClr val="tx1"/>
+                    </a:solidFill>
+                  </a:rPr>
+                  <a:t>acc.id</a:t>
+                </a:r>
+                <a:r>
+                  <a:rPr lang="zh-CN" altLang="en-US" sz="1400" dirty="0">
+                    <a:solidFill>
+                      <a:schemeClr val="tx1"/>
+                    </a:solidFill>
+                  </a:rPr>
+                  <a:t> </a:t>
+                </a:r>
+                <a:r>
                   <a:rPr lang="en-US" altLang="zh-CN" sz="1400" dirty="0">
                     <a:solidFill>
                       <a:schemeClr val="tx1"/>
                     </a:solidFill>
                   </a:rPr>
-                  <a:t>id:</a:t>
+                  <a:t>=</a:t>
                 </a:r>
                 <a:r>
                   <a:rPr lang="zh-CN" altLang="en-US" sz="1400" dirty="0">
@@ -4789,9 +5127,25 @@
                       <a:schemeClr val="tx1"/>
                     </a:solidFill>
                   </a:rPr>
+                  <a:t>acc:</a:t>
+                </a:r>
+                <a:r>
+                  <a:rPr lang="zh-CN" altLang="en-US" b="1" dirty="0">
+                    <a:solidFill>
+                      <a:schemeClr val="tx1"/>
+                    </a:solidFill>
+                  </a:rPr>
+                  <a:t> </a:t>
+                </a:r>
+                <a:r>
+                  <a:rPr lang="en-US" altLang="zh-CN" dirty="0">
+                    <a:solidFill>
+                      <a:schemeClr val="tx1"/>
+                    </a:solidFill>
+                  </a:rPr>
                   <a:t>Account</a:t>
                 </a:r>
-                <a:endParaRPr lang="en-CN" b="1" dirty="0">
+                <a:endParaRPr lang="en-CN" dirty="0">
                   <a:solidFill>
                     <a:schemeClr val="tx1"/>
                   </a:solidFill>
@@ -5603,7 +5957,7 @@
           </p:nvSpPr>
           <p:spPr>
             <a:xfrm>
-              <a:off x="6217357" y="3314550"/>
+              <a:off x="6345177" y="3314550"/>
               <a:ext cx="360000" cy="360000"/>
             </a:xfrm>
             <a:prstGeom prst="mathMultiply">
@@ -6121,12 +6475,28 @@
             <a:p>
               <a:pPr algn="ctr"/>
               <a:r>
+                <a:rPr lang="en-US" altLang="zh-CN" sz="1400" dirty="0" err="1">
+                  <a:solidFill>
+                    <a:schemeClr val="tx1"/>
+                  </a:solidFill>
+                </a:rPr>
+                <a:t>loan.id</a:t>
+              </a:r>
+              <a:r>
+                <a:rPr lang="zh-CN" altLang="en-US" sz="1400" dirty="0">
+                  <a:solidFill>
+                    <a:schemeClr val="tx1"/>
+                  </a:solidFill>
+                </a:rPr>
+                <a:t> </a:t>
+              </a:r>
+              <a:r>
                 <a:rPr lang="en-US" altLang="zh-CN" sz="1400" dirty="0">
                   <a:solidFill>
                     <a:schemeClr val="tx1"/>
                   </a:solidFill>
                 </a:rPr>
-                <a:t>id:</a:t>
+                <a:t>=</a:t>
               </a:r>
               <a:r>
                 <a:rPr lang="zh-CN" altLang="en-US" sz="1400" dirty="0">
@@ -6275,9 +6645,25 @@
                     <a:schemeClr val="tx1"/>
                   </a:solidFill>
                 </a:rPr>
+                <a:t>loan:</a:t>
+              </a:r>
+              <a:r>
+                <a:rPr lang="zh-CN" altLang="en-US" b="1" dirty="0">
+                  <a:solidFill>
+                    <a:schemeClr val="tx1"/>
+                  </a:solidFill>
+                </a:rPr>
+                <a:t> </a:t>
+              </a:r>
+              <a:r>
+                <a:rPr lang="en-US" altLang="zh-CN" dirty="0">
+                  <a:solidFill>
+                    <a:schemeClr val="tx1"/>
+                  </a:solidFill>
+                </a:rPr>
                 <a:t>Loan</a:t>
               </a:r>
-              <a:endParaRPr lang="en-CN" b="1" dirty="0">
+              <a:endParaRPr lang="en-CN" dirty="0">
                 <a:solidFill>
                   <a:schemeClr val="tx1"/>
                 </a:solidFill>
@@ -6463,7 +6849,7 @@
           </p:nvSpPr>
           <p:spPr>
             <a:xfrm>
-              <a:off x="6229340" y="4034780"/>
+              <a:off x="6347328" y="4034780"/>
               <a:ext cx="360000" cy="360000"/>
             </a:xfrm>
             <a:prstGeom prst="mathMultiply">
@@ -8061,6 +8447,180 @@
           </p:txBody>
         </p:sp>
       </p:grpSp>
+      <p:sp>
+        <p:nvSpPr>
+          <p:cNvPr id="4" name="Cross 3">
+            <a:extLst>
+              <a:ext uri="{FF2B5EF4-FFF2-40B4-BE49-F238E27FC236}">
+                <a16:creationId xmlns:a16="http://schemas.microsoft.com/office/drawing/2014/main" id="{E66C406D-8882-3D11-1F95-3D0CC42825AA}"/>
+              </a:ext>
+            </a:extLst>
+          </p:cNvPr>
+          <p:cNvSpPr/>
+          <p:nvPr/>
+        </p:nvSpPr>
+        <p:spPr>
+          <a:xfrm>
+            <a:off x="6123910" y="2207059"/>
+            <a:ext cx="180000" cy="180000"/>
+          </a:xfrm>
+          <a:prstGeom prst="plus">
+            <a:avLst>
+              <a:gd name="adj" fmla="val 33021"/>
+            </a:avLst>
+          </a:prstGeom>
+          <a:solidFill>
+            <a:schemeClr val="tx1"/>
+          </a:solidFill>
+          <a:ln>
+            <a:noFill/>
+          </a:ln>
+        </p:spPr>
+        <p:style>
+          <a:lnRef idx="2">
+            <a:schemeClr val="accent1">
+              <a:shade val="50000"/>
+            </a:schemeClr>
+          </a:lnRef>
+          <a:fillRef idx="1">
+            <a:schemeClr val="accent1"/>
+          </a:fillRef>
+          <a:effectRef idx="0">
+            <a:schemeClr val="accent1"/>
+          </a:effectRef>
+          <a:fontRef idx="minor">
+            <a:schemeClr val="lt1"/>
+          </a:fontRef>
+        </p:style>
+        <p:txBody>
+          <a:bodyPr rtlCol="0" anchor="ctr"/>
+          <a:lstStyle/>
+          <a:p>
+            <a:pPr algn="ctr"/>
+            <a:endParaRPr lang="en-CN">
+              <a:solidFill>
+                <a:schemeClr val="tx1"/>
+              </a:solidFill>
+            </a:endParaRPr>
+          </a:p>
+        </p:txBody>
+      </p:sp>
+      <p:sp>
+        <p:nvSpPr>
+          <p:cNvPr id="7" name="Cross 6">
+            <a:extLst>
+              <a:ext uri="{FF2B5EF4-FFF2-40B4-BE49-F238E27FC236}">
+                <a16:creationId xmlns:a16="http://schemas.microsoft.com/office/drawing/2014/main" id="{CBEE5D98-D7CC-D52C-FBF5-AC7899B9958A}"/>
+              </a:ext>
+            </a:extLst>
+          </p:cNvPr>
+          <p:cNvSpPr/>
+          <p:nvPr/>
+        </p:nvSpPr>
+        <p:spPr>
+          <a:xfrm>
+            <a:off x="7563221" y="2234994"/>
+            <a:ext cx="180000" cy="180000"/>
+          </a:xfrm>
+          <a:prstGeom prst="plus">
+            <a:avLst>
+              <a:gd name="adj" fmla="val 33021"/>
+            </a:avLst>
+          </a:prstGeom>
+          <a:solidFill>
+            <a:schemeClr val="tx1"/>
+          </a:solidFill>
+          <a:ln>
+            <a:noFill/>
+          </a:ln>
+        </p:spPr>
+        <p:style>
+          <a:lnRef idx="2">
+            <a:schemeClr val="accent1">
+              <a:shade val="50000"/>
+            </a:schemeClr>
+          </a:lnRef>
+          <a:fillRef idx="1">
+            <a:schemeClr val="accent1"/>
+          </a:fillRef>
+          <a:effectRef idx="0">
+            <a:schemeClr val="accent1"/>
+          </a:effectRef>
+          <a:fontRef idx="minor">
+            <a:schemeClr val="lt1"/>
+          </a:fontRef>
+        </p:style>
+        <p:txBody>
+          <a:bodyPr rtlCol="0" anchor="ctr"/>
+          <a:lstStyle/>
+          <a:p>
+            <a:pPr algn="ctr"/>
+            <a:endParaRPr lang="en-CN">
+              <a:solidFill>
+                <a:schemeClr val="tx1"/>
+              </a:solidFill>
+            </a:endParaRPr>
+          </a:p>
+        </p:txBody>
+      </p:sp>
+      <p:sp>
+        <p:nvSpPr>
+          <p:cNvPr id="9" name="Cross 8">
+            <a:extLst>
+              <a:ext uri="{FF2B5EF4-FFF2-40B4-BE49-F238E27FC236}">
+                <a16:creationId xmlns:a16="http://schemas.microsoft.com/office/drawing/2014/main" id="{F0327793-F9A8-97A3-CF62-096D5FAFD72C}"/>
+              </a:ext>
+            </a:extLst>
+          </p:cNvPr>
+          <p:cNvSpPr/>
+          <p:nvPr/>
+        </p:nvSpPr>
+        <p:spPr>
+          <a:xfrm>
+            <a:off x="1747442" y="2225162"/>
+            <a:ext cx="180000" cy="180000"/>
+          </a:xfrm>
+          <a:prstGeom prst="plus">
+            <a:avLst>
+              <a:gd name="adj" fmla="val 33021"/>
+            </a:avLst>
+          </a:prstGeom>
+          <a:solidFill>
+            <a:schemeClr val="tx1"/>
+          </a:solidFill>
+          <a:ln>
+            <a:noFill/>
+          </a:ln>
+        </p:spPr>
+        <p:style>
+          <a:lnRef idx="2">
+            <a:schemeClr val="accent1">
+              <a:shade val="50000"/>
+            </a:schemeClr>
+          </a:lnRef>
+          <a:fillRef idx="1">
+            <a:schemeClr val="accent1"/>
+          </a:fillRef>
+          <a:effectRef idx="0">
+            <a:schemeClr val="accent1"/>
+          </a:effectRef>
+          <a:fontRef idx="minor">
+            <a:schemeClr val="lt1"/>
+          </a:fontRef>
+        </p:style>
+        <p:txBody>
+          <a:bodyPr rtlCol="0" anchor="ctr"/>
+          <a:lstStyle/>
+          <a:p>
+            <a:pPr algn="ctr"/>
+            <a:endParaRPr lang="en-CN">
+              <a:solidFill>
+                <a:schemeClr val="tx1"/>
+              </a:solidFill>
+            </a:endParaRPr>
+          </a:p>
+        </p:txBody>
+      </p:sp>
     </p:spTree>
     <p:extLst>
       <p:ext uri="{BB962C8B-B14F-4D97-AF65-F5344CB8AC3E}">
@@ -8185,14 +8745,38 @@
               <a:p>
                 <a:pPr algn="ctr"/>
                 <a:r>
+                  <a:rPr kumimoji="1" lang="en-US" altLang="zh-CN" b="1" dirty="0" err="1">
+                    <a:solidFill>
+                      <a:sysClr val="windowText" lastClr="000000"/>
+                    </a:solidFill>
+                  </a:rPr>
+                  <a:t>dst</a:t>
+                </a:r>
+                <a:r>
                   <a:rPr kumimoji="1" lang="en-US" altLang="zh-CN" b="1" dirty="0">
                     <a:solidFill>
                       <a:sysClr val="windowText" lastClr="000000"/>
                     </a:solidFill>
                   </a:rPr>
+                  <a:t>:</a:t>
+                </a:r>
+                <a:r>
+                  <a:rPr kumimoji="1" lang="zh-CN" altLang="en-US" b="1" dirty="0">
+                    <a:solidFill>
+                      <a:sysClr val="windowText" lastClr="000000"/>
+                    </a:solidFill>
+                  </a:rPr>
+                  <a:t> </a:t>
+                </a:r>
+                <a:r>
+                  <a:rPr kumimoji="1" lang="en-US" altLang="zh-CN" dirty="0">
+                    <a:solidFill>
+                      <a:sysClr val="windowText" lastClr="000000"/>
+                    </a:solidFill>
+                  </a:rPr>
                   <a:t>Account</a:t>
                 </a:r>
-                <a:endParaRPr kumimoji="1" lang="zh-CN" altLang="en-US" sz="1600" b="1" dirty="0">
+                <a:endParaRPr kumimoji="1" lang="zh-CN" altLang="en-US" sz="1600" dirty="0">
                   <a:solidFill>
                     <a:sysClr val="windowText" lastClr="000000"/>
                   </a:solidFill>
@@ -8249,6 +8833,26 @@
               <a:p>
                 <a:pPr algn="ctr"/>
                 <a:r>
+                  <a:rPr kumimoji="1" lang="en-US" altLang="zh-CN" sz="1600" dirty="0" err="1">
+                    <a:solidFill>
+                      <a:sysClr val="windowText" lastClr="000000"/>
+                    </a:solidFill>
+                    <a:latin typeface="DengXian" panose="02010600030101010101" pitchFamily="2" charset="-122"/>
+                    <a:ea typeface="DengXian" panose="02010600030101010101" pitchFamily="2" charset="-122"/>
+                  </a:rPr>
+                  <a:t>dst.id</a:t>
+                </a:r>
+                <a:r>
+                  <a:rPr kumimoji="1" lang="zh-CN" altLang="en-US" sz="1600" dirty="0">
+                    <a:solidFill>
+                      <a:sysClr val="windowText" lastClr="000000"/>
+                    </a:solidFill>
+                    <a:latin typeface="DengXian" panose="02010600030101010101" pitchFamily="2" charset="-122"/>
+                    <a:ea typeface="DengXian" panose="02010600030101010101" pitchFamily="2" charset="-122"/>
+                  </a:rPr>
+                  <a:t> </a:t>
+                </a:r>
+                <a:r>
                   <a:rPr kumimoji="1" lang="en-US" altLang="zh-CN" sz="1600" dirty="0">
                     <a:solidFill>
                       <a:sysClr val="windowText" lastClr="000000"/>
@@ -8256,7 +8860,7 @@
                     <a:latin typeface="DengXian" panose="02010600030101010101" pitchFamily="2" charset="-122"/>
                     <a:ea typeface="DengXian" panose="02010600030101010101" pitchFamily="2" charset="-122"/>
                   </a:rPr>
-                  <a:t>id</a:t>
+                  <a:t>=</a:t>
                 </a:r>
                 <a:r>
                   <a:rPr kumimoji="1" lang="zh-CN" altLang="en-US" sz="1600" dirty="0">
@@ -8269,26 +8873,6 @@
                   <a:t> </a:t>
                 </a:r>
                 <a:r>
-                  <a:rPr kumimoji="1" lang="en-US" altLang="zh-CN" sz="1600" dirty="0">
-                    <a:solidFill>
-                      <a:sysClr val="windowText" lastClr="000000"/>
-                    </a:solidFill>
-                    <a:latin typeface="DengXian" panose="02010600030101010101" pitchFamily="2" charset="-122"/>
-                    <a:ea typeface="DengXian" panose="02010600030101010101" pitchFamily="2" charset="-122"/>
-                  </a:rPr>
-                  <a:t>&lt;-</a:t>
-                </a:r>
-                <a:r>
-                  <a:rPr kumimoji="1" lang="zh-CN" altLang="en-US" sz="1600" dirty="0">
-                    <a:solidFill>
-                      <a:sysClr val="windowText" lastClr="000000"/>
-                    </a:solidFill>
-                    <a:latin typeface="DengXian" panose="02010600030101010101" pitchFamily="2" charset="-122"/>
-                    <a:ea typeface="DengXian" panose="02010600030101010101" pitchFamily="2" charset="-122"/>
-                  </a:rPr>
-                  <a:t> </a:t>
-                </a:r>
-                <a:r>
                   <a:rPr kumimoji="1" lang="en-US" altLang="zh-CN" sz="1600" dirty="0" err="1">
                     <a:solidFill>
                       <a:sysClr val="windowText" lastClr="000000"/>
@@ -8296,7 +8880,7 @@
                     <a:latin typeface="DengXian" panose="02010600030101010101" pitchFamily="2" charset="-122"/>
                     <a:ea typeface="DengXian" panose="02010600030101010101" pitchFamily="2" charset="-122"/>
                   </a:rPr>
-                  <a:t>accountDstId</a:t>
+                  <a:t>dstId</a:t>
                 </a:r>
                 <a:endParaRPr kumimoji="1" lang="en-US" altLang="zh-CN" sz="1600" dirty="0">
                   <a:solidFill>
@@ -8582,14 +9166,38 @@
               <a:p>
                 <a:pPr algn="ctr"/>
                 <a:r>
+                  <a:rPr kumimoji="1" lang="en-US" altLang="zh-CN" b="1" dirty="0" err="1">
+                    <a:solidFill>
+                      <a:sysClr val="windowText" lastClr="000000"/>
+                    </a:solidFill>
+                  </a:rPr>
+                  <a:t>src</a:t>
+                </a:r>
+                <a:r>
                   <a:rPr kumimoji="1" lang="en-US" altLang="zh-CN" b="1" dirty="0">
                     <a:solidFill>
                       <a:sysClr val="windowText" lastClr="000000"/>
                     </a:solidFill>
                   </a:rPr>
+                  <a:t>:</a:t>
+                </a:r>
+                <a:r>
+                  <a:rPr kumimoji="1" lang="zh-CN" altLang="en-US" b="1" dirty="0">
+                    <a:solidFill>
+                      <a:sysClr val="windowText" lastClr="000000"/>
+                    </a:solidFill>
+                  </a:rPr>
+                  <a:t> </a:t>
+                </a:r>
+                <a:r>
+                  <a:rPr kumimoji="1" lang="en-US" altLang="zh-CN" dirty="0">
+                    <a:solidFill>
+                      <a:sysClr val="windowText" lastClr="000000"/>
+                    </a:solidFill>
+                  </a:rPr>
                   <a:t>Account</a:t>
                 </a:r>
-                <a:endParaRPr kumimoji="1" lang="zh-CN" altLang="en-US" sz="1600" b="1" dirty="0">
+                <a:endParaRPr kumimoji="1" lang="zh-CN" altLang="en-US" sz="1600" dirty="0">
                   <a:solidFill>
                     <a:sysClr val="windowText" lastClr="000000"/>
                   </a:solidFill>
@@ -8646,6 +9254,26 @@
               <a:p>
                 <a:pPr algn="ctr"/>
                 <a:r>
+                  <a:rPr kumimoji="1" lang="en-US" altLang="zh-CN" sz="1600" dirty="0" err="1">
+                    <a:solidFill>
+                      <a:sysClr val="windowText" lastClr="000000"/>
+                    </a:solidFill>
+                    <a:latin typeface="DengXian" panose="02010600030101010101" pitchFamily="2" charset="-122"/>
+                    <a:ea typeface="DengXian" panose="02010600030101010101" pitchFamily="2" charset="-122"/>
+                  </a:rPr>
+                  <a:t>src.id</a:t>
+                </a:r>
+                <a:r>
+                  <a:rPr kumimoji="1" lang="zh-CN" altLang="en-US" sz="1600" dirty="0">
+                    <a:solidFill>
+                      <a:sysClr val="windowText" lastClr="000000"/>
+                    </a:solidFill>
+                    <a:latin typeface="DengXian" panose="02010600030101010101" pitchFamily="2" charset="-122"/>
+                    <a:ea typeface="DengXian" panose="02010600030101010101" pitchFamily="2" charset="-122"/>
+                  </a:rPr>
+                  <a:t> </a:t>
+                </a:r>
+                <a:r>
                   <a:rPr kumimoji="1" lang="en-US" altLang="zh-CN" sz="1600" dirty="0">
                     <a:solidFill>
                       <a:sysClr val="windowText" lastClr="000000"/>
@@ -8653,7 +9281,7 @@
                     <a:latin typeface="DengXian" panose="02010600030101010101" pitchFamily="2" charset="-122"/>
                     <a:ea typeface="DengXian" panose="02010600030101010101" pitchFamily="2" charset="-122"/>
                   </a:rPr>
-                  <a:t>id</a:t>
+                  <a:t>=</a:t>
                 </a:r>
                 <a:r>
                   <a:rPr kumimoji="1" lang="zh-CN" altLang="en-US" sz="1600" dirty="0">
@@ -8673,17 +9301,7 @@
                     <a:latin typeface="DengXian" panose="02010600030101010101" pitchFamily="2" charset="-122"/>
                     <a:ea typeface="DengXian" panose="02010600030101010101" pitchFamily="2" charset="-122"/>
                   </a:rPr>
-                  <a:t>&lt;-</a:t>
-                </a:r>
-                <a:r>
-                  <a:rPr kumimoji="1" lang="zh-CN" altLang="en-US" sz="1600" dirty="0">
-                    <a:solidFill>
-                      <a:sysClr val="windowText" lastClr="000000"/>
-                    </a:solidFill>
-                    <a:latin typeface="DengXian" panose="02010600030101010101" pitchFamily="2" charset="-122"/>
-                    <a:ea typeface="DengXian" panose="02010600030101010101" pitchFamily="2" charset="-122"/>
-                  </a:rPr>
-                  <a:t> </a:t>
+                  <a:t>${</a:t>
                 </a:r>
                 <a:r>
                   <a:rPr kumimoji="1" lang="en-US" altLang="zh-CN" sz="1600" dirty="0" err="1">
@@ -8693,20 +9311,81 @@
                     <a:latin typeface="DengXian" panose="02010600030101010101" pitchFamily="2" charset="-122"/>
                     <a:ea typeface="DengXian" panose="02010600030101010101" pitchFamily="2" charset="-122"/>
                   </a:rPr>
-                  <a:t>accountSrcId</a:t>
-                </a:r>
-                <a:endParaRPr kumimoji="1" lang="en-US" altLang="zh-CN" sz="1600" dirty="0">
-                  <a:solidFill>
-                    <a:sysClr val="windowText" lastClr="000000"/>
-                  </a:solidFill>
-                  <a:latin typeface="DengXian" panose="02010600030101010101" pitchFamily="2" charset="-122"/>
-                  <a:ea typeface="DengXian" panose="02010600030101010101" pitchFamily="2" charset="-122"/>
-                </a:endParaRPr>
+                  <a:t>srcId</a:t>
+                </a:r>
+                <a:r>
+                  <a:rPr kumimoji="1" lang="en-US" altLang="zh-CN" sz="1600" dirty="0">
+                    <a:solidFill>
+                      <a:sysClr val="windowText" lastClr="000000"/>
+                    </a:solidFill>
+                    <a:latin typeface="DengXian" panose="02010600030101010101" pitchFamily="2" charset="-122"/>
+                    <a:ea typeface="DengXian" panose="02010600030101010101" pitchFamily="2" charset="-122"/>
+                  </a:rPr>
+                  <a:t>}</a:t>
+                </a:r>
               </a:p>
             </p:txBody>
           </p:sp>
         </p:grpSp>
       </p:grpSp>
+      <p:sp>
+        <p:nvSpPr>
+          <p:cNvPr id="4" name="Cross 3">
+            <a:extLst>
+              <a:ext uri="{FF2B5EF4-FFF2-40B4-BE49-F238E27FC236}">
+                <a16:creationId xmlns:a16="http://schemas.microsoft.com/office/drawing/2014/main" id="{9E563333-8975-3F20-BEAB-E532C034378D}"/>
+              </a:ext>
+            </a:extLst>
+          </p:cNvPr>
+          <p:cNvSpPr/>
+          <p:nvPr/>
+        </p:nvSpPr>
+        <p:spPr>
+          <a:xfrm>
+            <a:off x="6634074" y="2669261"/>
+            <a:ext cx="180000" cy="180000"/>
+          </a:xfrm>
+          <a:prstGeom prst="plus">
+            <a:avLst>
+              <a:gd name="adj" fmla="val 33021"/>
+            </a:avLst>
+          </a:prstGeom>
+          <a:solidFill>
+            <a:schemeClr val="tx1"/>
+          </a:solidFill>
+          <a:ln>
+            <a:noFill/>
+          </a:ln>
+        </p:spPr>
+        <p:style>
+          <a:lnRef idx="2">
+            <a:schemeClr val="accent1">
+              <a:shade val="50000"/>
+            </a:schemeClr>
+          </a:lnRef>
+          <a:fillRef idx="1">
+            <a:schemeClr val="accent1"/>
+          </a:fillRef>
+          <a:effectRef idx="0">
+            <a:schemeClr val="accent1"/>
+          </a:effectRef>
+          <a:fontRef idx="minor">
+            <a:schemeClr val="lt1"/>
+          </a:fontRef>
+        </p:style>
+        <p:txBody>
+          <a:bodyPr rtlCol="0" anchor="ctr"/>
+          <a:lstStyle/>
+          <a:p>
+            <a:pPr algn="ctr"/>
+            <a:endParaRPr lang="en-CN">
+              <a:solidFill>
+                <a:schemeClr val="tx1"/>
+              </a:solidFill>
+            </a:endParaRPr>
+          </a:p>
+        </p:txBody>
+      </p:sp>
     </p:spTree>
     <p:extLst>
       <p:ext uri="{BB962C8B-B14F-4D97-AF65-F5344CB8AC3E}">
@@ -8831,14 +9510,38 @@
               <a:p>
                 <a:pPr algn="ctr"/>
                 <a:r>
+                  <a:rPr kumimoji="1" lang="en-US" altLang="zh-CN" b="1" dirty="0" err="1">
+                    <a:solidFill>
+                      <a:sysClr val="windowText" lastClr="000000"/>
+                    </a:solidFill>
+                  </a:rPr>
+                  <a:t>dst</a:t>
+                </a:r>
+                <a:r>
                   <a:rPr kumimoji="1" lang="en-US" altLang="zh-CN" b="1" dirty="0">
                     <a:solidFill>
                       <a:sysClr val="windowText" lastClr="000000"/>
                     </a:solidFill>
                   </a:rPr>
+                  <a:t>:</a:t>
+                </a:r>
+                <a:r>
+                  <a:rPr kumimoji="1" lang="zh-CN" altLang="en-US" b="1" dirty="0">
+                    <a:solidFill>
+                      <a:sysClr val="windowText" lastClr="000000"/>
+                    </a:solidFill>
+                  </a:rPr>
+                  <a:t> </a:t>
+                </a:r>
+                <a:r>
+                  <a:rPr kumimoji="1" lang="en-US" altLang="zh-CN" dirty="0">
+                    <a:solidFill>
+                      <a:sysClr val="windowText" lastClr="000000"/>
+                    </a:solidFill>
+                  </a:rPr>
                   <a:t>Account</a:t>
                 </a:r>
-                <a:endParaRPr kumimoji="1" lang="zh-CN" altLang="en-US" sz="1600" b="1" dirty="0">
+                <a:endParaRPr kumimoji="1" lang="zh-CN" altLang="en-US" sz="1600" dirty="0">
                   <a:solidFill>
                     <a:sysClr val="windowText" lastClr="000000"/>
                   </a:solidFill>
@@ -8895,6 +9598,26 @@
               <a:p>
                 <a:pPr algn="ctr"/>
                 <a:r>
+                  <a:rPr kumimoji="1" lang="en-US" altLang="zh-CN" sz="1600" dirty="0" err="1">
+                    <a:solidFill>
+                      <a:sysClr val="windowText" lastClr="000000"/>
+                    </a:solidFill>
+                    <a:latin typeface="DengXian" panose="02010600030101010101" pitchFamily="2" charset="-122"/>
+                    <a:ea typeface="DengXian" panose="02010600030101010101" pitchFamily="2" charset="-122"/>
+                  </a:rPr>
+                  <a:t>dst.id</a:t>
+                </a:r>
+                <a:r>
+                  <a:rPr kumimoji="1" lang="zh-CN" altLang="en-US" sz="1600" dirty="0">
+                    <a:solidFill>
+                      <a:sysClr val="windowText" lastClr="000000"/>
+                    </a:solidFill>
+                    <a:latin typeface="DengXian" panose="02010600030101010101" pitchFamily="2" charset="-122"/>
+                    <a:ea typeface="DengXian" panose="02010600030101010101" pitchFamily="2" charset="-122"/>
+                  </a:rPr>
+                  <a:t> </a:t>
+                </a:r>
+                <a:r>
                   <a:rPr kumimoji="1" lang="en-US" altLang="zh-CN" sz="1600" dirty="0">
                     <a:solidFill>
                       <a:sysClr val="windowText" lastClr="000000"/>
@@ -8902,7 +9625,7 @@
                     <a:latin typeface="DengXian" panose="02010600030101010101" pitchFamily="2" charset="-122"/>
                     <a:ea typeface="DengXian" panose="02010600030101010101" pitchFamily="2" charset="-122"/>
                   </a:rPr>
-                  <a:t>id</a:t>
+                  <a:t>=</a:t>
                 </a:r>
                 <a:r>
                   <a:rPr kumimoji="1" lang="zh-CN" altLang="en-US" sz="1600" dirty="0">
@@ -8912,7 +9635,7 @@
                     <a:latin typeface="DengXian" panose="02010600030101010101" pitchFamily="2" charset="-122"/>
                     <a:ea typeface="DengXian" panose="02010600030101010101" pitchFamily="2" charset="-122"/>
                   </a:rPr>
-                  <a:t> </a:t>
+                  <a:t>  </a:t>
                 </a:r>
                 <a:r>
                   <a:rPr kumimoji="1" lang="en-US" altLang="zh-CN" sz="1600" dirty="0">
@@ -8922,17 +9645,7 @@
                     <a:latin typeface="DengXian" panose="02010600030101010101" pitchFamily="2" charset="-122"/>
                     <a:ea typeface="DengXian" panose="02010600030101010101" pitchFamily="2" charset="-122"/>
                   </a:rPr>
-                  <a:t>&lt;-</a:t>
-                </a:r>
-                <a:r>
-                  <a:rPr kumimoji="1" lang="zh-CN" altLang="en-US" sz="1600" dirty="0">
-                    <a:solidFill>
-                      <a:sysClr val="windowText" lastClr="000000"/>
-                    </a:solidFill>
-                    <a:latin typeface="DengXian" panose="02010600030101010101" pitchFamily="2" charset="-122"/>
-                    <a:ea typeface="DengXian" panose="02010600030101010101" pitchFamily="2" charset="-122"/>
-                  </a:rPr>
-                  <a:t> </a:t>
+                  <a:t>${</a:t>
                 </a:r>
                 <a:r>
                   <a:rPr kumimoji="1" lang="en-US" altLang="zh-CN" sz="1600" dirty="0" err="1">
@@ -8942,15 +9655,18 @@
                     <a:latin typeface="DengXian" panose="02010600030101010101" pitchFamily="2" charset="-122"/>
                     <a:ea typeface="DengXian" panose="02010600030101010101" pitchFamily="2" charset="-122"/>
                   </a:rPr>
-                  <a:t>accountDstId</a:t>
-                </a:r>
-                <a:endParaRPr kumimoji="1" lang="en-US" altLang="zh-CN" sz="1600" dirty="0">
-                  <a:solidFill>
-                    <a:sysClr val="windowText" lastClr="000000"/>
-                  </a:solidFill>
-                  <a:latin typeface="DengXian" panose="02010600030101010101" pitchFamily="2" charset="-122"/>
-                  <a:ea typeface="DengXian" panose="02010600030101010101" pitchFamily="2" charset="-122"/>
-                </a:endParaRPr>
+                  <a:t>dstId</a:t>
+                </a:r>
+                <a:r>
+                  <a:rPr kumimoji="1" lang="en-US" altLang="zh-CN" sz="1600" dirty="0">
+                    <a:solidFill>
+                      <a:sysClr val="windowText" lastClr="000000"/>
+                    </a:solidFill>
+                    <a:latin typeface="DengXian" panose="02010600030101010101" pitchFamily="2" charset="-122"/>
+                    <a:ea typeface="DengXian" panose="02010600030101010101" pitchFamily="2" charset="-122"/>
+                  </a:rPr>
+                  <a:t>}</a:t>
+                </a:r>
               </a:p>
               <a:p>
                 <a:pPr algn="ctr"/>
@@ -9261,14 +9977,38 @@
               <a:p>
                 <a:pPr algn="ctr"/>
                 <a:r>
-                  <a:rPr kumimoji="1" lang="en-US" altLang="zh-CN" b="1" dirty="0">
+                  <a:rPr kumimoji="1" lang="en-US" altLang="zh-CN" b="1" dirty="0" err="1">
+                    <a:solidFill>
+                      <a:sysClr val="windowText" lastClr="000000"/>
+                    </a:solidFill>
+                  </a:rPr>
+                  <a:t>src</a:t>
+                </a:r>
+                <a:r>
+                  <a:rPr kumimoji="1" lang="en-US" altLang="zh-CN" dirty="0">
+                    <a:solidFill>
+                      <a:sysClr val="windowText" lastClr="000000"/>
+                    </a:solidFill>
+                  </a:rPr>
+                  <a:t>:</a:t>
+                </a:r>
+                <a:r>
+                  <a:rPr kumimoji="1" lang="zh-CN" altLang="en-US" dirty="0">
+                    <a:solidFill>
+                      <a:sysClr val="windowText" lastClr="000000"/>
+                    </a:solidFill>
+                  </a:rPr>
+                  <a:t> </a:t>
+                </a:r>
+                <a:r>
+                  <a:rPr kumimoji="1" lang="en-US" altLang="zh-CN" dirty="0">
                     <a:solidFill>
                       <a:sysClr val="windowText" lastClr="000000"/>
                     </a:solidFill>
                   </a:rPr>
                   <a:t>Account</a:t>
                 </a:r>
-                <a:endParaRPr kumimoji="1" lang="zh-CN" altLang="en-US" sz="1600" b="1" dirty="0">
+                <a:endParaRPr kumimoji="1" lang="zh-CN" altLang="en-US" sz="1600" dirty="0">
                   <a:solidFill>
                     <a:sysClr val="windowText" lastClr="000000"/>
                   </a:solidFill>
@@ -9325,6 +10065,26 @@
               <a:p>
                 <a:pPr algn="ctr"/>
                 <a:r>
+                  <a:rPr kumimoji="1" lang="en-US" altLang="zh-CN" sz="1600" dirty="0" err="1">
+                    <a:solidFill>
+                      <a:sysClr val="windowText" lastClr="000000"/>
+                    </a:solidFill>
+                    <a:latin typeface="DengXian" panose="02010600030101010101" pitchFamily="2" charset="-122"/>
+                    <a:ea typeface="DengXian" panose="02010600030101010101" pitchFamily="2" charset="-122"/>
+                  </a:rPr>
+                  <a:t>src.id</a:t>
+                </a:r>
+                <a:r>
+                  <a:rPr kumimoji="1" lang="zh-CN" altLang="en-US" sz="1600" dirty="0">
+                    <a:solidFill>
+                      <a:sysClr val="windowText" lastClr="000000"/>
+                    </a:solidFill>
+                    <a:latin typeface="DengXian" panose="02010600030101010101" pitchFamily="2" charset="-122"/>
+                    <a:ea typeface="DengXian" panose="02010600030101010101" pitchFamily="2" charset="-122"/>
+                  </a:rPr>
+                  <a:t> </a:t>
+                </a:r>
+                <a:r>
                   <a:rPr kumimoji="1" lang="en-US" altLang="zh-CN" sz="1600" dirty="0">
                     <a:solidFill>
                       <a:sysClr val="windowText" lastClr="000000"/>
@@ -9332,7 +10092,7 @@
                     <a:latin typeface="DengXian" panose="02010600030101010101" pitchFamily="2" charset="-122"/>
                     <a:ea typeface="DengXian" panose="02010600030101010101" pitchFamily="2" charset="-122"/>
                   </a:rPr>
-                  <a:t>id</a:t>
+                  <a:t>=</a:t>
                 </a:r>
                 <a:r>
                   <a:rPr kumimoji="1" lang="zh-CN" altLang="en-US" sz="1600" dirty="0">
@@ -9342,7 +10102,7 @@
                     <a:latin typeface="DengXian" panose="02010600030101010101" pitchFamily="2" charset="-122"/>
                     <a:ea typeface="DengXian" panose="02010600030101010101" pitchFamily="2" charset="-122"/>
                   </a:rPr>
-                  <a:t> </a:t>
+                  <a:t>  </a:t>
                 </a:r>
                 <a:r>
                   <a:rPr kumimoji="1" lang="en-US" altLang="zh-CN" sz="1600" dirty="0">
@@ -9352,17 +10112,7 @@
                     <a:latin typeface="DengXian" panose="02010600030101010101" pitchFamily="2" charset="-122"/>
                     <a:ea typeface="DengXian" panose="02010600030101010101" pitchFamily="2" charset="-122"/>
                   </a:rPr>
-                  <a:t>&lt;-</a:t>
-                </a:r>
-                <a:r>
-                  <a:rPr kumimoji="1" lang="zh-CN" altLang="en-US" sz="1600" dirty="0">
-                    <a:solidFill>
-                      <a:sysClr val="windowText" lastClr="000000"/>
-                    </a:solidFill>
-                    <a:latin typeface="DengXian" panose="02010600030101010101" pitchFamily="2" charset="-122"/>
-                    <a:ea typeface="DengXian" panose="02010600030101010101" pitchFamily="2" charset="-122"/>
-                  </a:rPr>
-                  <a:t> </a:t>
+                  <a:t>${</a:t>
                 </a:r>
                 <a:r>
                   <a:rPr kumimoji="1" lang="en-US" altLang="zh-CN" sz="1600" dirty="0" err="1">
@@ -9372,20 +10122,81 @@
                     <a:latin typeface="DengXian" panose="02010600030101010101" pitchFamily="2" charset="-122"/>
                     <a:ea typeface="DengXian" panose="02010600030101010101" pitchFamily="2" charset="-122"/>
                   </a:rPr>
-                  <a:t>accountSrcId</a:t>
-                </a:r>
-                <a:endParaRPr kumimoji="1" lang="en-US" altLang="zh-CN" sz="1600" dirty="0">
-                  <a:solidFill>
-                    <a:sysClr val="windowText" lastClr="000000"/>
-                  </a:solidFill>
-                  <a:latin typeface="DengXian" panose="02010600030101010101" pitchFamily="2" charset="-122"/>
-                  <a:ea typeface="DengXian" panose="02010600030101010101" pitchFamily="2" charset="-122"/>
-                </a:endParaRPr>
+                  <a:t>srcId</a:t>
+                </a:r>
+                <a:r>
+                  <a:rPr kumimoji="1" lang="en-US" altLang="zh-CN" sz="1600" dirty="0">
+                    <a:solidFill>
+                      <a:sysClr val="windowText" lastClr="000000"/>
+                    </a:solidFill>
+                    <a:latin typeface="DengXian" panose="02010600030101010101" pitchFamily="2" charset="-122"/>
+                    <a:ea typeface="DengXian" panose="02010600030101010101" pitchFamily="2" charset="-122"/>
+                  </a:rPr>
+                  <a:t>}</a:t>
+                </a:r>
               </a:p>
             </p:txBody>
           </p:sp>
         </p:grpSp>
       </p:grpSp>
+      <p:sp>
+        <p:nvSpPr>
+          <p:cNvPr id="4" name="Cross 3">
+            <a:extLst>
+              <a:ext uri="{FF2B5EF4-FFF2-40B4-BE49-F238E27FC236}">
+                <a16:creationId xmlns:a16="http://schemas.microsoft.com/office/drawing/2014/main" id="{AA4FD0A5-6D66-1CD9-D307-B545467CD15B}"/>
+              </a:ext>
+            </a:extLst>
+          </p:cNvPr>
+          <p:cNvSpPr/>
+          <p:nvPr/>
+        </p:nvSpPr>
+        <p:spPr>
+          <a:xfrm>
+            <a:off x="6673402" y="2688925"/>
+            <a:ext cx="180000" cy="180000"/>
+          </a:xfrm>
+          <a:prstGeom prst="plus">
+            <a:avLst>
+              <a:gd name="adj" fmla="val 33021"/>
+            </a:avLst>
+          </a:prstGeom>
+          <a:solidFill>
+            <a:schemeClr val="tx1"/>
+          </a:solidFill>
+          <a:ln>
+            <a:noFill/>
+          </a:ln>
+        </p:spPr>
+        <p:style>
+          <a:lnRef idx="2">
+            <a:schemeClr val="accent1">
+              <a:shade val="50000"/>
+            </a:schemeClr>
+          </a:lnRef>
+          <a:fillRef idx="1">
+            <a:schemeClr val="accent1"/>
+          </a:fillRef>
+          <a:effectRef idx="0">
+            <a:schemeClr val="accent1"/>
+          </a:effectRef>
+          <a:fontRef idx="minor">
+            <a:schemeClr val="lt1"/>
+          </a:fontRef>
+        </p:style>
+        <p:txBody>
+          <a:bodyPr rtlCol="0" anchor="ctr"/>
+          <a:lstStyle/>
+          <a:p>
+            <a:pPr algn="ctr"/>
+            <a:endParaRPr lang="en-CN">
+              <a:solidFill>
+                <a:schemeClr val="tx1"/>
+              </a:solidFill>
+            </a:endParaRPr>
+          </a:p>
+        </p:txBody>
+      </p:sp>
     </p:spTree>
     <p:extLst>
       <p:ext uri="{BB962C8B-B14F-4D97-AF65-F5344CB8AC3E}">
@@ -9927,9 +10738,25 @@
                       <a:sysClr val="windowText" lastClr="000000"/>
                     </a:solidFill>
                   </a:rPr>
+                  <a:t>p:</a:t>
+                </a:r>
+                <a:r>
+                  <a:rPr kumimoji="1" lang="zh-CN" altLang="en-US" b="1" dirty="0">
+                    <a:solidFill>
+                      <a:sysClr val="windowText" lastClr="000000"/>
+                    </a:solidFill>
+                  </a:rPr>
+                  <a:t> </a:t>
+                </a:r>
+                <a:r>
+                  <a:rPr kumimoji="1" lang="en-US" altLang="zh-CN" dirty="0">
+                    <a:solidFill>
+                      <a:sysClr val="windowText" lastClr="000000"/>
+                    </a:solidFill>
+                  </a:rPr>
                   <a:t>Person</a:t>
                 </a:r>
-                <a:endParaRPr kumimoji="1" lang="zh-CN" altLang="en-US" sz="1600" b="1" dirty="0">
+                <a:endParaRPr kumimoji="1" lang="zh-CN" altLang="en-US" sz="1600" dirty="0">
                   <a:solidFill>
                     <a:sysClr val="windowText" lastClr="000000"/>
                   </a:solidFill>
@@ -9986,6 +10813,26 @@
               <a:p>
                 <a:pPr algn="ctr"/>
                 <a:r>
+                  <a:rPr kumimoji="1" lang="en-US" altLang="zh-CN" sz="1600" dirty="0" err="1">
+                    <a:solidFill>
+                      <a:sysClr val="windowText" lastClr="000000"/>
+                    </a:solidFill>
+                    <a:latin typeface="DengXian" panose="02010600030101010101" pitchFamily="2" charset="-122"/>
+                    <a:ea typeface="DengXian" panose="02010600030101010101" pitchFamily="2" charset="-122"/>
+                  </a:rPr>
+                  <a:t>p.id</a:t>
+                </a:r>
+                <a:r>
+                  <a:rPr kumimoji="1" lang="zh-CN" altLang="en-US" sz="1600" dirty="0">
+                    <a:solidFill>
+                      <a:sysClr val="windowText" lastClr="000000"/>
+                    </a:solidFill>
+                    <a:latin typeface="DengXian" panose="02010600030101010101" pitchFamily="2" charset="-122"/>
+                    <a:ea typeface="DengXian" panose="02010600030101010101" pitchFamily="2" charset="-122"/>
+                  </a:rPr>
+                  <a:t> </a:t>
+                </a:r>
+                <a:r>
                   <a:rPr kumimoji="1" lang="en-US" altLang="zh-CN" sz="1600" dirty="0">
                     <a:solidFill>
                       <a:sysClr val="windowText" lastClr="000000"/>
@@ -9993,7 +10840,7 @@
                     <a:latin typeface="DengXian" panose="02010600030101010101" pitchFamily="2" charset="-122"/>
                     <a:ea typeface="DengXian" panose="02010600030101010101" pitchFamily="2" charset="-122"/>
                   </a:rPr>
-                  <a:t>id</a:t>
+                  <a:t>=</a:t>
                 </a:r>
                 <a:r>
                   <a:rPr kumimoji="1" lang="zh-CN" altLang="en-US" sz="1600" dirty="0">
@@ -10013,17 +10860,7 @@
                     <a:latin typeface="DengXian" panose="02010600030101010101" pitchFamily="2" charset="-122"/>
                     <a:ea typeface="DengXian" panose="02010600030101010101" pitchFamily="2" charset="-122"/>
                   </a:rPr>
-                  <a:t>&lt;-</a:t>
-                </a:r>
-                <a:r>
-                  <a:rPr kumimoji="1" lang="zh-CN" altLang="en-US" sz="1600" dirty="0">
-                    <a:solidFill>
-                      <a:sysClr val="windowText" lastClr="000000"/>
-                    </a:solidFill>
-                    <a:latin typeface="DengXian" panose="02010600030101010101" pitchFamily="2" charset="-122"/>
-                    <a:ea typeface="DengXian" panose="02010600030101010101" pitchFamily="2" charset="-122"/>
-                  </a:rPr>
-                  <a:t> </a:t>
+                  <a:t>${</a:t>
                 </a:r>
                 <a:r>
                   <a:rPr kumimoji="1" lang="en-US" altLang="zh-CN" sz="1600" dirty="0" err="1">
@@ -10035,18 +10872,137 @@
                   </a:rPr>
                   <a:t>personId</a:t>
                 </a:r>
-                <a:endParaRPr kumimoji="1" lang="en-US" altLang="zh-CN" sz="1600" dirty="0">
-                  <a:solidFill>
-                    <a:sysClr val="windowText" lastClr="000000"/>
-                  </a:solidFill>
-                  <a:latin typeface="DengXian" panose="02010600030101010101" pitchFamily="2" charset="-122"/>
-                  <a:ea typeface="DengXian" panose="02010600030101010101" pitchFamily="2" charset="-122"/>
-                </a:endParaRPr>
+                <a:r>
+                  <a:rPr kumimoji="1" lang="en-US" altLang="zh-CN" sz="1600" dirty="0">
+                    <a:solidFill>
+                      <a:sysClr val="windowText" lastClr="000000"/>
+                    </a:solidFill>
+                    <a:latin typeface="DengXian" panose="02010600030101010101" pitchFamily="2" charset="-122"/>
+                    <a:ea typeface="DengXian" panose="02010600030101010101" pitchFamily="2" charset="-122"/>
+                  </a:rPr>
+                  <a:t>}</a:t>
+                </a:r>
               </a:p>
             </p:txBody>
           </p:sp>
         </p:grpSp>
       </p:grpSp>
+      <p:sp>
+        <p:nvSpPr>
+          <p:cNvPr id="4" name="Cross 3">
+            <a:extLst>
+              <a:ext uri="{FF2B5EF4-FFF2-40B4-BE49-F238E27FC236}">
+                <a16:creationId xmlns:a16="http://schemas.microsoft.com/office/drawing/2014/main" id="{EFACD865-540B-3789-BD03-29C7FE8C86A6}"/>
+              </a:ext>
+            </a:extLst>
+          </p:cNvPr>
+          <p:cNvSpPr/>
+          <p:nvPr/>
+        </p:nvSpPr>
+        <p:spPr>
+          <a:xfrm>
+            <a:off x="6575079" y="2737758"/>
+            <a:ext cx="180000" cy="180000"/>
+          </a:xfrm>
+          <a:prstGeom prst="plus">
+            <a:avLst>
+              <a:gd name="adj" fmla="val 33021"/>
+            </a:avLst>
+          </a:prstGeom>
+          <a:solidFill>
+            <a:schemeClr val="tx1"/>
+          </a:solidFill>
+          <a:ln>
+            <a:noFill/>
+          </a:ln>
+        </p:spPr>
+        <p:style>
+          <a:lnRef idx="2">
+            <a:schemeClr val="accent1">
+              <a:shade val="50000"/>
+            </a:schemeClr>
+          </a:lnRef>
+          <a:fillRef idx="1">
+            <a:schemeClr val="accent1"/>
+          </a:fillRef>
+          <a:effectRef idx="0">
+            <a:schemeClr val="accent1"/>
+          </a:effectRef>
+          <a:fontRef idx="minor">
+            <a:schemeClr val="lt1"/>
+          </a:fontRef>
+        </p:style>
+        <p:txBody>
+          <a:bodyPr rtlCol="0" anchor="ctr"/>
+          <a:lstStyle/>
+          <a:p>
+            <a:pPr algn="ctr"/>
+            <a:endParaRPr lang="en-CN">
+              <a:solidFill>
+                <a:schemeClr val="tx1"/>
+              </a:solidFill>
+            </a:endParaRPr>
+          </a:p>
+        </p:txBody>
+      </p:sp>
+      <p:sp>
+        <p:nvSpPr>
+          <p:cNvPr id="7" name="Cross 6">
+            <a:extLst>
+              <a:ext uri="{FF2B5EF4-FFF2-40B4-BE49-F238E27FC236}">
+                <a16:creationId xmlns:a16="http://schemas.microsoft.com/office/drawing/2014/main" id="{CCB71F86-1551-6A2B-DF4E-83637C9E2677}"/>
+              </a:ext>
+            </a:extLst>
+          </p:cNvPr>
+          <p:cNvSpPr/>
+          <p:nvPr/>
+        </p:nvSpPr>
+        <p:spPr>
+          <a:xfrm>
+            <a:off x="2085252" y="2917758"/>
+            <a:ext cx="180000" cy="180000"/>
+          </a:xfrm>
+          <a:prstGeom prst="plus">
+            <a:avLst>
+              <a:gd name="adj" fmla="val 33021"/>
+            </a:avLst>
+          </a:prstGeom>
+          <a:solidFill>
+            <a:schemeClr val="tx1"/>
+          </a:solidFill>
+          <a:ln>
+            <a:noFill/>
+          </a:ln>
+        </p:spPr>
+        <p:style>
+          <a:lnRef idx="2">
+            <a:schemeClr val="accent1">
+              <a:shade val="50000"/>
+            </a:schemeClr>
+          </a:lnRef>
+          <a:fillRef idx="1">
+            <a:schemeClr val="accent1"/>
+          </a:fillRef>
+          <a:effectRef idx="0">
+            <a:schemeClr val="accent1"/>
+          </a:effectRef>
+          <a:fontRef idx="minor">
+            <a:schemeClr val="lt1"/>
+          </a:fontRef>
+        </p:style>
+        <p:txBody>
+          <a:bodyPr rtlCol="0" anchor="ctr"/>
+          <a:lstStyle/>
+          <a:p>
+            <a:pPr algn="ctr"/>
+            <a:endParaRPr lang="en-CN">
+              <a:solidFill>
+                <a:schemeClr val="tx1"/>
+              </a:solidFill>
+            </a:endParaRPr>
+          </a:p>
+        </p:txBody>
+      </p:sp>
     </p:spTree>
     <p:extLst>
       <p:ext uri="{BB962C8B-B14F-4D97-AF65-F5344CB8AC3E}">
@@ -10233,6 +11189,7 @@
               <a:bodyPr rtlCol="0" anchor="ctr"/>
               <a:lstStyle/>
               <a:p>
+                <a:pPr algn="ctr"/>
                 <a:r>
                   <a:rPr kumimoji="1" lang="en-US" altLang="zh-CN" sz="1600" dirty="0">
                     <a:solidFill>
@@ -10292,6 +11249,7 @@
                 </a:endParaRPr>
               </a:p>
               <a:p>
+                <a:pPr algn="ctr"/>
                 <a:r>
                   <a:rPr kumimoji="1" lang="en-US" altLang="zh-CN" sz="1600" dirty="0" err="1">
                     <a:solidFill>
@@ -10585,9 +11543,25 @@
                       <a:sysClr val="windowText" lastClr="000000"/>
                     </a:solidFill>
                   </a:rPr>
+                  <a:t>c:</a:t>
+                </a:r>
+                <a:r>
+                  <a:rPr kumimoji="1" lang="zh-CN" altLang="en-US" b="1" dirty="0">
+                    <a:solidFill>
+                      <a:sysClr val="windowText" lastClr="000000"/>
+                    </a:solidFill>
+                  </a:rPr>
+                  <a:t> </a:t>
+                </a:r>
+                <a:r>
+                  <a:rPr kumimoji="1" lang="en-US" altLang="zh-CN" dirty="0">
+                    <a:solidFill>
+                      <a:sysClr val="windowText" lastClr="000000"/>
+                    </a:solidFill>
+                  </a:rPr>
                   <a:t>Company</a:t>
                 </a:r>
-                <a:endParaRPr kumimoji="1" lang="zh-CN" altLang="en-US" sz="1600" b="1" dirty="0">
+                <a:endParaRPr kumimoji="1" lang="zh-CN" altLang="en-US" sz="1600" dirty="0">
                   <a:solidFill>
                     <a:sysClr val="windowText" lastClr="000000"/>
                   </a:solidFill>
@@ -10642,6 +11616,27 @@
               <a:bodyPr rtlCol="0" anchor="ctr"/>
               <a:lstStyle/>
               <a:p>
+                <a:pPr algn="ctr"/>
+                <a:r>
+                  <a:rPr kumimoji="1" lang="en-US" altLang="zh-CN" sz="1600" dirty="0" err="1">
+                    <a:solidFill>
+                      <a:sysClr val="windowText" lastClr="000000"/>
+                    </a:solidFill>
+                    <a:latin typeface="DengXian" panose="02010600030101010101" pitchFamily="2" charset="-122"/>
+                    <a:ea typeface="DengXian" panose="02010600030101010101" pitchFamily="2" charset="-122"/>
+                  </a:rPr>
+                  <a:t>c.id</a:t>
+                </a:r>
+                <a:r>
+                  <a:rPr kumimoji="1" lang="zh-CN" altLang="en-US" sz="1600" dirty="0">
+                    <a:solidFill>
+                      <a:sysClr val="windowText" lastClr="000000"/>
+                    </a:solidFill>
+                    <a:latin typeface="DengXian" panose="02010600030101010101" pitchFamily="2" charset="-122"/>
+                    <a:ea typeface="DengXian" panose="02010600030101010101" pitchFamily="2" charset="-122"/>
+                  </a:rPr>
+                  <a:t> </a:t>
+                </a:r>
                 <a:r>
                   <a:rPr kumimoji="1" lang="en-US" altLang="zh-CN" sz="1600" dirty="0">
                     <a:solidFill>
@@ -10650,7 +11645,7 @@
                     <a:latin typeface="DengXian" panose="02010600030101010101" pitchFamily="2" charset="-122"/>
                     <a:ea typeface="DengXian" panose="02010600030101010101" pitchFamily="2" charset="-122"/>
                   </a:rPr>
-                  <a:t>id</a:t>
+                  <a:t>=</a:t>
                 </a:r>
                 <a:r>
                   <a:rPr kumimoji="1" lang="zh-CN" altLang="en-US" sz="1600" dirty="0">
@@ -10670,17 +11665,7 @@
                     <a:latin typeface="DengXian" panose="02010600030101010101" pitchFamily="2" charset="-122"/>
                     <a:ea typeface="DengXian" panose="02010600030101010101" pitchFamily="2" charset="-122"/>
                   </a:rPr>
-                  <a:t>&lt;-</a:t>
-                </a:r>
-                <a:r>
-                  <a:rPr kumimoji="1" lang="zh-CN" altLang="en-US" sz="1600" dirty="0">
-                    <a:solidFill>
-                      <a:sysClr val="windowText" lastClr="000000"/>
-                    </a:solidFill>
-                    <a:latin typeface="DengXian" panose="02010600030101010101" pitchFamily="2" charset="-122"/>
-                    <a:ea typeface="DengXian" panose="02010600030101010101" pitchFamily="2" charset="-122"/>
-                  </a:rPr>
-                  <a:t> </a:t>
+                  <a:t>${</a:t>
                 </a:r>
                 <a:r>
                   <a:rPr kumimoji="1" lang="en-US" altLang="zh-CN" sz="1600" dirty="0" err="1">
@@ -10692,18 +11677,137 @@
                   </a:rPr>
                   <a:t>companyId</a:t>
                 </a:r>
-                <a:endParaRPr kumimoji="1" lang="en-US" altLang="zh-CN" sz="1600" dirty="0">
-                  <a:solidFill>
-                    <a:sysClr val="windowText" lastClr="000000"/>
-                  </a:solidFill>
-                  <a:latin typeface="DengXian" panose="02010600030101010101" pitchFamily="2" charset="-122"/>
-                  <a:ea typeface="DengXian" panose="02010600030101010101" pitchFamily="2" charset="-122"/>
-                </a:endParaRPr>
+                <a:r>
+                  <a:rPr kumimoji="1" lang="en-US" altLang="zh-CN" sz="1600" dirty="0">
+                    <a:solidFill>
+                      <a:sysClr val="windowText" lastClr="000000"/>
+                    </a:solidFill>
+                    <a:latin typeface="DengXian" panose="02010600030101010101" pitchFamily="2" charset="-122"/>
+                    <a:ea typeface="DengXian" panose="02010600030101010101" pitchFamily="2" charset="-122"/>
+                  </a:rPr>
+                  <a:t>}</a:t>
+                </a:r>
               </a:p>
             </p:txBody>
           </p:sp>
         </p:grpSp>
       </p:grpSp>
+      <p:sp>
+        <p:nvSpPr>
+          <p:cNvPr id="4" name="Cross 3">
+            <a:extLst>
+              <a:ext uri="{FF2B5EF4-FFF2-40B4-BE49-F238E27FC236}">
+                <a16:creationId xmlns:a16="http://schemas.microsoft.com/office/drawing/2014/main" id="{BE35B54C-3653-6856-AAC1-4C29262540BA}"/>
+              </a:ext>
+            </a:extLst>
+          </p:cNvPr>
+          <p:cNvSpPr/>
+          <p:nvPr/>
+        </p:nvSpPr>
+        <p:spPr>
+          <a:xfrm>
+            <a:off x="6575079" y="2737758"/>
+            <a:ext cx="180000" cy="180000"/>
+          </a:xfrm>
+          <a:prstGeom prst="plus">
+            <a:avLst>
+              <a:gd name="adj" fmla="val 33021"/>
+            </a:avLst>
+          </a:prstGeom>
+          <a:solidFill>
+            <a:schemeClr val="tx1"/>
+          </a:solidFill>
+          <a:ln>
+            <a:noFill/>
+          </a:ln>
+        </p:spPr>
+        <p:style>
+          <a:lnRef idx="2">
+            <a:schemeClr val="accent1">
+              <a:shade val="50000"/>
+            </a:schemeClr>
+          </a:lnRef>
+          <a:fillRef idx="1">
+            <a:schemeClr val="accent1"/>
+          </a:fillRef>
+          <a:effectRef idx="0">
+            <a:schemeClr val="accent1"/>
+          </a:effectRef>
+          <a:fontRef idx="minor">
+            <a:schemeClr val="lt1"/>
+          </a:fontRef>
+        </p:style>
+        <p:txBody>
+          <a:bodyPr rtlCol="0" anchor="ctr"/>
+          <a:lstStyle/>
+          <a:p>
+            <a:pPr algn="ctr"/>
+            <a:endParaRPr lang="en-CN">
+              <a:solidFill>
+                <a:schemeClr val="tx1"/>
+              </a:solidFill>
+            </a:endParaRPr>
+          </a:p>
+        </p:txBody>
+      </p:sp>
+      <p:sp>
+        <p:nvSpPr>
+          <p:cNvPr id="7" name="Cross 6">
+            <a:extLst>
+              <a:ext uri="{FF2B5EF4-FFF2-40B4-BE49-F238E27FC236}">
+                <a16:creationId xmlns:a16="http://schemas.microsoft.com/office/drawing/2014/main" id="{4D81C3B3-5ED2-0845-EDB7-4FD5F3C8A947}"/>
+              </a:ext>
+            </a:extLst>
+          </p:cNvPr>
+          <p:cNvSpPr/>
+          <p:nvPr/>
+        </p:nvSpPr>
+        <p:spPr>
+          <a:xfrm>
+            <a:off x="2085252" y="2917758"/>
+            <a:ext cx="180000" cy="180000"/>
+          </a:xfrm>
+          <a:prstGeom prst="plus">
+            <a:avLst>
+              <a:gd name="adj" fmla="val 33021"/>
+            </a:avLst>
+          </a:prstGeom>
+          <a:solidFill>
+            <a:schemeClr val="tx1"/>
+          </a:solidFill>
+          <a:ln>
+            <a:noFill/>
+          </a:ln>
+        </p:spPr>
+        <p:style>
+          <a:lnRef idx="2">
+            <a:schemeClr val="accent1">
+              <a:shade val="50000"/>
+            </a:schemeClr>
+          </a:lnRef>
+          <a:fillRef idx="1">
+            <a:schemeClr val="accent1"/>
+          </a:fillRef>
+          <a:effectRef idx="0">
+            <a:schemeClr val="accent1"/>
+          </a:effectRef>
+          <a:fontRef idx="minor">
+            <a:schemeClr val="lt1"/>
+          </a:fontRef>
+        </p:style>
+        <p:txBody>
+          <a:bodyPr rtlCol="0" anchor="ctr"/>
+          <a:lstStyle/>
+          <a:p>
+            <a:pPr algn="ctr"/>
+            <a:endParaRPr lang="en-CN">
+              <a:solidFill>
+                <a:schemeClr val="tx1"/>
+              </a:solidFill>
+            </a:endParaRPr>
+          </a:p>
+        </p:txBody>
+      </p:sp>
     </p:spTree>
     <p:extLst>
       <p:ext uri="{BB962C8B-B14F-4D97-AF65-F5344CB8AC3E}">
@@ -10833,9 +11937,25 @@
                       <a:sysClr val="windowText" lastClr="000000"/>
                     </a:solidFill>
                   </a:rPr>
+                  <a:t>acc:</a:t>
+                </a:r>
+                <a:r>
+                  <a:rPr kumimoji="1" lang="zh-CN" altLang="en-US" b="1" dirty="0">
+                    <a:solidFill>
+                      <a:sysClr val="windowText" lastClr="000000"/>
+                    </a:solidFill>
+                  </a:rPr>
+                  <a:t> </a:t>
+                </a:r>
+                <a:r>
+                  <a:rPr kumimoji="1" lang="en-US" altLang="zh-CN" dirty="0">
+                    <a:solidFill>
+                      <a:sysClr val="windowText" lastClr="000000"/>
+                    </a:solidFill>
+                  </a:rPr>
                   <a:t>Account</a:t>
                 </a:r>
-                <a:endParaRPr kumimoji="1" lang="zh-CN" altLang="en-US" sz="1600" b="1" dirty="0">
+                <a:endParaRPr kumimoji="1" lang="zh-CN" altLang="en-US" sz="1600" dirty="0">
                   <a:solidFill>
                     <a:sysClr val="windowText" lastClr="000000"/>
                   </a:solidFill>
@@ -10892,6 +12012,26 @@
               <a:p>
                 <a:pPr algn="ctr"/>
                 <a:r>
+                  <a:rPr kumimoji="1" lang="en-US" altLang="zh-CN" sz="1600" dirty="0" err="1">
+                    <a:solidFill>
+                      <a:sysClr val="windowText" lastClr="000000"/>
+                    </a:solidFill>
+                    <a:latin typeface="DengXian" panose="02010600030101010101" pitchFamily="2" charset="-122"/>
+                    <a:ea typeface="DengXian" panose="02010600030101010101" pitchFamily="2" charset="-122"/>
+                  </a:rPr>
+                  <a:t>acc.id</a:t>
+                </a:r>
+                <a:r>
+                  <a:rPr kumimoji="1" lang="zh-CN" altLang="en-US" sz="1600" dirty="0">
+                    <a:solidFill>
+                      <a:sysClr val="windowText" lastClr="000000"/>
+                    </a:solidFill>
+                    <a:latin typeface="DengXian" panose="02010600030101010101" pitchFamily="2" charset="-122"/>
+                    <a:ea typeface="DengXian" panose="02010600030101010101" pitchFamily="2" charset="-122"/>
+                  </a:rPr>
+                  <a:t> </a:t>
+                </a:r>
+                <a:r>
                   <a:rPr kumimoji="1" lang="en-US" altLang="zh-CN" sz="1600" dirty="0">
                     <a:solidFill>
                       <a:sysClr val="windowText" lastClr="000000"/>
@@ -10899,7 +12039,7 @@
                     <a:latin typeface="DengXian" panose="02010600030101010101" pitchFamily="2" charset="-122"/>
                     <a:ea typeface="DengXian" panose="02010600030101010101" pitchFamily="2" charset="-122"/>
                   </a:rPr>
-                  <a:t>id</a:t>
+                  <a:t>=</a:t>
                 </a:r>
                 <a:r>
                   <a:rPr kumimoji="1" lang="zh-CN" altLang="en-US" sz="1600" dirty="0">
@@ -10919,17 +12059,7 @@
                     <a:latin typeface="DengXian" panose="02010600030101010101" pitchFamily="2" charset="-122"/>
                     <a:ea typeface="DengXian" panose="02010600030101010101" pitchFamily="2" charset="-122"/>
                   </a:rPr>
-                  <a:t>&lt;-</a:t>
-                </a:r>
-                <a:r>
-                  <a:rPr kumimoji="1" lang="zh-CN" altLang="en-US" sz="1600" dirty="0">
-                    <a:solidFill>
-                      <a:sysClr val="windowText" lastClr="000000"/>
-                    </a:solidFill>
-                    <a:latin typeface="DengXian" panose="02010600030101010101" pitchFamily="2" charset="-122"/>
-                    <a:ea typeface="DengXian" panose="02010600030101010101" pitchFamily="2" charset="-122"/>
-                  </a:rPr>
-                  <a:t> </a:t>
+                  <a:t>${</a:t>
                 </a:r>
                 <a:r>
                   <a:rPr kumimoji="1" lang="en-US" altLang="zh-CN" sz="1600" dirty="0" err="1">
@@ -10941,13 +12071,16 @@
                   </a:rPr>
                   <a:t>accountId</a:t>
                 </a:r>
-                <a:endParaRPr kumimoji="1" lang="en-US" altLang="zh-CN" sz="1600" dirty="0">
-                  <a:solidFill>
-                    <a:sysClr val="windowText" lastClr="000000"/>
-                  </a:solidFill>
-                  <a:latin typeface="DengXian" panose="02010600030101010101" pitchFamily="2" charset="-122"/>
-                  <a:ea typeface="DengXian" panose="02010600030101010101" pitchFamily="2" charset="-122"/>
-                </a:endParaRPr>
+                <a:r>
+                  <a:rPr kumimoji="1" lang="en-US" altLang="zh-CN" sz="1600" dirty="0">
+                    <a:solidFill>
+                      <a:sysClr val="windowText" lastClr="000000"/>
+                    </a:solidFill>
+                    <a:latin typeface="DengXian" panose="02010600030101010101" pitchFamily="2" charset="-122"/>
+                    <a:ea typeface="DengXian" panose="02010600030101010101" pitchFamily="2" charset="-122"/>
+                  </a:rPr>
+                  <a:t>}</a:t>
+                </a:r>
               </a:p>
             </p:txBody>
           </p:sp>
@@ -11392,6 +12525,122 @@
           </p:txBody>
         </p:sp>
       </p:grpSp>
+      <p:sp>
+        <p:nvSpPr>
+          <p:cNvPr id="2" name="Cross 1">
+            <a:extLst>
+              <a:ext uri="{FF2B5EF4-FFF2-40B4-BE49-F238E27FC236}">
+                <a16:creationId xmlns:a16="http://schemas.microsoft.com/office/drawing/2014/main" id="{2C92516A-FF90-A754-0835-287CDB73D16A}"/>
+              </a:ext>
+            </a:extLst>
+          </p:cNvPr>
+          <p:cNvSpPr/>
+          <p:nvPr/>
+        </p:nvSpPr>
+        <p:spPr>
+          <a:xfrm>
+            <a:off x="6535751" y="2236313"/>
+            <a:ext cx="180000" cy="180000"/>
+          </a:xfrm>
+          <a:prstGeom prst="plus">
+            <a:avLst>
+              <a:gd name="adj" fmla="val 33021"/>
+            </a:avLst>
+          </a:prstGeom>
+          <a:solidFill>
+            <a:schemeClr val="tx1"/>
+          </a:solidFill>
+          <a:ln>
+            <a:noFill/>
+          </a:ln>
+        </p:spPr>
+        <p:style>
+          <a:lnRef idx="2">
+            <a:schemeClr val="accent1">
+              <a:shade val="50000"/>
+            </a:schemeClr>
+          </a:lnRef>
+          <a:fillRef idx="1">
+            <a:schemeClr val="accent1"/>
+          </a:fillRef>
+          <a:effectRef idx="0">
+            <a:schemeClr val="accent1"/>
+          </a:effectRef>
+          <a:fontRef idx="minor">
+            <a:schemeClr val="lt1"/>
+          </a:fontRef>
+        </p:style>
+        <p:txBody>
+          <a:bodyPr rtlCol="0" anchor="ctr"/>
+          <a:lstStyle/>
+          <a:p>
+            <a:pPr algn="ctr"/>
+            <a:endParaRPr lang="en-CN">
+              <a:solidFill>
+                <a:schemeClr val="tx1"/>
+              </a:solidFill>
+            </a:endParaRPr>
+          </a:p>
+        </p:txBody>
+      </p:sp>
+      <p:sp>
+        <p:nvSpPr>
+          <p:cNvPr id="7" name="Cross 6">
+            <a:extLst>
+              <a:ext uri="{FF2B5EF4-FFF2-40B4-BE49-F238E27FC236}">
+                <a16:creationId xmlns:a16="http://schemas.microsoft.com/office/drawing/2014/main" id="{E28E2677-B5CC-E9CE-BDD2-8E9D216DCFC5}"/>
+              </a:ext>
+            </a:extLst>
+          </p:cNvPr>
+          <p:cNvSpPr/>
+          <p:nvPr/>
+        </p:nvSpPr>
+        <p:spPr>
+          <a:xfrm>
+            <a:off x="7561820" y="2426145"/>
+            <a:ext cx="180000" cy="180000"/>
+          </a:xfrm>
+          <a:prstGeom prst="plus">
+            <a:avLst>
+              <a:gd name="adj" fmla="val 33021"/>
+            </a:avLst>
+          </a:prstGeom>
+          <a:solidFill>
+            <a:schemeClr val="tx1"/>
+          </a:solidFill>
+          <a:ln>
+            <a:noFill/>
+          </a:ln>
+        </p:spPr>
+        <p:style>
+          <a:lnRef idx="2">
+            <a:schemeClr val="accent1">
+              <a:shade val="50000"/>
+            </a:schemeClr>
+          </a:lnRef>
+          <a:fillRef idx="1">
+            <a:schemeClr val="accent1"/>
+          </a:fillRef>
+          <a:effectRef idx="0">
+            <a:schemeClr val="accent1"/>
+          </a:effectRef>
+          <a:fontRef idx="minor">
+            <a:schemeClr val="lt1"/>
+          </a:fontRef>
+        </p:style>
+        <p:txBody>
+          <a:bodyPr rtlCol="0" anchor="ctr"/>
+          <a:lstStyle/>
+          <a:p>
+            <a:pPr algn="ctr"/>
+            <a:endParaRPr lang="en-CN">
+              <a:solidFill>
+                <a:schemeClr val="tx1"/>
+              </a:solidFill>
+            </a:endParaRPr>
+          </a:p>
+        </p:txBody>
+      </p:sp>
     </p:spTree>
     <p:extLst>
       <p:ext uri="{BB962C8B-B14F-4D97-AF65-F5344CB8AC3E}">
@@ -11521,9 +12770,25 @@
                       <a:sysClr val="windowText" lastClr="000000"/>
                     </a:solidFill>
                   </a:rPr>
+                  <a:t>acc:</a:t>
+                </a:r>
+                <a:r>
+                  <a:rPr kumimoji="1" lang="zh-CN" altLang="en-US" b="1" dirty="0">
+                    <a:solidFill>
+                      <a:sysClr val="windowText" lastClr="000000"/>
+                    </a:solidFill>
+                  </a:rPr>
+                  <a:t> </a:t>
+                </a:r>
+                <a:r>
+                  <a:rPr kumimoji="1" lang="en-US" altLang="zh-CN" dirty="0">
+                    <a:solidFill>
+                      <a:sysClr val="windowText" lastClr="000000"/>
+                    </a:solidFill>
+                  </a:rPr>
                   <a:t>Account</a:t>
                 </a:r>
-                <a:endParaRPr kumimoji="1" lang="zh-CN" altLang="en-US" sz="1600" b="1" dirty="0">
+                <a:endParaRPr kumimoji="1" lang="zh-CN" altLang="en-US" sz="1600" dirty="0">
                   <a:solidFill>
                     <a:sysClr val="windowText" lastClr="000000"/>
                   </a:solidFill>
@@ -11580,6 +12845,26 @@
               <a:p>
                 <a:pPr algn="ctr"/>
                 <a:r>
+                  <a:rPr kumimoji="1" lang="en-US" altLang="zh-CN" sz="1600" dirty="0" err="1">
+                    <a:solidFill>
+                      <a:sysClr val="windowText" lastClr="000000"/>
+                    </a:solidFill>
+                    <a:latin typeface="DengXian" panose="02010600030101010101" pitchFamily="2" charset="-122"/>
+                    <a:ea typeface="DengXian" panose="02010600030101010101" pitchFamily="2" charset="-122"/>
+                  </a:rPr>
+                  <a:t>acc.id</a:t>
+                </a:r>
+                <a:r>
+                  <a:rPr kumimoji="1" lang="zh-CN" altLang="en-US" sz="1600" dirty="0">
+                    <a:solidFill>
+                      <a:sysClr val="windowText" lastClr="000000"/>
+                    </a:solidFill>
+                    <a:latin typeface="DengXian" panose="02010600030101010101" pitchFamily="2" charset="-122"/>
+                    <a:ea typeface="DengXian" panose="02010600030101010101" pitchFamily="2" charset="-122"/>
+                  </a:rPr>
+                  <a:t> </a:t>
+                </a:r>
+                <a:r>
                   <a:rPr kumimoji="1" lang="en-US" altLang="zh-CN" sz="1600" dirty="0">
                     <a:solidFill>
                       <a:sysClr val="windowText" lastClr="000000"/>
@@ -11587,7 +12872,7 @@
                     <a:latin typeface="DengXian" panose="02010600030101010101" pitchFamily="2" charset="-122"/>
                     <a:ea typeface="DengXian" panose="02010600030101010101" pitchFamily="2" charset="-122"/>
                   </a:rPr>
-                  <a:t>id</a:t>
+                  <a:t>=</a:t>
                 </a:r>
                 <a:r>
                   <a:rPr kumimoji="1" lang="zh-CN" altLang="en-US" sz="1600" dirty="0">
@@ -11607,17 +12892,7 @@
                     <a:latin typeface="DengXian" panose="02010600030101010101" pitchFamily="2" charset="-122"/>
                     <a:ea typeface="DengXian" panose="02010600030101010101" pitchFamily="2" charset="-122"/>
                   </a:rPr>
-                  <a:t>&lt;-</a:t>
-                </a:r>
-                <a:r>
-                  <a:rPr kumimoji="1" lang="zh-CN" altLang="en-US" sz="1600" dirty="0">
-                    <a:solidFill>
-                      <a:sysClr val="windowText" lastClr="000000"/>
-                    </a:solidFill>
-                    <a:latin typeface="DengXian" panose="02010600030101010101" pitchFamily="2" charset="-122"/>
-                    <a:ea typeface="DengXian" panose="02010600030101010101" pitchFamily="2" charset="-122"/>
-                  </a:rPr>
-                  <a:t> </a:t>
+                  <a:t>${</a:t>
                 </a:r>
                 <a:r>
                   <a:rPr kumimoji="1" lang="en-US" altLang="zh-CN" sz="1600" dirty="0" err="1">
@@ -11629,13 +12904,16 @@
                   </a:rPr>
                   <a:t>accountId</a:t>
                 </a:r>
-                <a:endParaRPr kumimoji="1" lang="en-US" altLang="zh-CN" sz="1600" dirty="0">
-                  <a:solidFill>
-                    <a:sysClr val="windowText" lastClr="000000"/>
-                  </a:solidFill>
-                  <a:latin typeface="DengXian" panose="02010600030101010101" pitchFamily="2" charset="-122"/>
-                  <a:ea typeface="DengXian" panose="02010600030101010101" pitchFamily="2" charset="-122"/>
-                </a:endParaRPr>
+                <a:r>
+                  <a:rPr kumimoji="1" lang="en-US" altLang="zh-CN" sz="1600" dirty="0">
+                    <a:solidFill>
+                      <a:sysClr val="windowText" lastClr="000000"/>
+                    </a:solidFill>
+                    <a:latin typeface="DengXian" panose="02010600030101010101" pitchFamily="2" charset="-122"/>
+                    <a:ea typeface="DengXian" panose="02010600030101010101" pitchFamily="2" charset="-122"/>
+                  </a:rPr>
+                  <a:t>}</a:t>
+                </a:r>
               </a:p>
             </p:txBody>
           </p:sp>
@@ -12038,6 +13316,122 @@
           </p:sp>
         </p:grpSp>
       </p:grpSp>
+      <p:sp>
+        <p:nvSpPr>
+          <p:cNvPr id="4" name="Cross 3">
+            <a:extLst>
+              <a:ext uri="{FF2B5EF4-FFF2-40B4-BE49-F238E27FC236}">
+                <a16:creationId xmlns:a16="http://schemas.microsoft.com/office/drawing/2014/main" id="{94A17D3B-E94A-0ED9-925A-2B1A9477FA5A}"/>
+              </a:ext>
+            </a:extLst>
+          </p:cNvPr>
+          <p:cNvSpPr/>
+          <p:nvPr/>
+        </p:nvSpPr>
+        <p:spPr>
+          <a:xfrm>
+            <a:off x="6486590" y="2767255"/>
+            <a:ext cx="180000" cy="180000"/>
+          </a:xfrm>
+          <a:prstGeom prst="plus">
+            <a:avLst>
+              <a:gd name="adj" fmla="val 33021"/>
+            </a:avLst>
+          </a:prstGeom>
+          <a:solidFill>
+            <a:schemeClr val="tx1"/>
+          </a:solidFill>
+          <a:ln>
+            <a:noFill/>
+          </a:ln>
+        </p:spPr>
+        <p:style>
+          <a:lnRef idx="2">
+            <a:schemeClr val="accent1">
+              <a:shade val="50000"/>
+            </a:schemeClr>
+          </a:lnRef>
+          <a:fillRef idx="1">
+            <a:schemeClr val="accent1"/>
+          </a:fillRef>
+          <a:effectRef idx="0">
+            <a:schemeClr val="accent1"/>
+          </a:effectRef>
+          <a:fontRef idx="minor">
+            <a:schemeClr val="lt1"/>
+          </a:fontRef>
+        </p:style>
+        <p:txBody>
+          <a:bodyPr rtlCol="0" anchor="ctr"/>
+          <a:lstStyle/>
+          <a:p>
+            <a:pPr algn="ctr"/>
+            <a:endParaRPr lang="en-CN">
+              <a:solidFill>
+                <a:schemeClr val="tx1"/>
+              </a:solidFill>
+            </a:endParaRPr>
+          </a:p>
+        </p:txBody>
+      </p:sp>
+      <p:sp>
+        <p:nvSpPr>
+          <p:cNvPr id="7" name="Cross 6">
+            <a:extLst>
+              <a:ext uri="{FF2B5EF4-FFF2-40B4-BE49-F238E27FC236}">
+                <a16:creationId xmlns:a16="http://schemas.microsoft.com/office/drawing/2014/main" id="{5A219355-574B-9392-FB7C-ADE9FDBCE4AC}"/>
+              </a:ext>
+            </a:extLst>
+          </p:cNvPr>
+          <p:cNvSpPr/>
+          <p:nvPr/>
+        </p:nvSpPr>
+        <p:spPr>
+          <a:xfrm>
+            <a:off x="7453667" y="2957087"/>
+            <a:ext cx="180000" cy="180000"/>
+          </a:xfrm>
+          <a:prstGeom prst="plus">
+            <a:avLst>
+              <a:gd name="adj" fmla="val 33021"/>
+            </a:avLst>
+          </a:prstGeom>
+          <a:solidFill>
+            <a:schemeClr val="tx1"/>
+          </a:solidFill>
+          <a:ln>
+            <a:noFill/>
+          </a:ln>
+        </p:spPr>
+        <p:style>
+          <a:lnRef idx="2">
+            <a:schemeClr val="accent1">
+              <a:shade val="50000"/>
+            </a:schemeClr>
+          </a:lnRef>
+          <a:fillRef idx="1">
+            <a:schemeClr val="accent1"/>
+          </a:fillRef>
+          <a:effectRef idx="0">
+            <a:schemeClr val="accent1"/>
+          </a:effectRef>
+          <a:fontRef idx="minor">
+            <a:schemeClr val="lt1"/>
+          </a:fontRef>
+        </p:style>
+        <p:txBody>
+          <a:bodyPr rtlCol="0" anchor="ctr"/>
+          <a:lstStyle/>
+          <a:p>
+            <a:pPr algn="ctr"/>
+            <a:endParaRPr lang="en-CN">
+              <a:solidFill>
+                <a:schemeClr val="tx1"/>
+              </a:solidFill>
+            </a:endParaRPr>
+          </a:p>
+        </p:txBody>
+      </p:sp>
     </p:spTree>
     <p:extLst>
       <p:ext uri="{BB962C8B-B14F-4D97-AF65-F5344CB8AC3E}">
@@ -12167,9 +13561,25 @@
                       <a:sysClr val="windowText" lastClr="000000"/>
                     </a:solidFill>
                   </a:rPr>
+                  <a:t>acc:</a:t>
+                </a:r>
+                <a:r>
+                  <a:rPr kumimoji="1" lang="zh-CN" altLang="en-US" b="1" dirty="0">
+                    <a:solidFill>
+                      <a:sysClr val="windowText" lastClr="000000"/>
+                    </a:solidFill>
+                  </a:rPr>
+                  <a:t> </a:t>
+                </a:r>
+                <a:r>
+                  <a:rPr kumimoji="1" lang="en-US" altLang="zh-CN" dirty="0">
+                    <a:solidFill>
+                      <a:sysClr val="windowText" lastClr="000000"/>
+                    </a:solidFill>
+                  </a:rPr>
                   <a:t>Account</a:t>
                 </a:r>
-                <a:endParaRPr kumimoji="1" lang="zh-CN" altLang="en-US" sz="1600" b="1" dirty="0">
+                <a:endParaRPr kumimoji="1" lang="zh-CN" altLang="en-US" sz="1600" dirty="0">
                   <a:solidFill>
                     <a:sysClr val="windowText" lastClr="000000"/>
                   </a:solidFill>
@@ -12226,6 +13636,26 @@
               <a:p>
                 <a:pPr algn="ctr"/>
                 <a:r>
+                  <a:rPr kumimoji="1" lang="en-US" altLang="zh-CN" sz="1600" dirty="0" err="1">
+                    <a:solidFill>
+                      <a:sysClr val="windowText" lastClr="000000"/>
+                    </a:solidFill>
+                    <a:latin typeface="DengXian" panose="02010600030101010101" pitchFamily="2" charset="-122"/>
+                    <a:ea typeface="DengXian" panose="02010600030101010101" pitchFamily="2" charset="-122"/>
+                  </a:rPr>
+                  <a:t>acc.id</a:t>
+                </a:r>
+                <a:r>
+                  <a:rPr kumimoji="1" lang="zh-CN" altLang="en-US" sz="1600" dirty="0">
+                    <a:solidFill>
+                      <a:sysClr val="windowText" lastClr="000000"/>
+                    </a:solidFill>
+                    <a:latin typeface="DengXian" panose="02010600030101010101" pitchFamily="2" charset="-122"/>
+                    <a:ea typeface="DengXian" panose="02010600030101010101" pitchFamily="2" charset="-122"/>
+                  </a:rPr>
+                  <a:t> </a:t>
+                </a:r>
+                <a:r>
                   <a:rPr kumimoji="1" lang="en-US" altLang="zh-CN" sz="1600" dirty="0">
                     <a:solidFill>
                       <a:sysClr val="windowText" lastClr="000000"/>
@@ -12233,7 +13663,7 @@
                     <a:latin typeface="DengXian" panose="02010600030101010101" pitchFamily="2" charset="-122"/>
                     <a:ea typeface="DengXian" panose="02010600030101010101" pitchFamily="2" charset="-122"/>
                   </a:rPr>
-                  <a:t>id</a:t>
+                  <a:t>=</a:t>
                 </a:r>
                 <a:r>
                   <a:rPr kumimoji="1" lang="zh-CN" altLang="en-US" sz="1600" dirty="0">
@@ -12253,17 +13683,7 @@
                     <a:latin typeface="DengXian" panose="02010600030101010101" pitchFamily="2" charset="-122"/>
                     <a:ea typeface="DengXian" panose="02010600030101010101" pitchFamily="2" charset="-122"/>
                   </a:rPr>
-                  <a:t>&lt;-</a:t>
-                </a:r>
-                <a:r>
-                  <a:rPr kumimoji="1" lang="zh-CN" altLang="en-US" sz="1600" dirty="0">
-                    <a:solidFill>
-                      <a:sysClr val="windowText" lastClr="000000"/>
-                    </a:solidFill>
-                    <a:latin typeface="DengXian" panose="02010600030101010101" pitchFamily="2" charset="-122"/>
-                    <a:ea typeface="DengXian" panose="02010600030101010101" pitchFamily="2" charset="-122"/>
-                  </a:rPr>
-                  <a:t> </a:t>
+                  <a:t>${</a:t>
                 </a:r>
                 <a:r>
                   <a:rPr kumimoji="1" lang="en-US" altLang="zh-CN" sz="1600" dirty="0" err="1">
@@ -12275,13 +13695,16 @@
                   </a:rPr>
                   <a:t>accountId</a:t>
                 </a:r>
-                <a:endParaRPr kumimoji="1" lang="en-US" altLang="zh-CN" sz="1600" dirty="0">
-                  <a:solidFill>
-                    <a:sysClr val="windowText" lastClr="000000"/>
-                  </a:solidFill>
-                  <a:latin typeface="DengXian" panose="02010600030101010101" pitchFamily="2" charset="-122"/>
-                  <a:ea typeface="DengXian" panose="02010600030101010101" pitchFamily="2" charset="-122"/>
-                </a:endParaRPr>
+                <a:r>
+                  <a:rPr kumimoji="1" lang="en-US" altLang="zh-CN" sz="1600" dirty="0">
+                    <a:solidFill>
+                      <a:sysClr val="windowText" lastClr="000000"/>
+                    </a:solidFill>
+                    <a:latin typeface="DengXian" panose="02010600030101010101" pitchFamily="2" charset="-122"/>
+                    <a:ea typeface="DengXian" panose="02010600030101010101" pitchFamily="2" charset="-122"/>
+                  </a:rPr>
+                  <a:t>}</a:t>
+                </a:r>
               </a:p>
             </p:txBody>
           </p:sp>
@@ -12684,6 +14107,122 @@
           </p:sp>
         </p:grpSp>
       </p:grpSp>
+      <p:sp>
+        <p:nvSpPr>
+          <p:cNvPr id="4" name="Cross 3">
+            <a:extLst>
+              <a:ext uri="{FF2B5EF4-FFF2-40B4-BE49-F238E27FC236}">
+                <a16:creationId xmlns:a16="http://schemas.microsoft.com/office/drawing/2014/main" id="{4189C50B-BC2C-45DB-08DB-CCF56FE4A1A2}"/>
+              </a:ext>
+            </a:extLst>
+          </p:cNvPr>
+          <p:cNvSpPr/>
+          <p:nvPr/>
+        </p:nvSpPr>
+        <p:spPr>
+          <a:xfrm>
+            <a:off x="6584913" y="2767255"/>
+            <a:ext cx="180000" cy="180000"/>
+          </a:xfrm>
+          <a:prstGeom prst="plus">
+            <a:avLst>
+              <a:gd name="adj" fmla="val 33021"/>
+            </a:avLst>
+          </a:prstGeom>
+          <a:solidFill>
+            <a:schemeClr val="tx1"/>
+          </a:solidFill>
+          <a:ln>
+            <a:noFill/>
+          </a:ln>
+        </p:spPr>
+        <p:style>
+          <a:lnRef idx="2">
+            <a:schemeClr val="accent1">
+              <a:shade val="50000"/>
+            </a:schemeClr>
+          </a:lnRef>
+          <a:fillRef idx="1">
+            <a:schemeClr val="accent1"/>
+          </a:fillRef>
+          <a:effectRef idx="0">
+            <a:schemeClr val="accent1"/>
+          </a:effectRef>
+          <a:fontRef idx="minor">
+            <a:schemeClr val="lt1"/>
+          </a:fontRef>
+        </p:style>
+        <p:txBody>
+          <a:bodyPr rtlCol="0" anchor="ctr"/>
+          <a:lstStyle/>
+          <a:p>
+            <a:pPr algn="ctr"/>
+            <a:endParaRPr lang="en-CN">
+              <a:solidFill>
+                <a:schemeClr val="tx1"/>
+              </a:solidFill>
+            </a:endParaRPr>
+          </a:p>
+        </p:txBody>
+      </p:sp>
+      <p:sp>
+        <p:nvSpPr>
+          <p:cNvPr id="7" name="Cross 6">
+            <a:extLst>
+              <a:ext uri="{FF2B5EF4-FFF2-40B4-BE49-F238E27FC236}">
+                <a16:creationId xmlns:a16="http://schemas.microsoft.com/office/drawing/2014/main" id="{0141C050-1173-7F60-7772-917311FF5ED1}"/>
+              </a:ext>
+            </a:extLst>
+          </p:cNvPr>
+          <p:cNvSpPr/>
+          <p:nvPr/>
+        </p:nvSpPr>
+        <p:spPr>
+          <a:xfrm>
+            <a:off x="7591318" y="2917759"/>
+            <a:ext cx="180000" cy="180000"/>
+          </a:xfrm>
+          <a:prstGeom prst="plus">
+            <a:avLst>
+              <a:gd name="adj" fmla="val 33021"/>
+            </a:avLst>
+          </a:prstGeom>
+          <a:solidFill>
+            <a:schemeClr val="tx1"/>
+          </a:solidFill>
+          <a:ln>
+            <a:noFill/>
+          </a:ln>
+        </p:spPr>
+        <p:style>
+          <a:lnRef idx="2">
+            <a:schemeClr val="accent1">
+              <a:shade val="50000"/>
+            </a:schemeClr>
+          </a:lnRef>
+          <a:fillRef idx="1">
+            <a:schemeClr val="accent1"/>
+          </a:fillRef>
+          <a:effectRef idx="0">
+            <a:schemeClr val="accent1"/>
+          </a:effectRef>
+          <a:fontRef idx="minor">
+            <a:schemeClr val="lt1"/>
+          </a:fontRef>
+        </p:style>
+        <p:txBody>
+          <a:bodyPr rtlCol="0" anchor="ctr"/>
+          <a:lstStyle/>
+          <a:p>
+            <a:pPr algn="ctr"/>
+            <a:endParaRPr lang="en-CN">
+              <a:solidFill>
+                <a:schemeClr val="tx1"/>
+              </a:solidFill>
+            </a:endParaRPr>
+          </a:p>
+        </p:txBody>
+      </p:sp>
     </p:spTree>
     <p:extLst>
       <p:ext uri="{BB962C8B-B14F-4D97-AF65-F5344CB8AC3E}">

</xml_diff>

<commit_message>
fix #49: some typo errors
</commit_message>
<xml_diff>
--- a/patterns/transaction-write.pptx
+++ b/patterns/transaction-write.pptx
@@ -234,7 +234,7 @@
           <a:p>
             <a:fld id="{CAD4BD24-A097-4F9D-85E9-6A2A24CA2D98}" type="datetimeFigureOut">
               <a:rPr lang="zh-CN" altLang="en-US" smtClean="0"/>
-              <a:t>2022/11/17</a:t>
+              <a:t>2023/1/11</a:t>
             </a:fld>
             <a:endParaRPr lang="zh-CN" altLang="en-US"/>
           </a:p>
@@ -4802,10 +4802,10 @@
       </p:grpSpPr>
       <p:grpSp>
         <p:nvGrpSpPr>
-          <p:cNvPr id="4" name="Group 3">
+          <p:cNvPr id="5" name="Group 4">
             <a:extLst>
               <a:ext uri="{FF2B5EF4-FFF2-40B4-BE49-F238E27FC236}">
-                <a16:creationId xmlns:a16="http://schemas.microsoft.com/office/drawing/2014/main" id="{79CD0E29-4F4F-E69E-8318-6AFCE74E5F33}"/>
+                <a16:creationId xmlns:a16="http://schemas.microsoft.com/office/drawing/2014/main" id="{D6D28D6A-C066-1361-42F3-8B733C379113}"/>
               </a:ext>
             </a:extLst>
           </p:cNvPr>
@@ -6408,10 +6408,10 @@
       </p:grpSpPr>
       <p:grpSp>
         <p:nvGrpSpPr>
-          <p:cNvPr id="2" name="Group 1">
+          <p:cNvPr id="14" name="Group 13">
             <a:extLst>
               <a:ext uri="{FF2B5EF4-FFF2-40B4-BE49-F238E27FC236}">
-                <a16:creationId xmlns:a16="http://schemas.microsoft.com/office/drawing/2014/main" id="{AD3AFF57-A126-FB8B-AD58-A77239D7914E}"/>
+                <a16:creationId xmlns:a16="http://schemas.microsoft.com/office/drawing/2014/main" id="{B15A6ADD-CF71-9028-A905-5B4295AC171D}"/>
               </a:ext>
             </a:extLst>
           </p:cNvPr>
@@ -6420,18 +6420,610 @@
         </p:nvGrpSpPr>
         <p:grpSpPr>
           <a:xfrm>
-            <a:off x="4920193" y="2403484"/>
-            <a:ext cx="1945267" cy="2051032"/>
-            <a:chOff x="4920193" y="2403484"/>
-            <a:chExt cx="1945267" cy="2051032"/>
+            <a:off x="3681387" y="2271404"/>
+            <a:ext cx="4667433" cy="2366244"/>
+            <a:chOff x="3681387" y="2271404"/>
+            <a:chExt cx="4667433" cy="2366244"/>
           </a:xfrm>
         </p:grpSpPr>
+        <p:grpSp>
+          <p:nvGrpSpPr>
+            <p:cNvPr id="2" name="Group 1">
+              <a:extLst>
+                <a:ext uri="{FF2B5EF4-FFF2-40B4-BE49-F238E27FC236}">
+                  <a16:creationId xmlns:a16="http://schemas.microsoft.com/office/drawing/2014/main" id="{AD3AFF57-A126-FB8B-AD58-A77239D7914E}"/>
+                </a:ext>
+              </a:extLst>
+            </p:cNvPr>
+            <p:cNvGrpSpPr/>
+            <p:nvPr/>
+          </p:nvGrpSpPr>
+          <p:grpSpPr>
+            <a:xfrm>
+              <a:off x="6403553" y="2271404"/>
+              <a:ext cx="1945267" cy="2051032"/>
+              <a:chOff x="4920193" y="2403484"/>
+              <a:chExt cx="1945267" cy="2051032"/>
+            </a:xfrm>
+          </p:grpSpPr>
+          <p:sp>
+            <p:nvSpPr>
+              <p:cNvPr id="15" name="Rectangle 14">
+                <a:extLst>
+                  <a:ext uri="{FF2B5EF4-FFF2-40B4-BE49-F238E27FC236}">
+                    <a16:creationId xmlns:a16="http://schemas.microsoft.com/office/drawing/2014/main" id="{A7BE3F17-C67E-5A46-996C-67EF743EC561}"/>
+                  </a:ext>
+                </a:extLst>
+              </p:cNvPr>
+              <p:cNvSpPr/>
+              <p:nvPr/>
+            </p:nvSpPr>
+            <p:spPr>
+              <a:xfrm>
+                <a:off x="5030112" y="3975044"/>
+                <a:ext cx="1618476" cy="479472"/>
+              </a:xfrm>
+              <a:prstGeom prst="rect">
+                <a:avLst/>
+              </a:prstGeom>
+              <a:noFill/>
+              <a:ln w="25400">
+                <a:solidFill>
+                  <a:schemeClr val="tx1"/>
+                </a:solidFill>
+              </a:ln>
+            </p:spPr>
+            <p:style>
+              <a:lnRef idx="2">
+                <a:schemeClr val="accent1">
+                  <a:shade val="50000"/>
+                </a:schemeClr>
+              </a:lnRef>
+              <a:fillRef idx="1">
+                <a:schemeClr val="accent1"/>
+              </a:fillRef>
+              <a:effectRef idx="0">
+                <a:schemeClr val="accent1"/>
+              </a:effectRef>
+              <a:fontRef idx="minor">
+                <a:schemeClr val="lt1"/>
+              </a:fontRef>
+            </p:style>
+            <p:txBody>
+              <a:bodyPr rtlCol="0" anchor="ctr"/>
+              <a:lstStyle/>
+              <a:p>
+                <a:pPr algn="ctr"/>
+                <a:r>
+                  <a:rPr lang="en-US" altLang="zh-CN" sz="1400" dirty="0" err="1">
+                    <a:solidFill>
+                      <a:schemeClr val="tx1"/>
+                    </a:solidFill>
+                  </a:rPr>
+                  <a:t>loan.id</a:t>
+                </a:r>
+                <a:r>
+                  <a:rPr lang="zh-CN" altLang="en-US" sz="1400" dirty="0">
+                    <a:solidFill>
+                      <a:schemeClr val="tx1"/>
+                    </a:solidFill>
+                  </a:rPr>
+                  <a:t> </a:t>
+                </a:r>
+                <a:r>
+                  <a:rPr lang="en-US" altLang="zh-CN" sz="1400" dirty="0">
+                    <a:solidFill>
+                      <a:schemeClr val="tx1"/>
+                    </a:solidFill>
+                  </a:rPr>
+                  <a:t>=</a:t>
+                </a:r>
+                <a:r>
+                  <a:rPr lang="zh-CN" altLang="en-US" sz="1400" dirty="0">
+                    <a:solidFill>
+                      <a:schemeClr val="tx1"/>
+                    </a:solidFill>
+                  </a:rPr>
+                  <a:t> </a:t>
+                </a:r>
+                <a:r>
+                  <a:rPr lang="en-US" altLang="zh-CN" sz="1400" dirty="0">
+                    <a:solidFill>
+                      <a:schemeClr val="tx1"/>
+                    </a:solidFill>
+                  </a:rPr>
+                  <a:t>${id}</a:t>
+                </a:r>
+              </a:p>
+            </p:txBody>
+          </p:sp>
+          <p:sp>
+            <p:nvSpPr>
+              <p:cNvPr id="16" name="Rectangle 15">
+                <a:extLst>
+                  <a:ext uri="{FF2B5EF4-FFF2-40B4-BE49-F238E27FC236}">
+                    <a16:creationId xmlns:a16="http://schemas.microsoft.com/office/drawing/2014/main" id="{E7BA5DA0-5EF3-9D45-88BA-BC5BA7F3F9AB}"/>
+                  </a:ext>
+                </a:extLst>
+              </p:cNvPr>
+              <p:cNvSpPr/>
+              <p:nvPr/>
+            </p:nvSpPr>
+            <p:spPr>
+              <a:xfrm>
+                <a:off x="5039406" y="2403484"/>
+                <a:ext cx="1618476" cy="387178"/>
+              </a:xfrm>
+              <a:prstGeom prst="rect">
+                <a:avLst/>
+              </a:prstGeom>
+              <a:solidFill>
+                <a:schemeClr val="accent1">
+                  <a:lumMod val="60000"/>
+                  <a:lumOff val="40000"/>
+                </a:schemeClr>
+              </a:solidFill>
+              <a:ln w="25400">
+                <a:solidFill>
+                  <a:schemeClr val="tx1"/>
+                </a:solidFill>
+              </a:ln>
+            </p:spPr>
+            <p:style>
+              <a:lnRef idx="2">
+                <a:schemeClr val="accent1">
+                  <a:shade val="50000"/>
+                </a:schemeClr>
+              </a:lnRef>
+              <a:fillRef idx="1">
+                <a:schemeClr val="accent1"/>
+              </a:fillRef>
+              <a:effectRef idx="0">
+                <a:schemeClr val="accent1"/>
+              </a:effectRef>
+              <a:fontRef idx="minor">
+                <a:schemeClr val="lt1"/>
+              </a:fontRef>
+            </p:style>
+            <p:txBody>
+              <a:bodyPr rtlCol="0" anchor="ctr"/>
+              <a:lstStyle/>
+              <a:p>
+                <a:pPr algn="ctr"/>
+                <a:r>
+                  <a:rPr lang="en-US" altLang="zh-CN" b="1" dirty="0">
+                    <a:solidFill>
+                      <a:schemeClr val="tx1"/>
+                    </a:solidFill>
+                  </a:rPr>
+                  <a:t>Account</a:t>
+                </a:r>
+                <a:endParaRPr lang="en-CN" b="1" dirty="0">
+                  <a:solidFill>
+                    <a:schemeClr val="tx1"/>
+                  </a:solidFill>
+                </a:endParaRPr>
+              </a:p>
+            </p:txBody>
+          </p:sp>
+          <p:sp>
+            <p:nvSpPr>
+              <p:cNvPr id="41" name="Rectangle 40">
+                <a:extLst>
+                  <a:ext uri="{FF2B5EF4-FFF2-40B4-BE49-F238E27FC236}">
+                    <a16:creationId xmlns:a16="http://schemas.microsoft.com/office/drawing/2014/main" id="{C805CEC5-21B7-E247-ABBB-187667AB24B0}"/>
+                  </a:ext>
+                </a:extLst>
+              </p:cNvPr>
+              <p:cNvSpPr/>
+              <p:nvPr/>
+            </p:nvSpPr>
+            <p:spPr>
+              <a:xfrm>
+                <a:off x="5030112" y="3592014"/>
+                <a:ext cx="1618476" cy="387178"/>
+              </a:xfrm>
+              <a:prstGeom prst="rect">
+                <a:avLst/>
+              </a:prstGeom>
+              <a:solidFill>
+                <a:schemeClr val="accent2">
+                  <a:lumMod val="60000"/>
+                  <a:lumOff val="40000"/>
+                </a:schemeClr>
+              </a:solidFill>
+              <a:ln w="25400">
+                <a:solidFill>
+                  <a:schemeClr val="tx1"/>
+                </a:solidFill>
+              </a:ln>
+            </p:spPr>
+            <p:style>
+              <a:lnRef idx="2">
+                <a:schemeClr val="accent1">
+                  <a:shade val="50000"/>
+                </a:schemeClr>
+              </a:lnRef>
+              <a:fillRef idx="1">
+                <a:schemeClr val="accent1"/>
+              </a:fillRef>
+              <a:effectRef idx="0">
+                <a:schemeClr val="accent1"/>
+              </a:effectRef>
+              <a:fontRef idx="minor">
+                <a:schemeClr val="lt1"/>
+              </a:fontRef>
+            </p:style>
+            <p:txBody>
+              <a:bodyPr rtlCol="0" anchor="ctr"/>
+              <a:lstStyle/>
+              <a:p>
+                <a:pPr algn="ctr"/>
+                <a:r>
+                  <a:rPr lang="en-US" altLang="zh-CN" b="1" dirty="0">
+                    <a:solidFill>
+                      <a:schemeClr val="tx1"/>
+                    </a:solidFill>
+                  </a:rPr>
+                  <a:t>loan:</a:t>
+                </a:r>
+                <a:r>
+                  <a:rPr lang="zh-CN" altLang="en-US" b="1" dirty="0">
+                    <a:solidFill>
+                      <a:schemeClr val="tx1"/>
+                    </a:solidFill>
+                  </a:rPr>
+                  <a:t> </a:t>
+                </a:r>
+                <a:r>
+                  <a:rPr lang="en-US" altLang="zh-CN" dirty="0">
+                    <a:solidFill>
+                      <a:schemeClr val="tx1"/>
+                    </a:solidFill>
+                  </a:rPr>
+                  <a:t>Loan</a:t>
+                </a:r>
+                <a:endParaRPr lang="en-CN" dirty="0">
+                  <a:solidFill>
+                    <a:schemeClr val="tx1"/>
+                  </a:solidFill>
+                </a:endParaRPr>
+              </a:p>
+            </p:txBody>
+          </p:sp>
+          <p:cxnSp>
+            <p:nvCxnSpPr>
+              <p:cNvPr id="48" name="Straight Arrow Connector 47">
+                <a:extLst>
+                  <a:ext uri="{FF2B5EF4-FFF2-40B4-BE49-F238E27FC236}">
+                    <a16:creationId xmlns:a16="http://schemas.microsoft.com/office/drawing/2014/main" id="{DEF26B6A-F6DC-614D-B833-5D80CBB5E0FA}"/>
+                  </a:ext>
+                </a:extLst>
+              </p:cNvPr>
+              <p:cNvCxnSpPr>
+                <a:cxnSpLocks/>
+              </p:cNvCxnSpPr>
+              <p:nvPr/>
+            </p:nvCxnSpPr>
+            <p:spPr>
+              <a:xfrm flipV="1">
+                <a:off x="6050741" y="2792795"/>
+                <a:ext cx="0" cy="799219"/>
+              </a:xfrm>
+              <a:prstGeom prst="straightConnector1">
+                <a:avLst/>
+              </a:prstGeom>
+              <a:ln w="19050">
+                <a:solidFill>
+                  <a:schemeClr val="tx1"/>
+                </a:solidFill>
+                <a:prstDash val="solid"/>
+                <a:tailEnd type="triangle"/>
+              </a:ln>
+              <a:effectLst/>
+            </p:spPr>
+            <p:style>
+              <a:lnRef idx="1">
+                <a:schemeClr val="accent1"/>
+              </a:lnRef>
+              <a:fillRef idx="0">
+                <a:schemeClr val="accent1"/>
+              </a:fillRef>
+              <a:effectRef idx="0">
+                <a:schemeClr val="accent1"/>
+              </a:effectRef>
+              <a:fontRef idx="minor">
+                <a:schemeClr val="tx1"/>
+              </a:fontRef>
+            </p:style>
+          </p:cxnSp>
+          <p:sp>
+            <p:nvSpPr>
+              <p:cNvPr id="51" name="TextBox 50">
+                <a:extLst>
+                  <a:ext uri="{FF2B5EF4-FFF2-40B4-BE49-F238E27FC236}">
+                    <a16:creationId xmlns:a16="http://schemas.microsoft.com/office/drawing/2014/main" id="{A9EEFE6B-5C72-DB4E-8259-8211ECB467CF}"/>
+                  </a:ext>
+                </a:extLst>
+              </p:cNvPr>
+              <p:cNvSpPr txBox="1"/>
+              <p:nvPr/>
+            </p:nvSpPr>
+            <p:spPr>
+              <a:xfrm>
+                <a:off x="6108522" y="3038516"/>
+                <a:ext cx="756938" cy="307777"/>
+              </a:xfrm>
+              <a:prstGeom prst="rect">
+                <a:avLst/>
+              </a:prstGeom>
+              <a:noFill/>
+            </p:spPr>
+            <p:txBody>
+              <a:bodyPr wrap="none" rtlCol="0">
+                <a:spAutoFit/>
+              </a:bodyPr>
+              <a:lstStyle/>
+              <a:p>
+                <a:r>
+                  <a:rPr lang="en-US" altLang="zh-CN" sz="1400" dirty="0"/>
+                  <a:t>deposit</a:t>
+                </a:r>
+                <a:endParaRPr lang="en-CN" sz="1600" dirty="0"/>
+              </a:p>
+            </p:txBody>
+          </p:sp>
+          <p:cxnSp>
+            <p:nvCxnSpPr>
+              <p:cNvPr id="58" name="Straight Arrow Connector 57">
+                <a:extLst>
+                  <a:ext uri="{FF2B5EF4-FFF2-40B4-BE49-F238E27FC236}">
+                    <a16:creationId xmlns:a16="http://schemas.microsoft.com/office/drawing/2014/main" id="{B98DEA75-B1DE-EB46-BCC7-AAE8B7FAA619}"/>
+                  </a:ext>
+                </a:extLst>
+              </p:cNvPr>
+              <p:cNvCxnSpPr>
+                <a:cxnSpLocks/>
+              </p:cNvCxnSpPr>
+              <p:nvPr/>
+            </p:nvCxnSpPr>
+            <p:spPr>
+              <a:xfrm>
+                <a:off x="5604221" y="2792795"/>
+                <a:ext cx="0" cy="799219"/>
+              </a:xfrm>
+              <a:prstGeom prst="straightConnector1">
+                <a:avLst/>
+              </a:prstGeom>
+              <a:ln w="19050">
+                <a:solidFill>
+                  <a:schemeClr val="tx1"/>
+                </a:solidFill>
+                <a:prstDash val="solid"/>
+                <a:tailEnd type="triangle"/>
+              </a:ln>
+              <a:effectLst/>
+            </p:spPr>
+            <p:style>
+              <a:lnRef idx="1">
+                <a:schemeClr val="accent1"/>
+              </a:lnRef>
+              <a:fillRef idx="0">
+                <a:schemeClr val="accent1"/>
+              </a:fillRef>
+              <a:effectRef idx="0">
+                <a:schemeClr val="accent1"/>
+              </a:effectRef>
+              <a:fontRef idx="minor">
+                <a:schemeClr val="tx1"/>
+              </a:fontRef>
+            </p:style>
+          </p:cxnSp>
+          <p:sp>
+            <p:nvSpPr>
+              <p:cNvPr id="63" name="TextBox 62">
+                <a:extLst>
+                  <a:ext uri="{FF2B5EF4-FFF2-40B4-BE49-F238E27FC236}">
+                    <a16:creationId xmlns:a16="http://schemas.microsoft.com/office/drawing/2014/main" id="{7762F5F5-5C98-B849-9DF3-987212DFF39F}"/>
+                  </a:ext>
+                </a:extLst>
+              </p:cNvPr>
+              <p:cNvSpPr txBox="1"/>
+              <p:nvPr/>
+            </p:nvSpPr>
+            <p:spPr>
+              <a:xfrm>
+                <a:off x="4920193" y="3038516"/>
+                <a:ext cx="614271" cy="307777"/>
+              </a:xfrm>
+              <a:prstGeom prst="rect">
+                <a:avLst/>
+              </a:prstGeom>
+              <a:noFill/>
+            </p:spPr>
+            <p:txBody>
+              <a:bodyPr wrap="none" rtlCol="0">
+                <a:spAutoFit/>
+              </a:bodyPr>
+              <a:lstStyle/>
+              <a:p>
+                <a:r>
+                  <a:rPr lang="en-US" altLang="zh-CN" sz="1400" dirty="0"/>
+                  <a:t>repay</a:t>
+                </a:r>
+                <a:endParaRPr lang="en-CN" sz="1600" dirty="0"/>
+              </a:p>
+            </p:txBody>
+          </p:sp>
+          <p:sp>
+            <p:nvSpPr>
+              <p:cNvPr id="65" name="Multiply 64">
+                <a:extLst>
+                  <a:ext uri="{FF2B5EF4-FFF2-40B4-BE49-F238E27FC236}">
+                    <a16:creationId xmlns:a16="http://schemas.microsoft.com/office/drawing/2014/main" id="{E97182F8-1AA8-5973-5AE1-5CCFDACA5F6D}"/>
+                  </a:ext>
+                </a:extLst>
+              </p:cNvPr>
+              <p:cNvSpPr/>
+              <p:nvPr/>
+            </p:nvSpPr>
+            <p:spPr>
+              <a:xfrm>
+                <a:off x="6347328" y="4034780"/>
+                <a:ext cx="360000" cy="360000"/>
+              </a:xfrm>
+              <a:prstGeom prst="mathMultiply">
+                <a:avLst>
+                  <a:gd name="adj1" fmla="val 12937"/>
+                </a:avLst>
+              </a:prstGeom>
+              <a:solidFill>
+                <a:srgbClr val="FF0000"/>
+              </a:solidFill>
+              <a:ln>
+                <a:noFill/>
+              </a:ln>
+            </p:spPr>
+            <p:style>
+              <a:lnRef idx="2">
+                <a:schemeClr val="accent1">
+                  <a:shade val="50000"/>
+                </a:schemeClr>
+              </a:lnRef>
+              <a:fillRef idx="1">
+                <a:schemeClr val="accent1"/>
+              </a:fillRef>
+              <a:effectRef idx="0">
+                <a:schemeClr val="accent1"/>
+              </a:effectRef>
+              <a:fontRef idx="minor">
+                <a:schemeClr val="lt1"/>
+              </a:fontRef>
+            </p:style>
+            <p:txBody>
+              <a:bodyPr rtlCol="0" anchor="ctr"/>
+              <a:lstStyle/>
+              <a:p>
+                <a:pPr algn="ctr"/>
+                <a:endParaRPr lang="en-CN"/>
+              </a:p>
+            </p:txBody>
+          </p:sp>
+          <p:sp>
+            <p:nvSpPr>
+              <p:cNvPr id="66" name="Multiply 65">
+                <a:extLst>
+                  <a:ext uri="{FF2B5EF4-FFF2-40B4-BE49-F238E27FC236}">
+                    <a16:creationId xmlns:a16="http://schemas.microsoft.com/office/drawing/2014/main" id="{D35B4872-4838-E224-7870-5F162EB7DE54}"/>
+                  </a:ext>
+                </a:extLst>
+              </p:cNvPr>
+              <p:cNvSpPr/>
+              <p:nvPr/>
+            </p:nvSpPr>
+            <p:spPr>
+              <a:xfrm>
+                <a:off x="5449864" y="2996426"/>
+                <a:ext cx="360000" cy="360000"/>
+              </a:xfrm>
+              <a:prstGeom prst="mathMultiply">
+                <a:avLst>
+                  <a:gd name="adj1" fmla="val 12937"/>
+                </a:avLst>
+              </a:prstGeom>
+              <a:solidFill>
+                <a:srgbClr val="FF0000"/>
+              </a:solidFill>
+              <a:ln>
+                <a:noFill/>
+              </a:ln>
+            </p:spPr>
+            <p:style>
+              <a:lnRef idx="2">
+                <a:schemeClr val="accent1">
+                  <a:shade val="50000"/>
+                </a:schemeClr>
+              </a:lnRef>
+              <a:fillRef idx="1">
+                <a:schemeClr val="accent1"/>
+              </a:fillRef>
+              <a:effectRef idx="0">
+                <a:schemeClr val="accent1"/>
+              </a:effectRef>
+              <a:fontRef idx="minor">
+                <a:schemeClr val="lt1"/>
+              </a:fontRef>
+            </p:style>
+            <p:txBody>
+              <a:bodyPr rtlCol="0" anchor="ctr"/>
+              <a:lstStyle/>
+              <a:p>
+                <a:pPr algn="ctr"/>
+                <a:endParaRPr lang="en-CN"/>
+              </a:p>
+            </p:txBody>
+          </p:sp>
+          <p:sp>
+            <p:nvSpPr>
+              <p:cNvPr id="67" name="Multiply 66">
+                <a:extLst>
+                  <a:ext uri="{FF2B5EF4-FFF2-40B4-BE49-F238E27FC236}">
+                    <a16:creationId xmlns:a16="http://schemas.microsoft.com/office/drawing/2014/main" id="{6DA58C3E-F259-11FA-D4B4-0FEBA2D9D5AD}"/>
+                  </a:ext>
+                </a:extLst>
+              </p:cNvPr>
+              <p:cNvSpPr/>
+              <p:nvPr/>
+            </p:nvSpPr>
+            <p:spPr>
+              <a:xfrm>
+                <a:off x="5869340" y="2996426"/>
+                <a:ext cx="360000" cy="360000"/>
+              </a:xfrm>
+              <a:prstGeom prst="mathMultiply">
+                <a:avLst>
+                  <a:gd name="adj1" fmla="val 12937"/>
+                </a:avLst>
+              </a:prstGeom>
+              <a:solidFill>
+                <a:srgbClr val="FF0000"/>
+              </a:solidFill>
+              <a:ln>
+                <a:noFill/>
+              </a:ln>
+            </p:spPr>
+            <p:style>
+              <a:lnRef idx="2">
+                <a:schemeClr val="accent1">
+                  <a:shade val="50000"/>
+                </a:schemeClr>
+              </a:lnRef>
+              <a:fillRef idx="1">
+                <a:schemeClr val="accent1"/>
+              </a:fillRef>
+              <a:effectRef idx="0">
+                <a:schemeClr val="accent1"/>
+              </a:effectRef>
+              <a:fontRef idx="minor">
+                <a:schemeClr val="lt1"/>
+              </a:fontRef>
+            </p:style>
+            <p:txBody>
+              <a:bodyPr rtlCol="0" anchor="ctr"/>
+              <a:lstStyle/>
+              <a:p>
+                <a:pPr algn="ctr"/>
+                <a:endParaRPr lang="en-CN"/>
+              </a:p>
+            </p:txBody>
+          </p:sp>
+        </p:grpSp>
         <p:sp>
           <p:nvSpPr>
-            <p:cNvPr id="15" name="Rectangle 14">
+            <p:cNvPr id="3" name="Rectangle 2">
               <a:extLst>
                 <a:ext uri="{FF2B5EF4-FFF2-40B4-BE49-F238E27FC236}">
-                  <a16:creationId xmlns:a16="http://schemas.microsoft.com/office/drawing/2014/main" id="{A7BE3F17-C67E-5A46-996C-67EF743EC561}"/>
+                  <a16:creationId xmlns:a16="http://schemas.microsoft.com/office/drawing/2014/main" id="{F6C22B75-5976-6A71-EA90-DBA1C10BF084}"/>
                 </a:ext>
               </a:extLst>
             </p:cNvPr>
@@ -6440,105 +7032,14 @@
           </p:nvSpPr>
           <p:spPr>
             <a:xfrm>
-              <a:off x="5030112" y="3975044"/>
-              <a:ext cx="1618476" cy="479472"/>
-            </a:xfrm>
-            <a:prstGeom prst="rect">
-              <a:avLst/>
-            </a:prstGeom>
-            <a:noFill/>
-            <a:ln w="25400">
-              <a:solidFill>
-                <a:schemeClr val="tx1"/>
-              </a:solidFill>
-            </a:ln>
-          </p:spPr>
-          <p:style>
-            <a:lnRef idx="2">
-              <a:schemeClr val="accent1">
-                <a:shade val="50000"/>
-              </a:schemeClr>
-            </a:lnRef>
-            <a:fillRef idx="1">
-              <a:schemeClr val="accent1"/>
-            </a:fillRef>
-            <a:effectRef idx="0">
-              <a:schemeClr val="accent1"/>
-            </a:effectRef>
-            <a:fontRef idx="minor">
-              <a:schemeClr val="lt1"/>
-            </a:fontRef>
-          </p:style>
-          <p:txBody>
-            <a:bodyPr rtlCol="0" anchor="ctr"/>
-            <a:lstStyle/>
-            <a:p>
-              <a:pPr algn="ctr"/>
-              <a:r>
-                <a:rPr lang="en-US" altLang="zh-CN" sz="1400" dirty="0" err="1">
-                  <a:solidFill>
-                    <a:schemeClr val="tx1"/>
-                  </a:solidFill>
-                </a:rPr>
-                <a:t>loan.id</a:t>
-              </a:r>
-              <a:r>
-                <a:rPr lang="zh-CN" altLang="en-US" sz="1400" dirty="0">
-                  <a:solidFill>
-                    <a:schemeClr val="tx1"/>
-                  </a:solidFill>
-                </a:rPr>
-                <a:t> </a:t>
-              </a:r>
-              <a:r>
-                <a:rPr lang="en-US" altLang="zh-CN" sz="1400" dirty="0">
-                  <a:solidFill>
-                    <a:schemeClr val="tx1"/>
-                  </a:solidFill>
-                </a:rPr>
-                <a:t>=</a:t>
-              </a:r>
-              <a:r>
-                <a:rPr lang="zh-CN" altLang="en-US" sz="1400" dirty="0">
-                  <a:solidFill>
-                    <a:schemeClr val="tx1"/>
-                  </a:solidFill>
-                </a:rPr>
-                <a:t> </a:t>
-              </a:r>
-              <a:r>
-                <a:rPr lang="en-US" altLang="zh-CN" sz="1400" dirty="0">
-                  <a:solidFill>
-                    <a:schemeClr val="tx1"/>
-                  </a:solidFill>
-                </a:rPr>
-                <a:t>${id}</a:t>
-              </a:r>
-            </a:p>
-          </p:txBody>
-        </p:sp>
-        <p:sp>
-          <p:nvSpPr>
-            <p:cNvPr id="16" name="Rectangle 15">
-              <a:extLst>
-                <a:ext uri="{FF2B5EF4-FFF2-40B4-BE49-F238E27FC236}">
-                  <a16:creationId xmlns:a16="http://schemas.microsoft.com/office/drawing/2014/main" id="{E7BA5DA0-5EF3-9D45-88BA-BC5BA7F3F9AB}"/>
-                </a:ext>
-              </a:extLst>
-            </p:cNvPr>
-            <p:cNvSpPr/>
-            <p:nvPr/>
-          </p:nvSpPr>
-          <p:spPr>
-            <a:xfrm>
-              <a:off x="5039406" y="2403484"/>
-              <a:ext cx="1618476" cy="387178"/>
+              <a:off x="3681387" y="3455786"/>
+              <a:ext cx="1611024" cy="387178"/>
             </a:xfrm>
             <a:prstGeom prst="rect">
               <a:avLst/>
             </a:prstGeom>
             <a:solidFill>
-              <a:schemeClr val="accent1">
+              <a:schemeClr val="accent6">
                 <a:lumMod val="60000"/>
                 <a:lumOff val="40000"/>
               </a:schemeClr>
@@ -6576,7 +7077,7 @@
                     <a:schemeClr val="tx1"/>
                   </a:solidFill>
                 </a:rPr>
-                <a:t>Account</a:t>
+                <a:t>Person</a:t>
               </a:r>
               <a:endParaRPr lang="en-CN" b="1" dirty="0">
                 <a:solidFill>
@@ -6588,10 +7089,10 @@
         </p:sp>
         <p:sp>
           <p:nvSpPr>
-            <p:cNvPr id="41" name="Rectangle 40">
+            <p:cNvPr id="4" name="Rectangle 3">
               <a:extLst>
                 <a:ext uri="{FF2B5EF4-FFF2-40B4-BE49-F238E27FC236}">
-                  <a16:creationId xmlns:a16="http://schemas.microsoft.com/office/drawing/2014/main" id="{C805CEC5-21B7-E247-ABBB-187667AB24B0}"/>
+                  <a16:creationId xmlns:a16="http://schemas.microsoft.com/office/drawing/2014/main" id="{86444C4D-9B67-3AAF-D7FA-B451C6AF389F}"/>
                 </a:ext>
               </a:extLst>
             </p:cNvPr>
@@ -6600,17 +7101,16 @@
           </p:nvSpPr>
           <p:spPr>
             <a:xfrm>
-              <a:off x="5030112" y="3592014"/>
-              <a:ext cx="1618476" cy="387178"/>
+              <a:off x="3681387" y="4250470"/>
+              <a:ext cx="1611024" cy="387178"/>
             </a:xfrm>
             <a:prstGeom prst="rect">
               <a:avLst/>
             </a:prstGeom>
             <a:solidFill>
-              <a:schemeClr val="accent2">
-                <a:lumMod val="60000"/>
-                <a:lumOff val="40000"/>
-              </a:schemeClr>
+              <a:srgbClr val="FF0000">
+                <a:alpha val="30000"/>
+              </a:srgbClr>
             </a:solidFill>
             <a:ln w="25400">
               <a:solidFill>
@@ -6645,25 +7145,9 @@
                     <a:schemeClr val="tx1"/>
                   </a:solidFill>
                 </a:rPr>
-                <a:t>loan:</a:t>
+                <a:t>Company</a:t>
               </a:r>
-              <a:r>
-                <a:rPr lang="zh-CN" altLang="en-US" b="1" dirty="0">
-                  <a:solidFill>
-                    <a:schemeClr val="tx1"/>
-                  </a:solidFill>
-                </a:rPr>
-                <a:t> </a:t>
-              </a:r>
-              <a:r>
-                <a:rPr lang="en-US" altLang="zh-CN" dirty="0">
-                  <a:solidFill>
-                    <a:schemeClr val="tx1"/>
-                  </a:solidFill>
-                </a:rPr>
-                <a:t>Loan</a:t>
-              </a:r>
-              <a:endParaRPr lang="en-CN" dirty="0">
+              <a:endParaRPr lang="en-CN" b="1" dirty="0">
                 <a:solidFill>
                   <a:schemeClr val="tx1"/>
                 </a:solidFill>
@@ -6671,33 +7155,156 @@
             </a:p>
           </p:txBody>
         </p:sp>
+        <p:sp>
+          <p:nvSpPr>
+            <p:cNvPr id="5" name="TextBox 4">
+              <a:extLst>
+                <a:ext uri="{FF2B5EF4-FFF2-40B4-BE49-F238E27FC236}">
+                  <a16:creationId xmlns:a16="http://schemas.microsoft.com/office/drawing/2014/main" id="{2BC9018A-43FD-449F-63D9-CE2256EFA7BB}"/>
+                </a:ext>
+              </a:extLst>
+            </p:cNvPr>
+            <p:cNvSpPr txBox="1"/>
+            <p:nvPr/>
+          </p:nvSpPr>
+          <p:spPr>
+            <a:xfrm>
+              <a:off x="5845544" y="3689370"/>
+              <a:ext cx="603050" cy="307777"/>
+            </a:xfrm>
+            <a:prstGeom prst="rect">
+              <a:avLst/>
+            </a:prstGeom>
+            <a:noFill/>
+          </p:spPr>
+          <p:txBody>
+            <a:bodyPr wrap="none" rtlCol="0">
+              <a:spAutoFit/>
+            </a:bodyPr>
+            <a:lstStyle/>
+            <a:p>
+              <a:r>
+                <a:rPr lang="en-US" altLang="zh-CN" sz="1400" dirty="0"/>
+                <a:t>apply</a:t>
+              </a:r>
+              <a:endParaRPr lang="en-CN" sz="1600" dirty="0"/>
+            </a:p>
+          </p:txBody>
+        </p:sp>
+        <p:sp>
+          <p:nvSpPr>
+            <p:cNvPr id="6" name="TextBox 5">
+              <a:extLst>
+                <a:ext uri="{FF2B5EF4-FFF2-40B4-BE49-F238E27FC236}">
+                  <a16:creationId xmlns:a16="http://schemas.microsoft.com/office/drawing/2014/main" id="{EB307DAF-D388-C356-20C1-C485E1185BED}"/>
+                </a:ext>
+              </a:extLst>
+            </p:cNvPr>
+            <p:cNvSpPr txBox="1"/>
+            <p:nvPr/>
+          </p:nvSpPr>
+          <p:spPr>
+            <a:xfrm>
+              <a:off x="4309087" y="3880032"/>
+              <a:ext cx="348172" cy="307777"/>
+            </a:xfrm>
+            <a:prstGeom prst="rect">
+              <a:avLst/>
+            </a:prstGeom>
+            <a:noFill/>
+          </p:spPr>
+          <p:txBody>
+            <a:bodyPr wrap="none" rtlCol="0">
+              <a:spAutoFit/>
+            </a:bodyPr>
+            <a:lstStyle/>
+            <a:p>
+              <a:r>
+                <a:rPr lang="en-US" altLang="zh-CN" sz="1400" dirty="0"/>
+                <a:t>or</a:t>
+              </a:r>
+            </a:p>
+          </p:txBody>
+        </p:sp>
         <p:cxnSp>
           <p:nvCxnSpPr>
-            <p:cNvPr id="48" name="Straight Arrow Connector 47">
+            <p:cNvPr id="7" name="Elbow Connector 6">
               <a:extLst>
                 <a:ext uri="{FF2B5EF4-FFF2-40B4-BE49-F238E27FC236}">
-                  <a16:creationId xmlns:a16="http://schemas.microsoft.com/office/drawing/2014/main" id="{DEF26B6A-F6DC-614D-B833-5D80CBB5E0FA}"/>
+                  <a16:creationId xmlns:a16="http://schemas.microsoft.com/office/drawing/2014/main" id="{5129B6BB-A768-8121-42AE-B819FCE6F370}"/>
                 </a:ext>
               </a:extLst>
             </p:cNvPr>
             <p:cNvCxnSpPr>
               <a:cxnSpLocks/>
+              <a:stCxn id="3" idx="3"/>
+              <a:endCxn id="15" idx="1"/>
+            </p:cNvCxnSpPr>
+            <p:nvPr/>
+          </p:nvCxnSpPr>
+          <p:spPr>
+            <a:xfrm>
+              <a:off x="5292411" y="3649375"/>
+              <a:ext cx="1221061" cy="433325"/>
+            </a:xfrm>
+            <a:prstGeom prst="bentConnector3">
+              <a:avLst>
+                <a:gd name="adj1" fmla="val 35023"/>
+              </a:avLst>
+            </a:prstGeom>
+            <a:ln w="19050">
+              <a:solidFill>
+                <a:schemeClr val="tx1"/>
+              </a:solidFill>
+              <a:tailEnd type="triangle"/>
+            </a:ln>
+            <a:effectLst/>
+          </p:spPr>
+          <p:style>
+            <a:lnRef idx="1">
+              <a:schemeClr val="accent1"/>
+            </a:lnRef>
+            <a:fillRef idx="0">
+              <a:schemeClr val="accent1"/>
+            </a:fillRef>
+            <a:effectRef idx="0">
+              <a:schemeClr val="accent1"/>
+            </a:effectRef>
+            <a:fontRef idx="minor">
+              <a:schemeClr val="tx1"/>
+            </a:fontRef>
+          </p:style>
+        </p:cxnSp>
+        <p:cxnSp>
+          <p:nvCxnSpPr>
+            <p:cNvPr id="8" name="Elbow Connector 7">
+              <a:extLst>
+                <a:ext uri="{FF2B5EF4-FFF2-40B4-BE49-F238E27FC236}">
+                  <a16:creationId xmlns:a16="http://schemas.microsoft.com/office/drawing/2014/main" id="{1953077A-BFC9-F561-7E9F-D5062615CF5A}"/>
+                </a:ext>
+              </a:extLst>
+            </p:cNvPr>
+            <p:cNvCxnSpPr>
+              <a:cxnSpLocks/>
+              <a:stCxn id="4" idx="3"/>
+              <a:endCxn id="15" idx="1"/>
             </p:cNvCxnSpPr>
             <p:nvPr/>
           </p:nvCxnSpPr>
           <p:spPr>
             <a:xfrm flipV="1">
-              <a:off x="6050741" y="2792795"/>
-              <a:ext cx="0" cy="799219"/>
+              <a:off x="5292411" y="4082700"/>
+              <a:ext cx="1221061" cy="361359"/>
             </a:xfrm>
-            <a:prstGeom prst="straightConnector1">
-              <a:avLst/>
+            <a:prstGeom prst="bentConnector3">
+              <a:avLst>
+                <a:gd name="adj1" fmla="val 35023"/>
+              </a:avLst>
             </a:prstGeom>
             <a:ln w="19050">
               <a:solidFill>
                 <a:schemeClr val="tx1"/>
               </a:solidFill>
-              <a:prstDash val="solid"/>
               <a:tailEnd type="triangle"/>
             </a:ln>
             <a:effectLst/>
@@ -6719,128 +7326,10 @@
         </p:cxnSp>
         <p:sp>
           <p:nvSpPr>
-            <p:cNvPr id="51" name="TextBox 50">
+            <p:cNvPr id="9" name="Multiply 8">
               <a:extLst>
                 <a:ext uri="{FF2B5EF4-FFF2-40B4-BE49-F238E27FC236}">
-                  <a16:creationId xmlns:a16="http://schemas.microsoft.com/office/drawing/2014/main" id="{A9EEFE6B-5C72-DB4E-8259-8211ECB467CF}"/>
-                </a:ext>
-              </a:extLst>
-            </p:cNvPr>
-            <p:cNvSpPr txBox="1"/>
-            <p:nvPr/>
-          </p:nvSpPr>
-          <p:spPr>
-            <a:xfrm>
-              <a:off x="6108522" y="3038516"/>
-              <a:ext cx="756938" cy="307777"/>
-            </a:xfrm>
-            <a:prstGeom prst="rect">
-              <a:avLst/>
-            </a:prstGeom>
-            <a:noFill/>
-          </p:spPr>
-          <p:txBody>
-            <a:bodyPr wrap="none" rtlCol="0">
-              <a:spAutoFit/>
-            </a:bodyPr>
-            <a:lstStyle/>
-            <a:p>
-              <a:r>
-                <a:rPr lang="en-US" altLang="zh-CN" sz="1400" dirty="0"/>
-                <a:t>deposit</a:t>
-              </a:r>
-              <a:endParaRPr lang="en-CN" sz="1600" dirty="0"/>
-            </a:p>
-          </p:txBody>
-        </p:sp>
-        <p:cxnSp>
-          <p:nvCxnSpPr>
-            <p:cNvPr id="58" name="Straight Arrow Connector 57">
-              <a:extLst>
-                <a:ext uri="{FF2B5EF4-FFF2-40B4-BE49-F238E27FC236}">
-                  <a16:creationId xmlns:a16="http://schemas.microsoft.com/office/drawing/2014/main" id="{B98DEA75-B1DE-EB46-BCC7-AAE8B7FAA619}"/>
-                </a:ext>
-              </a:extLst>
-            </p:cNvPr>
-            <p:cNvCxnSpPr>
-              <a:cxnSpLocks/>
-            </p:cNvCxnSpPr>
-            <p:nvPr/>
-          </p:nvCxnSpPr>
-          <p:spPr>
-            <a:xfrm>
-              <a:off x="5604221" y="2792795"/>
-              <a:ext cx="0" cy="799219"/>
-            </a:xfrm>
-            <a:prstGeom prst="straightConnector1">
-              <a:avLst/>
-            </a:prstGeom>
-            <a:ln w="19050">
-              <a:solidFill>
-                <a:schemeClr val="tx1"/>
-              </a:solidFill>
-              <a:prstDash val="solid"/>
-              <a:tailEnd type="triangle"/>
-            </a:ln>
-            <a:effectLst/>
-          </p:spPr>
-          <p:style>
-            <a:lnRef idx="1">
-              <a:schemeClr val="accent1"/>
-            </a:lnRef>
-            <a:fillRef idx="0">
-              <a:schemeClr val="accent1"/>
-            </a:fillRef>
-            <a:effectRef idx="0">
-              <a:schemeClr val="accent1"/>
-            </a:effectRef>
-            <a:fontRef idx="minor">
-              <a:schemeClr val="tx1"/>
-            </a:fontRef>
-          </p:style>
-        </p:cxnSp>
-        <p:sp>
-          <p:nvSpPr>
-            <p:cNvPr id="63" name="TextBox 62">
-              <a:extLst>
-                <a:ext uri="{FF2B5EF4-FFF2-40B4-BE49-F238E27FC236}">
-                  <a16:creationId xmlns:a16="http://schemas.microsoft.com/office/drawing/2014/main" id="{7762F5F5-5C98-B849-9DF3-987212DFF39F}"/>
-                </a:ext>
-              </a:extLst>
-            </p:cNvPr>
-            <p:cNvSpPr txBox="1"/>
-            <p:nvPr/>
-          </p:nvSpPr>
-          <p:spPr>
-            <a:xfrm>
-              <a:off x="4920193" y="3038516"/>
-              <a:ext cx="614271" cy="307777"/>
-            </a:xfrm>
-            <a:prstGeom prst="rect">
-              <a:avLst/>
-            </a:prstGeom>
-            <a:noFill/>
-          </p:spPr>
-          <p:txBody>
-            <a:bodyPr wrap="none" rtlCol="0">
-              <a:spAutoFit/>
-            </a:bodyPr>
-            <a:lstStyle/>
-            <a:p>
-              <a:r>
-                <a:rPr lang="en-US" altLang="zh-CN" sz="1400" dirty="0"/>
-                <a:t>repay</a:t>
-              </a:r>
-              <a:endParaRPr lang="en-CN" sz="1600" dirty="0"/>
-            </a:p>
-          </p:txBody>
-        </p:sp>
-        <p:sp>
-          <p:nvSpPr>
-            <p:cNvPr id="65" name="Multiply 64">
-              <a:extLst>
-                <a:ext uri="{FF2B5EF4-FFF2-40B4-BE49-F238E27FC236}">
-                  <a16:creationId xmlns:a16="http://schemas.microsoft.com/office/drawing/2014/main" id="{E97182F8-1AA8-5973-5AE1-5CCFDACA5F6D}"/>
+                  <a16:creationId xmlns:a16="http://schemas.microsoft.com/office/drawing/2014/main" id="{1236963E-2930-09F8-0902-493584C3395D}"/>
                 </a:ext>
               </a:extLst>
             </p:cNvPr>
@@ -6849,115 +7338,7 @@
           </p:nvSpPr>
           <p:spPr>
             <a:xfrm>
-              <a:off x="6347328" y="4034780"/>
-              <a:ext cx="360000" cy="360000"/>
-            </a:xfrm>
-            <a:prstGeom prst="mathMultiply">
-              <a:avLst>
-                <a:gd name="adj1" fmla="val 12937"/>
-              </a:avLst>
-            </a:prstGeom>
-            <a:solidFill>
-              <a:srgbClr val="FF0000"/>
-            </a:solidFill>
-            <a:ln>
-              <a:noFill/>
-            </a:ln>
-          </p:spPr>
-          <p:style>
-            <a:lnRef idx="2">
-              <a:schemeClr val="accent1">
-                <a:shade val="50000"/>
-              </a:schemeClr>
-            </a:lnRef>
-            <a:fillRef idx="1">
-              <a:schemeClr val="accent1"/>
-            </a:fillRef>
-            <a:effectRef idx="0">
-              <a:schemeClr val="accent1"/>
-            </a:effectRef>
-            <a:fontRef idx="minor">
-              <a:schemeClr val="lt1"/>
-            </a:fontRef>
-          </p:style>
-          <p:txBody>
-            <a:bodyPr rtlCol="0" anchor="ctr"/>
-            <a:lstStyle/>
-            <a:p>
-              <a:pPr algn="ctr"/>
-              <a:endParaRPr lang="en-CN"/>
-            </a:p>
-          </p:txBody>
-        </p:sp>
-        <p:sp>
-          <p:nvSpPr>
-            <p:cNvPr id="66" name="Multiply 65">
-              <a:extLst>
-                <a:ext uri="{FF2B5EF4-FFF2-40B4-BE49-F238E27FC236}">
-                  <a16:creationId xmlns:a16="http://schemas.microsoft.com/office/drawing/2014/main" id="{D35B4872-4838-E224-7870-5F162EB7DE54}"/>
-                </a:ext>
-              </a:extLst>
-            </p:cNvPr>
-            <p:cNvSpPr/>
-            <p:nvPr/>
-          </p:nvSpPr>
-          <p:spPr>
-            <a:xfrm>
-              <a:off x="5449864" y="2996426"/>
-              <a:ext cx="360000" cy="360000"/>
-            </a:xfrm>
-            <a:prstGeom prst="mathMultiply">
-              <a:avLst>
-                <a:gd name="adj1" fmla="val 12937"/>
-              </a:avLst>
-            </a:prstGeom>
-            <a:solidFill>
-              <a:srgbClr val="FF0000"/>
-            </a:solidFill>
-            <a:ln>
-              <a:noFill/>
-            </a:ln>
-          </p:spPr>
-          <p:style>
-            <a:lnRef idx="2">
-              <a:schemeClr val="accent1">
-                <a:shade val="50000"/>
-              </a:schemeClr>
-            </a:lnRef>
-            <a:fillRef idx="1">
-              <a:schemeClr val="accent1"/>
-            </a:fillRef>
-            <a:effectRef idx="0">
-              <a:schemeClr val="accent1"/>
-            </a:effectRef>
-            <a:fontRef idx="minor">
-              <a:schemeClr val="lt1"/>
-            </a:fontRef>
-          </p:style>
-          <p:txBody>
-            <a:bodyPr rtlCol="0" anchor="ctr"/>
-            <a:lstStyle/>
-            <a:p>
-              <a:pPr algn="ctr"/>
-              <a:endParaRPr lang="en-CN"/>
-            </a:p>
-          </p:txBody>
-        </p:sp>
-        <p:sp>
-          <p:nvSpPr>
-            <p:cNvPr id="67" name="Multiply 66">
-              <a:extLst>
-                <a:ext uri="{FF2B5EF4-FFF2-40B4-BE49-F238E27FC236}">
-                  <a16:creationId xmlns:a16="http://schemas.microsoft.com/office/drawing/2014/main" id="{6DA58C3E-F259-11FA-D4B4-0FEBA2D9D5AD}"/>
-                </a:ext>
-              </a:extLst>
-            </p:cNvPr>
-            <p:cNvSpPr/>
-            <p:nvPr/>
-          </p:nvSpPr>
-          <p:spPr>
-            <a:xfrm>
-              <a:off x="5869340" y="2996426"/>
+              <a:off x="5951125" y="3885198"/>
               <a:ext cx="360000" cy="360000"/>
             </a:xfrm>
             <a:prstGeom prst="mathMultiply">
@@ -8873,6 +9254,16 @@
                   <a:t> </a:t>
                 </a:r>
                 <a:r>
+                  <a:rPr kumimoji="1" lang="en-US" altLang="zh-CN" sz="1600" dirty="0">
+                    <a:solidFill>
+                      <a:sysClr val="windowText" lastClr="000000"/>
+                    </a:solidFill>
+                    <a:latin typeface="DengXian" panose="02010600030101010101" pitchFamily="2" charset="-122"/>
+                    <a:ea typeface="DengXian" panose="02010600030101010101" pitchFamily="2" charset="-122"/>
+                  </a:rPr>
+                  <a:t>${</a:t>
+                </a:r>
+                <a:r>
                   <a:rPr kumimoji="1" lang="en-US" altLang="zh-CN" sz="1600" dirty="0" err="1">
                     <a:solidFill>
                       <a:sysClr val="windowText" lastClr="000000"/>
@@ -8882,13 +9273,16 @@
                   </a:rPr>
                   <a:t>dstId</a:t>
                 </a:r>
-                <a:endParaRPr kumimoji="1" lang="en-US" altLang="zh-CN" sz="1600" dirty="0">
-                  <a:solidFill>
-                    <a:sysClr val="windowText" lastClr="000000"/>
-                  </a:solidFill>
-                  <a:latin typeface="DengXian" panose="02010600030101010101" pitchFamily="2" charset="-122"/>
-                  <a:ea typeface="DengXian" panose="02010600030101010101" pitchFamily="2" charset="-122"/>
-                </a:endParaRPr>
+                <a:r>
+                  <a:rPr kumimoji="1" lang="en-US" altLang="zh-CN" sz="1600" dirty="0">
+                    <a:solidFill>
+                      <a:sysClr val="windowText" lastClr="000000"/>
+                    </a:solidFill>
+                    <a:latin typeface="DengXian" panose="02010600030101010101" pitchFamily="2" charset="-122"/>
+                    <a:ea typeface="DengXian" panose="02010600030101010101" pitchFamily="2" charset="-122"/>
+                  </a:rPr>
+                  <a:t>}</a:t>
+                </a:r>
               </a:p>
             </p:txBody>
           </p:sp>
@@ -13112,7 +13506,7 @@
                   <a:latin typeface="DengXian" panose="02010600030101010101" pitchFamily="2" charset="-122"/>
                   <a:ea typeface="DengXian" panose="02010600030101010101" pitchFamily="2" charset="-122"/>
                 </a:rPr>
-                <a:t>amt</a:t>
+                <a:t>amount</a:t>
               </a:r>
             </a:p>
           </p:txBody>

</xml_diff>

<commit_message>
Fix #65: format errors, description ambiguity, typo errors (#66)
</commit_message>
<xml_diff>
--- a/patterns/transaction-write.pptx
+++ b/patterns/transaction-write.pptx
@@ -236,7 +236,7 @@
           <a:p>
             <a:fld id="{CAD4BD24-A097-4F9D-85E9-6A2A24CA2D98}" type="datetimeFigureOut">
               <a:rPr lang="zh-CN" altLang="en-US" smtClean="0"/>
-              <a:t>2023/2/23</a:t>
+              <a:t>2023/4/28</a:t>
             </a:fld>
             <a:endParaRPr lang="zh-CN" altLang="en-US"/>
           </a:p>
@@ -2527,10 +2527,10 @@
       </p:grpSpPr>
       <p:grpSp>
         <p:nvGrpSpPr>
-          <p:cNvPr id="4" name="Group 3">
+          <p:cNvPr id="11" name="Group 10">
             <a:extLst>
               <a:ext uri="{FF2B5EF4-FFF2-40B4-BE49-F238E27FC236}">
-                <a16:creationId xmlns:a16="http://schemas.microsoft.com/office/drawing/2014/main" id="{A37D8080-2775-FC95-E5FF-4EAE618D2A24}"/>
+                <a16:creationId xmlns:a16="http://schemas.microsoft.com/office/drawing/2014/main" id="{A43BBF47-E582-7A17-90A5-817BDFBAA6DA}"/>
               </a:ext>
             </a:extLst>
           </p:cNvPr>
@@ -3225,7 +3225,7 @@
             <a:prstGeom prst="straightConnector1">
               <a:avLst/>
             </a:prstGeom>
-            <a:ln w="25400">
+            <a:ln w="19050">
               <a:solidFill>
                 <a:schemeClr val="tx1"/>
               </a:solidFill>
@@ -3262,15 +3262,13 @@
           </p:nvSpPr>
           <p:spPr>
             <a:xfrm>
-              <a:off x="5604460" y="2282699"/>
+              <a:off x="5626231" y="2491418"/>
               <a:ext cx="639740" cy="338554"/>
             </a:xfrm>
             <a:prstGeom prst="rect">
               <a:avLst/>
             </a:prstGeom>
-            <a:solidFill>
-              <a:schemeClr val="bg1"/>
-            </a:solidFill>
+            <a:noFill/>
           </p:spPr>
           <p:txBody>
             <a:bodyPr wrap="square" rtlCol="0">
@@ -3293,181 +3291,181 @@
             </a:p>
           </p:txBody>
         </p:sp>
+        <p:sp>
+          <p:nvSpPr>
+            <p:cNvPr id="2" name="Cross 1">
+              <a:extLst>
+                <a:ext uri="{FF2B5EF4-FFF2-40B4-BE49-F238E27FC236}">
+                  <a16:creationId xmlns:a16="http://schemas.microsoft.com/office/drawing/2014/main" id="{7F0E216C-8081-EB22-0A1C-F55CAE5567FB}"/>
+                </a:ext>
+              </a:extLst>
+            </p:cNvPr>
+            <p:cNvSpPr/>
+            <p:nvPr/>
+          </p:nvSpPr>
+          <p:spPr>
+            <a:xfrm>
+              <a:off x="1743075" y="2220077"/>
+              <a:ext cx="180000" cy="180000"/>
+            </a:xfrm>
+            <a:prstGeom prst="plus">
+              <a:avLst>
+                <a:gd name="adj" fmla="val 33021"/>
+              </a:avLst>
+            </a:prstGeom>
+            <a:solidFill>
+              <a:schemeClr val="tx1"/>
+            </a:solidFill>
+            <a:ln>
+              <a:noFill/>
+            </a:ln>
+          </p:spPr>
+          <p:style>
+            <a:lnRef idx="2">
+              <a:schemeClr val="accent1">
+                <a:shade val="50000"/>
+              </a:schemeClr>
+            </a:lnRef>
+            <a:fillRef idx="1">
+              <a:schemeClr val="accent1"/>
+            </a:fillRef>
+            <a:effectRef idx="0">
+              <a:schemeClr val="accent1"/>
+            </a:effectRef>
+            <a:fontRef idx="minor">
+              <a:schemeClr val="lt1"/>
+            </a:fontRef>
+          </p:style>
+          <p:txBody>
+            <a:bodyPr rtlCol="0" anchor="ctr"/>
+            <a:lstStyle/>
+            <a:p>
+              <a:pPr algn="ctr"/>
+              <a:endParaRPr lang="en-CN">
+                <a:solidFill>
+                  <a:schemeClr val="tx1"/>
+                </a:solidFill>
+              </a:endParaRPr>
+            </a:p>
+          </p:txBody>
+        </p:sp>
+        <p:sp>
+          <p:nvSpPr>
+            <p:cNvPr id="7" name="Cross 6">
+              <a:extLst>
+                <a:ext uri="{FF2B5EF4-FFF2-40B4-BE49-F238E27FC236}">
+                  <a16:creationId xmlns:a16="http://schemas.microsoft.com/office/drawing/2014/main" id="{97B94FAA-0D92-09CE-C55D-9D56B6784BFD}"/>
+                </a:ext>
+              </a:extLst>
+            </p:cNvPr>
+            <p:cNvSpPr/>
+            <p:nvPr/>
+          </p:nvSpPr>
+          <p:spPr>
+            <a:xfrm>
+              <a:off x="7552671" y="2220077"/>
+              <a:ext cx="180000" cy="180000"/>
+            </a:xfrm>
+            <a:prstGeom prst="plus">
+              <a:avLst>
+                <a:gd name="adj" fmla="val 33021"/>
+              </a:avLst>
+            </a:prstGeom>
+            <a:solidFill>
+              <a:schemeClr val="tx1"/>
+            </a:solidFill>
+            <a:ln>
+              <a:noFill/>
+            </a:ln>
+          </p:spPr>
+          <p:style>
+            <a:lnRef idx="2">
+              <a:schemeClr val="accent1">
+                <a:shade val="50000"/>
+              </a:schemeClr>
+            </a:lnRef>
+            <a:fillRef idx="1">
+              <a:schemeClr val="accent1"/>
+            </a:fillRef>
+            <a:effectRef idx="0">
+              <a:schemeClr val="accent1"/>
+            </a:effectRef>
+            <a:fontRef idx="minor">
+              <a:schemeClr val="lt1"/>
+            </a:fontRef>
+          </p:style>
+          <p:txBody>
+            <a:bodyPr rtlCol="0" anchor="ctr"/>
+            <a:lstStyle/>
+            <a:p>
+              <a:pPr algn="ctr"/>
+              <a:endParaRPr lang="en-CN">
+                <a:solidFill>
+                  <a:schemeClr val="tx1"/>
+                </a:solidFill>
+              </a:endParaRPr>
+            </a:p>
+          </p:txBody>
+        </p:sp>
+        <p:sp>
+          <p:nvSpPr>
+            <p:cNvPr id="9" name="Cross 8">
+              <a:extLst>
+                <a:ext uri="{FF2B5EF4-FFF2-40B4-BE49-F238E27FC236}">
+                  <a16:creationId xmlns:a16="http://schemas.microsoft.com/office/drawing/2014/main" id="{B41A4442-733B-F248-83BD-78048EADD0B0}"/>
+                </a:ext>
+              </a:extLst>
+            </p:cNvPr>
+            <p:cNvSpPr/>
+            <p:nvPr/>
+          </p:nvSpPr>
+          <p:spPr>
+            <a:xfrm>
+              <a:off x="6174378" y="2519137"/>
+              <a:ext cx="180000" cy="180000"/>
+            </a:xfrm>
+            <a:prstGeom prst="plus">
+              <a:avLst>
+                <a:gd name="adj" fmla="val 33021"/>
+              </a:avLst>
+            </a:prstGeom>
+            <a:solidFill>
+              <a:schemeClr val="tx1"/>
+            </a:solidFill>
+            <a:ln>
+              <a:noFill/>
+            </a:ln>
+          </p:spPr>
+          <p:style>
+            <a:lnRef idx="2">
+              <a:schemeClr val="accent1">
+                <a:shade val="50000"/>
+              </a:schemeClr>
+            </a:lnRef>
+            <a:fillRef idx="1">
+              <a:schemeClr val="accent1"/>
+            </a:fillRef>
+            <a:effectRef idx="0">
+              <a:schemeClr val="accent1"/>
+            </a:effectRef>
+            <a:fontRef idx="minor">
+              <a:schemeClr val="lt1"/>
+            </a:fontRef>
+          </p:style>
+          <p:txBody>
+            <a:bodyPr rtlCol="0" anchor="ctr"/>
+            <a:lstStyle/>
+            <a:p>
+              <a:pPr algn="ctr"/>
+              <a:endParaRPr lang="en-CN">
+                <a:solidFill>
+                  <a:schemeClr val="tx1"/>
+                </a:solidFill>
+              </a:endParaRPr>
+            </a:p>
+          </p:txBody>
+        </p:sp>
       </p:grpSp>
-      <p:sp>
-        <p:nvSpPr>
-          <p:cNvPr id="2" name="Cross 1">
-            <a:extLst>
-              <a:ext uri="{FF2B5EF4-FFF2-40B4-BE49-F238E27FC236}">
-                <a16:creationId xmlns:a16="http://schemas.microsoft.com/office/drawing/2014/main" id="{7F0E216C-8081-EB22-0A1C-F55CAE5567FB}"/>
-              </a:ext>
-            </a:extLst>
-          </p:cNvPr>
-          <p:cNvSpPr/>
-          <p:nvPr/>
-        </p:nvSpPr>
-        <p:spPr>
-          <a:xfrm>
-            <a:off x="1743075" y="2220077"/>
-            <a:ext cx="180000" cy="180000"/>
-          </a:xfrm>
-          <a:prstGeom prst="plus">
-            <a:avLst>
-              <a:gd name="adj" fmla="val 33021"/>
-            </a:avLst>
-          </a:prstGeom>
-          <a:solidFill>
-            <a:schemeClr val="tx1"/>
-          </a:solidFill>
-          <a:ln>
-            <a:noFill/>
-          </a:ln>
-        </p:spPr>
-        <p:style>
-          <a:lnRef idx="2">
-            <a:schemeClr val="accent1">
-              <a:shade val="50000"/>
-            </a:schemeClr>
-          </a:lnRef>
-          <a:fillRef idx="1">
-            <a:schemeClr val="accent1"/>
-          </a:fillRef>
-          <a:effectRef idx="0">
-            <a:schemeClr val="accent1"/>
-          </a:effectRef>
-          <a:fontRef idx="minor">
-            <a:schemeClr val="lt1"/>
-          </a:fontRef>
-        </p:style>
-        <p:txBody>
-          <a:bodyPr rtlCol="0" anchor="ctr"/>
-          <a:lstStyle/>
-          <a:p>
-            <a:pPr algn="ctr"/>
-            <a:endParaRPr lang="en-CN">
-              <a:solidFill>
-                <a:schemeClr val="tx1"/>
-              </a:solidFill>
-            </a:endParaRPr>
-          </a:p>
-        </p:txBody>
-      </p:sp>
-      <p:sp>
-        <p:nvSpPr>
-          <p:cNvPr id="7" name="Cross 6">
-            <a:extLst>
-              <a:ext uri="{FF2B5EF4-FFF2-40B4-BE49-F238E27FC236}">
-                <a16:creationId xmlns:a16="http://schemas.microsoft.com/office/drawing/2014/main" id="{97B94FAA-0D92-09CE-C55D-9D56B6784BFD}"/>
-              </a:ext>
-            </a:extLst>
-          </p:cNvPr>
-          <p:cNvSpPr/>
-          <p:nvPr/>
-        </p:nvSpPr>
-        <p:spPr>
-          <a:xfrm>
-            <a:off x="7552671" y="2220077"/>
-            <a:ext cx="180000" cy="180000"/>
-          </a:xfrm>
-          <a:prstGeom prst="plus">
-            <a:avLst>
-              <a:gd name="adj" fmla="val 33021"/>
-            </a:avLst>
-          </a:prstGeom>
-          <a:solidFill>
-            <a:schemeClr val="tx1"/>
-          </a:solidFill>
-          <a:ln>
-            <a:noFill/>
-          </a:ln>
-        </p:spPr>
-        <p:style>
-          <a:lnRef idx="2">
-            <a:schemeClr val="accent1">
-              <a:shade val="50000"/>
-            </a:schemeClr>
-          </a:lnRef>
-          <a:fillRef idx="1">
-            <a:schemeClr val="accent1"/>
-          </a:fillRef>
-          <a:effectRef idx="0">
-            <a:schemeClr val="accent1"/>
-          </a:effectRef>
-          <a:fontRef idx="minor">
-            <a:schemeClr val="lt1"/>
-          </a:fontRef>
-        </p:style>
-        <p:txBody>
-          <a:bodyPr rtlCol="0" anchor="ctr"/>
-          <a:lstStyle/>
-          <a:p>
-            <a:pPr algn="ctr"/>
-            <a:endParaRPr lang="en-CN">
-              <a:solidFill>
-                <a:schemeClr val="tx1"/>
-              </a:solidFill>
-            </a:endParaRPr>
-          </a:p>
-        </p:txBody>
-      </p:sp>
-      <p:sp>
-        <p:nvSpPr>
-          <p:cNvPr id="9" name="Cross 8">
-            <a:extLst>
-              <a:ext uri="{FF2B5EF4-FFF2-40B4-BE49-F238E27FC236}">
-                <a16:creationId xmlns:a16="http://schemas.microsoft.com/office/drawing/2014/main" id="{B41A4442-733B-F248-83BD-78048EADD0B0}"/>
-              </a:ext>
-            </a:extLst>
-          </p:cNvPr>
-          <p:cNvSpPr/>
-          <p:nvPr/>
-        </p:nvSpPr>
-        <p:spPr>
-          <a:xfrm>
-            <a:off x="6096000" y="2231751"/>
-            <a:ext cx="180000" cy="180000"/>
-          </a:xfrm>
-          <a:prstGeom prst="plus">
-            <a:avLst>
-              <a:gd name="adj" fmla="val 33021"/>
-            </a:avLst>
-          </a:prstGeom>
-          <a:solidFill>
-            <a:schemeClr val="tx1"/>
-          </a:solidFill>
-          <a:ln>
-            <a:noFill/>
-          </a:ln>
-        </p:spPr>
-        <p:style>
-          <a:lnRef idx="2">
-            <a:schemeClr val="accent1">
-              <a:shade val="50000"/>
-            </a:schemeClr>
-          </a:lnRef>
-          <a:fillRef idx="1">
-            <a:schemeClr val="accent1"/>
-          </a:fillRef>
-          <a:effectRef idx="0">
-            <a:schemeClr val="accent1"/>
-          </a:effectRef>
-          <a:fontRef idx="minor">
-            <a:schemeClr val="lt1"/>
-          </a:fontRef>
-        </p:style>
-        <p:txBody>
-          <a:bodyPr rtlCol="0" anchor="ctr"/>
-          <a:lstStyle/>
-          <a:p>
-            <a:pPr algn="ctr"/>
-            <a:endParaRPr lang="en-CN">
-              <a:solidFill>
-                <a:schemeClr val="tx1"/>
-              </a:solidFill>
-            </a:endParaRPr>
-          </a:p>
-        </p:txBody>
-      </p:sp>
     </p:spTree>
     <p:extLst>
       <p:ext uri="{BB962C8B-B14F-4D97-AF65-F5344CB8AC3E}">
@@ -3512,7 +3510,7 @@
         </p:nvGrpSpPr>
         <p:grpSpPr>
           <a:xfrm>
-            <a:off x="4607325" y="2411287"/>
+            <a:off x="4607325" y="2763986"/>
             <a:ext cx="2977350" cy="1344279"/>
             <a:chOff x="1488974" y="3906297"/>
             <a:chExt cx="1803118" cy="927586"/>
@@ -4676,7 +4674,7 @@
             <a:prstGeom prst="straightConnector1">
               <a:avLst/>
             </a:prstGeom>
-            <a:ln w="28575">
+            <a:ln w="19050">
               <a:solidFill>
                 <a:schemeClr val="tx1"/>
               </a:solidFill>
@@ -4729,11 +4727,11 @@
             <a:p>
               <a:pPr algn="ctr"/>
               <a:r>
-                <a:rPr kumimoji="1" lang="en-US" altLang="zh-CN" sz="1600" b="1" dirty="0" err="1">
+                <a:rPr kumimoji="1" lang="en-US" altLang="zh-CN" sz="1600" b="1">
                   <a:latin typeface="DengXian" panose="02010600030101010101" pitchFamily="2" charset="-122"/>
                   <a:ea typeface="DengXian" panose="02010600030101010101" pitchFamily="2" charset="-122"/>
                 </a:rPr>
-                <a:t>gurantee</a:t>
+                <a:t>guarantee</a:t>
               </a:r>
               <a:endParaRPr kumimoji="1" lang="en-US" altLang="zh-CN" sz="1600" dirty="0">
                 <a:latin typeface="DengXian" panose="02010600030101010101" pitchFamily="2" charset="-122"/>
@@ -5111,10 +5109,10 @@
       </p:grpSpPr>
       <p:grpSp>
         <p:nvGrpSpPr>
-          <p:cNvPr id="5" name="Group 4">
+          <p:cNvPr id="4" name="Group 3">
             <a:extLst>
               <a:ext uri="{FF2B5EF4-FFF2-40B4-BE49-F238E27FC236}">
-                <a16:creationId xmlns:a16="http://schemas.microsoft.com/office/drawing/2014/main" id="{D6D28D6A-C066-1361-42F3-8B733C379113}"/>
+                <a16:creationId xmlns:a16="http://schemas.microsoft.com/office/drawing/2014/main" id="{1E6EBE87-10EB-12FB-48BF-8DD1C15629A2}"/>
               </a:ext>
             </a:extLst>
           </p:cNvPr>
@@ -8371,10 +8369,10 @@
       </p:grpSpPr>
       <p:grpSp>
         <p:nvGrpSpPr>
-          <p:cNvPr id="2" name="Group 1">
+          <p:cNvPr id="11" name="Group 10">
             <a:extLst>
               <a:ext uri="{FF2B5EF4-FFF2-40B4-BE49-F238E27FC236}">
-                <a16:creationId xmlns:a16="http://schemas.microsoft.com/office/drawing/2014/main" id="{3B9AEEA8-4E45-24C2-B931-32DA0334083A}"/>
+                <a16:creationId xmlns:a16="http://schemas.microsoft.com/office/drawing/2014/main" id="{AA6334AA-C523-DDB3-A68D-CC65F75240F6}"/>
               </a:ext>
             </a:extLst>
           </p:cNvPr>
@@ -9068,7 +9066,7 @@
             <a:prstGeom prst="straightConnector1">
               <a:avLst/>
             </a:prstGeom>
-            <a:ln w="25400">
+            <a:ln w="19050">
               <a:solidFill>
                 <a:schemeClr val="tx1"/>
               </a:solidFill>
@@ -9105,15 +9103,13 @@
           </p:nvSpPr>
           <p:spPr>
             <a:xfrm>
-              <a:off x="5604460" y="2282699"/>
+              <a:off x="5611385" y="2529623"/>
               <a:ext cx="639740" cy="338554"/>
             </a:xfrm>
             <a:prstGeom prst="rect">
               <a:avLst/>
             </a:prstGeom>
-            <a:solidFill>
-              <a:schemeClr val="bg1"/>
-            </a:solidFill>
+            <a:noFill/>
           </p:spPr>
           <p:txBody>
             <a:bodyPr wrap="square" rtlCol="0">
@@ -9136,181 +9132,181 @@
             </a:p>
           </p:txBody>
         </p:sp>
+        <p:sp>
+          <p:nvSpPr>
+            <p:cNvPr id="4" name="Cross 3">
+              <a:extLst>
+                <a:ext uri="{FF2B5EF4-FFF2-40B4-BE49-F238E27FC236}">
+                  <a16:creationId xmlns:a16="http://schemas.microsoft.com/office/drawing/2014/main" id="{E66C406D-8882-3D11-1F95-3D0CC42825AA}"/>
+                </a:ext>
+              </a:extLst>
+            </p:cNvPr>
+            <p:cNvSpPr/>
+            <p:nvPr/>
+          </p:nvSpPr>
+          <p:spPr>
+            <a:xfrm>
+              <a:off x="6176161" y="2559759"/>
+              <a:ext cx="180000" cy="180000"/>
+            </a:xfrm>
+            <a:prstGeom prst="plus">
+              <a:avLst>
+                <a:gd name="adj" fmla="val 33021"/>
+              </a:avLst>
+            </a:prstGeom>
+            <a:solidFill>
+              <a:schemeClr val="tx1"/>
+            </a:solidFill>
+            <a:ln>
+              <a:noFill/>
+            </a:ln>
+          </p:spPr>
+          <p:style>
+            <a:lnRef idx="2">
+              <a:schemeClr val="accent1">
+                <a:shade val="50000"/>
+              </a:schemeClr>
+            </a:lnRef>
+            <a:fillRef idx="1">
+              <a:schemeClr val="accent1"/>
+            </a:fillRef>
+            <a:effectRef idx="0">
+              <a:schemeClr val="accent1"/>
+            </a:effectRef>
+            <a:fontRef idx="minor">
+              <a:schemeClr val="lt1"/>
+            </a:fontRef>
+          </p:style>
+          <p:txBody>
+            <a:bodyPr rtlCol="0" anchor="ctr"/>
+            <a:lstStyle/>
+            <a:p>
+              <a:pPr algn="ctr"/>
+              <a:endParaRPr lang="en-CN">
+                <a:solidFill>
+                  <a:schemeClr val="tx1"/>
+                </a:solidFill>
+              </a:endParaRPr>
+            </a:p>
+          </p:txBody>
+        </p:sp>
+        <p:sp>
+          <p:nvSpPr>
+            <p:cNvPr id="7" name="Cross 6">
+              <a:extLst>
+                <a:ext uri="{FF2B5EF4-FFF2-40B4-BE49-F238E27FC236}">
+                  <a16:creationId xmlns:a16="http://schemas.microsoft.com/office/drawing/2014/main" id="{CBEE5D98-D7CC-D52C-FBF5-AC7899B9958A}"/>
+                </a:ext>
+              </a:extLst>
+            </p:cNvPr>
+            <p:cNvSpPr/>
+            <p:nvPr/>
+          </p:nvSpPr>
+          <p:spPr>
+            <a:xfrm>
+              <a:off x="7563221" y="2234994"/>
+              <a:ext cx="180000" cy="180000"/>
+            </a:xfrm>
+            <a:prstGeom prst="plus">
+              <a:avLst>
+                <a:gd name="adj" fmla="val 33021"/>
+              </a:avLst>
+            </a:prstGeom>
+            <a:solidFill>
+              <a:schemeClr val="tx1"/>
+            </a:solidFill>
+            <a:ln>
+              <a:noFill/>
+            </a:ln>
+          </p:spPr>
+          <p:style>
+            <a:lnRef idx="2">
+              <a:schemeClr val="accent1">
+                <a:shade val="50000"/>
+              </a:schemeClr>
+            </a:lnRef>
+            <a:fillRef idx="1">
+              <a:schemeClr val="accent1"/>
+            </a:fillRef>
+            <a:effectRef idx="0">
+              <a:schemeClr val="accent1"/>
+            </a:effectRef>
+            <a:fontRef idx="minor">
+              <a:schemeClr val="lt1"/>
+            </a:fontRef>
+          </p:style>
+          <p:txBody>
+            <a:bodyPr rtlCol="0" anchor="ctr"/>
+            <a:lstStyle/>
+            <a:p>
+              <a:pPr algn="ctr"/>
+              <a:endParaRPr lang="en-CN">
+                <a:solidFill>
+                  <a:schemeClr val="tx1"/>
+                </a:solidFill>
+              </a:endParaRPr>
+            </a:p>
+          </p:txBody>
+        </p:sp>
+        <p:sp>
+          <p:nvSpPr>
+            <p:cNvPr id="9" name="Cross 8">
+              <a:extLst>
+                <a:ext uri="{FF2B5EF4-FFF2-40B4-BE49-F238E27FC236}">
+                  <a16:creationId xmlns:a16="http://schemas.microsoft.com/office/drawing/2014/main" id="{F0327793-F9A8-97A3-CF62-096D5FAFD72C}"/>
+                </a:ext>
+              </a:extLst>
+            </p:cNvPr>
+            <p:cNvSpPr/>
+            <p:nvPr/>
+          </p:nvSpPr>
+          <p:spPr>
+            <a:xfrm>
+              <a:off x="1747442" y="2225162"/>
+              <a:ext cx="180000" cy="180000"/>
+            </a:xfrm>
+            <a:prstGeom prst="plus">
+              <a:avLst>
+                <a:gd name="adj" fmla="val 33021"/>
+              </a:avLst>
+            </a:prstGeom>
+            <a:solidFill>
+              <a:schemeClr val="tx1"/>
+            </a:solidFill>
+            <a:ln>
+              <a:noFill/>
+            </a:ln>
+          </p:spPr>
+          <p:style>
+            <a:lnRef idx="2">
+              <a:schemeClr val="accent1">
+                <a:shade val="50000"/>
+              </a:schemeClr>
+            </a:lnRef>
+            <a:fillRef idx="1">
+              <a:schemeClr val="accent1"/>
+            </a:fillRef>
+            <a:effectRef idx="0">
+              <a:schemeClr val="accent1"/>
+            </a:effectRef>
+            <a:fontRef idx="minor">
+              <a:schemeClr val="lt1"/>
+            </a:fontRef>
+          </p:style>
+          <p:txBody>
+            <a:bodyPr rtlCol="0" anchor="ctr"/>
+            <a:lstStyle/>
+            <a:p>
+              <a:pPr algn="ctr"/>
+              <a:endParaRPr lang="en-CN">
+                <a:solidFill>
+                  <a:schemeClr val="tx1"/>
+                </a:solidFill>
+              </a:endParaRPr>
+            </a:p>
+          </p:txBody>
+        </p:sp>
       </p:grpSp>
-      <p:sp>
-        <p:nvSpPr>
-          <p:cNvPr id="4" name="Cross 3">
-            <a:extLst>
-              <a:ext uri="{FF2B5EF4-FFF2-40B4-BE49-F238E27FC236}">
-                <a16:creationId xmlns:a16="http://schemas.microsoft.com/office/drawing/2014/main" id="{E66C406D-8882-3D11-1F95-3D0CC42825AA}"/>
-              </a:ext>
-            </a:extLst>
-          </p:cNvPr>
-          <p:cNvSpPr/>
-          <p:nvPr/>
-        </p:nvSpPr>
-        <p:spPr>
-          <a:xfrm>
-            <a:off x="6123910" y="2207059"/>
-            <a:ext cx="180000" cy="180000"/>
-          </a:xfrm>
-          <a:prstGeom prst="plus">
-            <a:avLst>
-              <a:gd name="adj" fmla="val 33021"/>
-            </a:avLst>
-          </a:prstGeom>
-          <a:solidFill>
-            <a:schemeClr val="tx1"/>
-          </a:solidFill>
-          <a:ln>
-            <a:noFill/>
-          </a:ln>
-        </p:spPr>
-        <p:style>
-          <a:lnRef idx="2">
-            <a:schemeClr val="accent1">
-              <a:shade val="50000"/>
-            </a:schemeClr>
-          </a:lnRef>
-          <a:fillRef idx="1">
-            <a:schemeClr val="accent1"/>
-          </a:fillRef>
-          <a:effectRef idx="0">
-            <a:schemeClr val="accent1"/>
-          </a:effectRef>
-          <a:fontRef idx="minor">
-            <a:schemeClr val="lt1"/>
-          </a:fontRef>
-        </p:style>
-        <p:txBody>
-          <a:bodyPr rtlCol="0" anchor="ctr"/>
-          <a:lstStyle/>
-          <a:p>
-            <a:pPr algn="ctr"/>
-            <a:endParaRPr lang="en-CN">
-              <a:solidFill>
-                <a:schemeClr val="tx1"/>
-              </a:solidFill>
-            </a:endParaRPr>
-          </a:p>
-        </p:txBody>
-      </p:sp>
-      <p:sp>
-        <p:nvSpPr>
-          <p:cNvPr id="7" name="Cross 6">
-            <a:extLst>
-              <a:ext uri="{FF2B5EF4-FFF2-40B4-BE49-F238E27FC236}">
-                <a16:creationId xmlns:a16="http://schemas.microsoft.com/office/drawing/2014/main" id="{CBEE5D98-D7CC-D52C-FBF5-AC7899B9958A}"/>
-              </a:ext>
-            </a:extLst>
-          </p:cNvPr>
-          <p:cNvSpPr/>
-          <p:nvPr/>
-        </p:nvSpPr>
-        <p:spPr>
-          <a:xfrm>
-            <a:off x="7563221" y="2234994"/>
-            <a:ext cx="180000" cy="180000"/>
-          </a:xfrm>
-          <a:prstGeom prst="plus">
-            <a:avLst>
-              <a:gd name="adj" fmla="val 33021"/>
-            </a:avLst>
-          </a:prstGeom>
-          <a:solidFill>
-            <a:schemeClr val="tx1"/>
-          </a:solidFill>
-          <a:ln>
-            <a:noFill/>
-          </a:ln>
-        </p:spPr>
-        <p:style>
-          <a:lnRef idx="2">
-            <a:schemeClr val="accent1">
-              <a:shade val="50000"/>
-            </a:schemeClr>
-          </a:lnRef>
-          <a:fillRef idx="1">
-            <a:schemeClr val="accent1"/>
-          </a:fillRef>
-          <a:effectRef idx="0">
-            <a:schemeClr val="accent1"/>
-          </a:effectRef>
-          <a:fontRef idx="minor">
-            <a:schemeClr val="lt1"/>
-          </a:fontRef>
-        </p:style>
-        <p:txBody>
-          <a:bodyPr rtlCol="0" anchor="ctr"/>
-          <a:lstStyle/>
-          <a:p>
-            <a:pPr algn="ctr"/>
-            <a:endParaRPr lang="en-CN">
-              <a:solidFill>
-                <a:schemeClr val="tx1"/>
-              </a:solidFill>
-            </a:endParaRPr>
-          </a:p>
-        </p:txBody>
-      </p:sp>
-      <p:sp>
-        <p:nvSpPr>
-          <p:cNvPr id="9" name="Cross 8">
-            <a:extLst>
-              <a:ext uri="{FF2B5EF4-FFF2-40B4-BE49-F238E27FC236}">
-                <a16:creationId xmlns:a16="http://schemas.microsoft.com/office/drawing/2014/main" id="{F0327793-F9A8-97A3-CF62-096D5FAFD72C}"/>
-              </a:ext>
-            </a:extLst>
-          </p:cNvPr>
-          <p:cNvSpPr/>
-          <p:nvPr/>
-        </p:nvSpPr>
-        <p:spPr>
-          <a:xfrm>
-            <a:off x="1747442" y="2225162"/>
-            <a:ext cx="180000" cy="180000"/>
-          </a:xfrm>
-          <a:prstGeom prst="plus">
-            <a:avLst>
-              <a:gd name="adj" fmla="val 33021"/>
-            </a:avLst>
-          </a:prstGeom>
-          <a:solidFill>
-            <a:schemeClr val="tx1"/>
-          </a:solidFill>
-          <a:ln>
-            <a:noFill/>
-          </a:ln>
-        </p:spPr>
-        <p:style>
-          <a:lnRef idx="2">
-            <a:schemeClr val="accent1">
-              <a:shade val="50000"/>
-            </a:schemeClr>
-          </a:lnRef>
-          <a:fillRef idx="1">
-            <a:schemeClr val="accent1"/>
-          </a:fillRef>
-          <a:effectRef idx="0">
-            <a:schemeClr val="accent1"/>
-          </a:effectRef>
-          <a:fontRef idx="minor">
-            <a:schemeClr val="lt1"/>
-          </a:fontRef>
-        </p:style>
-        <p:txBody>
-          <a:bodyPr rtlCol="0" anchor="ctr"/>
-          <a:lstStyle/>
-          <a:p>
-            <a:pPr algn="ctr"/>
-            <a:endParaRPr lang="en-CN">
-              <a:solidFill>
-                <a:schemeClr val="tx1"/>
-              </a:solidFill>
-            </a:endParaRPr>
-          </a:p>
-        </p:txBody>
-      </p:sp>
     </p:spTree>
     <p:extLst>
       <p:ext uri="{BB962C8B-B14F-4D97-AF65-F5344CB8AC3E}">
@@ -9620,7 +9616,7 @@
             <a:prstGeom prst="straightConnector1">
               <a:avLst/>
             </a:prstGeom>
-            <a:ln w="25400">
+            <a:ln w="19050">
               <a:solidFill>
                 <a:schemeClr val="tx1"/>
               </a:solidFill>
@@ -10121,10 +10117,10 @@
       </p:grpSpPr>
       <p:grpSp>
         <p:nvGrpSpPr>
-          <p:cNvPr id="2" name="Group 1">
+          <p:cNvPr id="7" name="Group 6">
             <a:extLst>
               <a:ext uri="{FF2B5EF4-FFF2-40B4-BE49-F238E27FC236}">
-                <a16:creationId xmlns:a16="http://schemas.microsoft.com/office/drawing/2014/main" id="{6BC33E91-8195-359A-D016-1BC90569582D}"/>
+                <a16:creationId xmlns:a16="http://schemas.microsoft.com/office/drawing/2014/main" id="{D17C54BB-4B81-21F7-5131-8FA1325DC9ED}"/>
               </a:ext>
             </a:extLst>
           </p:cNvPr>
@@ -10133,10 +10129,10 @@
         </p:nvGrpSpPr>
         <p:grpSpPr>
           <a:xfrm>
-            <a:off x="2003503" y="2737758"/>
-            <a:ext cx="8487442" cy="1276350"/>
-            <a:chOff x="2003503" y="2737758"/>
-            <a:chExt cx="8487442" cy="1276350"/>
+            <a:off x="2003503" y="2688925"/>
+            <a:ext cx="8487442" cy="1325183"/>
+            <a:chOff x="2003503" y="2688925"/>
+            <a:chExt cx="8487442" cy="1325183"/>
           </a:xfrm>
         </p:grpSpPr>
         <p:grpSp>
@@ -10431,7 +10427,7 @@
             <a:prstGeom prst="straightConnector1">
               <a:avLst/>
             </a:prstGeom>
-            <a:ln w="25400">
+            <a:ln w="19050">
               <a:solidFill>
                 <a:schemeClr val="tx1"/>
               </a:solidFill>
@@ -10841,65 +10837,65 @@
             </p:txBody>
           </p:sp>
         </p:grpSp>
+        <p:sp>
+          <p:nvSpPr>
+            <p:cNvPr id="4" name="Cross 3">
+              <a:extLst>
+                <a:ext uri="{FF2B5EF4-FFF2-40B4-BE49-F238E27FC236}">
+                  <a16:creationId xmlns:a16="http://schemas.microsoft.com/office/drawing/2014/main" id="{AA4FD0A5-6D66-1CD9-D307-B545467CD15B}"/>
+                </a:ext>
+              </a:extLst>
+            </p:cNvPr>
+            <p:cNvSpPr/>
+            <p:nvPr/>
+          </p:nvSpPr>
+          <p:spPr>
+            <a:xfrm>
+              <a:off x="6673402" y="2688925"/>
+              <a:ext cx="180000" cy="180000"/>
+            </a:xfrm>
+            <a:prstGeom prst="plus">
+              <a:avLst>
+                <a:gd name="adj" fmla="val 33021"/>
+              </a:avLst>
+            </a:prstGeom>
+            <a:solidFill>
+              <a:schemeClr val="tx1"/>
+            </a:solidFill>
+            <a:ln>
+              <a:noFill/>
+            </a:ln>
+          </p:spPr>
+          <p:style>
+            <a:lnRef idx="2">
+              <a:schemeClr val="accent1">
+                <a:shade val="50000"/>
+              </a:schemeClr>
+            </a:lnRef>
+            <a:fillRef idx="1">
+              <a:schemeClr val="accent1"/>
+            </a:fillRef>
+            <a:effectRef idx="0">
+              <a:schemeClr val="accent1"/>
+            </a:effectRef>
+            <a:fontRef idx="minor">
+              <a:schemeClr val="lt1"/>
+            </a:fontRef>
+          </p:style>
+          <p:txBody>
+            <a:bodyPr rtlCol="0" anchor="ctr"/>
+            <a:lstStyle/>
+            <a:p>
+              <a:pPr algn="ctr"/>
+              <a:endParaRPr lang="en-CN">
+                <a:solidFill>
+                  <a:schemeClr val="tx1"/>
+                </a:solidFill>
+              </a:endParaRPr>
+            </a:p>
+          </p:txBody>
+        </p:sp>
       </p:grpSp>
-      <p:sp>
-        <p:nvSpPr>
-          <p:cNvPr id="4" name="Cross 3">
-            <a:extLst>
-              <a:ext uri="{FF2B5EF4-FFF2-40B4-BE49-F238E27FC236}">
-                <a16:creationId xmlns:a16="http://schemas.microsoft.com/office/drawing/2014/main" id="{AA4FD0A5-6D66-1CD9-D307-B545467CD15B}"/>
-              </a:ext>
-            </a:extLst>
-          </p:cNvPr>
-          <p:cNvSpPr/>
-          <p:nvPr/>
-        </p:nvSpPr>
-        <p:spPr>
-          <a:xfrm>
-            <a:off x="6673402" y="2688925"/>
-            <a:ext cx="180000" cy="180000"/>
-          </a:xfrm>
-          <a:prstGeom prst="plus">
-            <a:avLst>
-              <a:gd name="adj" fmla="val 33021"/>
-            </a:avLst>
-          </a:prstGeom>
-          <a:solidFill>
-            <a:schemeClr val="tx1"/>
-          </a:solidFill>
-          <a:ln>
-            <a:noFill/>
-          </a:ln>
-        </p:spPr>
-        <p:style>
-          <a:lnRef idx="2">
-            <a:schemeClr val="accent1">
-              <a:shade val="50000"/>
-            </a:schemeClr>
-          </a:lnRef>
-          <a:fillRef idx="1">
-            <a:schemeClr val="accent1"/>
-          </a:fillRef>
-          <a:effectRef idx="0">
-            <a:schemeClr val="accent1"/>
-          </a:effectRef>
-          <a:fontRef idx="minor">
-            <a:schemeClr val="lt1"/>
-          </a:fontRef>
-        </p:style>
-        <p:txBody>
-          <a:bodyPr rtlCol="0" anchor="ctr"/>
-          <a:lstStyle/>
-          <a:p>
-            <a:pPr algn="ctr"/>
-            <a:endParaRPr lang="en-CN">
-              <a:solidFill>
-                <a:schemeClr val="tx1"/>
-              </a:solidFill>
-            </a:endParaRPr>
-          </a:p>
-        </p:txBody>
-      </p:sp>
     </p:spTree>
     <p:extLst>
       <p:ext uri="{BB962C8B-B14F-4D97-AF65-F5344CB8AC3E}">
@@ -10932,10 +10928,10 @@
       </p:grpSpPr>
       <p:grpSp>
         <p:nvGrpSpPr>
-          <p:cNvPr id="2" name="Group 1">
+          <p:cNvPr id="9" name="Group 8">
             <a:extLst>
               <a:ext uri="{FF2B5EF4-FFF2-40B4-BE49-F238E27FC236}">
-                <a16:creationId xmlns:a16="http://schemas.microsoft.com/office/drawing/2014/main" id="{A8E8A805-4011-F060-8F01-3E8A793895C5}"/>
+                <a16:creationId xmlns:a16="http://schemas.microsoft.com/office/drawing/2014/main" id="{6F6CCAE4-34F3-BFD3-3EF9-7057885B1849}"/>
               </a:ext>
             </a:extLst>
           </p:cNvPr>
@@ -11225,7 +11221,7 @@
             <a:prstGeom prst="straightConnector1">
               <a:avLst/>
             </a:prstGeom>
-            <a:ln w="25400">
+            <a:ln w="19050">
               <a:solidFill>
                 <a:schemeClr val="tx1"/>
               </a:solidFill>
@@ -11589,123 +11585,123 @@
             </p:txBody>
           </p:sp>
         </p:grpSp>
+        <p:sp>
+          <p:nvSpPr>
+            <p:cNvPr id="4" name="Cross 3">
+              <a:extLst>
+                <a:ext uri="{FF2B5EF4-FFF2-40B4-BE49-F238E27FC236}">
+                  <a16:creationId xmlns:a16="http://schemas.microsoft.com/office/drawing/2014/main" id="{EFACD865-540B-3789-BD03-29C7FE8C86A6}"/>
+                </a:ext>
+              </a:extLst>
+            </p:cNvPr>
+            <p:cNvSpPr/>
+            <p:nvPr/>
+          </p:nvSpPr>
+          <p:spPr>
+            <a:xfrm>
+              <a:off x="6575079" y="2737758"/>
+              <a:ext cx="180000" cy="180000"/>
+            </a:xfrm>
+            <a:prstGeom prst="plus">
+              <a:avLst>
+                <a:gd name="adj" fmla="val 33021"/>
+              </a:avLst>
+            </a:prstGeom>
+            <a:solidFill>
+              <a:schemeClr val="tx1"/>
+            </a:solidFill>
+            <a:ln>
+              <a:noFill/>
+            </a:ln>
+          </p:spPr>
+          <p:style>
+            <a:lnRef idx="2">
+              <a:schemeClr val="accent1">
+                <a:shade val="50000"/>
+              </a:schemeClr>
+            </a:lnRef>
+            <a:fillRef idx="1">
+              <a:schemeClr val="accent1"/>
+            </a:fillRef>
+            <a:effectRef idx="0">
+              <a:schemeClr val="accent1"/>
+            </a:effectRef>
+            <a:fontRef idx="minor">
+              <a:schemeClr val="lt1"/>
+            </a:fontRef>
+          </p:style>
+          <p:txBody>
+            <a:bodyPr rtlCol="0" anchor="ctr"/>
+            <a:lstStyle/>
+            <a:p>
+              <a:pPr algn="ctr"/>
+              <a:endParaRPr lang="en-CN">
+                <a:solidFill>
+                  <a:schemeClr val="tx1"/>
+                </a:solidFill>
+              </a:endParaRPr>
+            </a:p>
+          </p:txBody>
+        </p:sp>
+        <p:sp>
+          <p:nvSpPr>
+            <p:cNvPr id="7" name="Cross 6">
+              <a:extLst>
+                <a:ext uri="{FF2B5EF4-FFF2-40B4-BE49-F238E27FC236}">
+                  <a16:creationId xmlns:a16="http://schemas.microsoft.com/office/drawing/2014/main" id="{CCB71F86-1551-6A2B-DF4E-83637C9E2677}"/>
+                </a:ext>
+              </a:extLst>
+            </p:cNvPr>
+            <p:cNvSpPr/>
+            <p:nvPr/>
+          </p:nvSpPr>
+          <p:spPr>
+            <a:xfrm>
+              <a:off x="2085252" y="2917758"/>
+              <a:ext cx="180000" cy="180000"/>
+            </a:xfrm>
+            <a:prstGeom prst="plus">
+              <a:avLst>
+                <a:gd name="adj" fmla="val 33021"/>
+              </a:avLst>
+            </a:prstGeom>
+            <a:solidFill>
+              <a:schemeClr val="tx1"/>
+            </a:solidFill>
+            <a:ln>
+              <a:noFill/>
+            </a:ln>
+          </p:spPr>
+          <p:style>
+            <a:lnRef idx="2">
+              <a:schemeClr val="accent1">
+                <a:shade val="50000"/>
+              </a:schemeClr>
+            </a:lnRef>
+            <a:fillRef idx="1">
+              <a:schemeClr val="accent1"/>
+            </a:fillRef>
+            <a:effectRef idx="0">
+              <a:schemeClr val="accent1"/>
+            </a:effectRef>
+            <a:fontRef idx="minor">
+              <a:schemeClr val="lt1"/>
+            </a:fontRef>
+          </p:style>
+          <p:txBody>
+            <a:bodyPr rtlCol="0" anchor="ctr"/>
+            <a:lstStyle/>
+            <a:p>
+              <a:pPr algn="ctr"/>
+              <a:endParaRPr lang="en-CN">
+                <a:solidFill>
+                  <a:schemeClr val="tx1"/>
+                </a:solidFill>
+              </a:endParaRPr>
+            </a:p>
+          </p:txBody>
+        </p:sp>
       </p:grpSp>
-      <p:sp>
-        <p:nvSpPr>
-          <p:cNvPr id="4" name="Cross 3">
-            <a:extLst>
-              <a:ext uri="{FF2B5EF4-FFF2-40B4-BE49-F238E27FC236}">
-                <a16:creationId xmlns:a16="http://schemas.microsoft.com/office/drawing/2014/main" id="{EFACD865-540B-3789-BD03-29C7FE8C86A6}"/>
-              </a:ext>
-            </a:extLst>
-          </p:cNvPr>
-          <p:cNvSpPr/>
-          <p:nvPr/>
-        </p:nvSpPr>
-        <p:spPr>
-          <a:xfrm>
-            <a:off x="6575079" y="2737758"/>
-            <a:ext cx="180000" cy="180000"/>
-          </a:xfrm>
-          <a:prstGeom prst="plus">
-            <a:avLst>
-              <a:gd name="adj" fmla="val 33021"/>
-            </a:avLst>
-          </a:prstGeom>
-          <a:solidFill>
-            <a:schemeClr val="tx1"/>
-          </a:solidFill>
-          <a:ln>
-            <a:noFill/>
-          </a:ln>
-        </p:spPr>
-        <p:style>
-          <a:lnRef idx="2">
-            <a:schemeClr val="accent1">
-              <a:shade val="50000"/>
-            </a:schemeClr>
-          </a:lnRef>
-          <a:fillRef idx="1">
-            <a:schemeClr val="accent1"/>
-          </a:fillRef>
-          <a:effectRef idx="0">
-            <a:schemeClr val="accent1"/>
-          </a:effectRef>
-          <a:fontRef idx="minor">
-            <a:schemeClr val="lt1"/>
-          </a:fontRef>
-        </p:style>
-        <p:txBody>
-          <a:bodyPr rtlCol="0" anchor="ctr"/>
-          <a:lstStyle/>
-          <a:p>
-            <a:pPr algn="ctr"/>
-            <a:endParaRPr lang="en-CN">
-              <a:solidFill>
-                <a:schemeClr val="tx1"/>
-              </a:solidFill>
-            </a:endParaRPr>
-          </a:p>
-        </p:txBody>
-      </p:sp>
-      <p:sp>
-        <p:nvSpPr>
-          <p:cNvPr id="7" name="Cross 6">
-            <a:extLst>
-              <a:ext uri="{FF2B5EF4-FFF2-40B4-BE49-F238E27FC236}">
-                <a16:creationId xmlns:a16="http://schemas.microsoft.com/office/drawing/2014/main" id="{CCB71F86-1551-6A2B-DF4E-83637C9E2677}"/>
-              </a:ext>
-            </a:extLst>
-          </p:cNvPr>
-          <p:cNvSpPr/>
-          <p:nvPr/>
-        </p:nvSpPr>
-        <p:spPr>
-          <a:xfrm>
-            <a:off x="2085252" y="2917758"/>
-            <a:ext cx="180000" cy="180000"/>
-          </a:xfrm>
-          <a:prstGeom prst="plus">
-            <a:avLst>
-              <a:gd name="adj" fmla="val 33021"/>
-            </a:avLst>
-          </a:prstGeom>
-          <a:solidFill>
-            <a:schemeClr val="tx1"/>
-          </a:solidFill>
-          <a:ln>
-            <a:noFill/>
-          </a:ln>
-        </p:spPr>
-        <p:style>
-          <a:lnRef idx="2">
-            <a:schemeClr val="accent1">
-              <a:shade val="50000"/>
-            </a:schemeClr>
-          </a:lnRef>
-          <a:fillRef idx="1">
-            <a:schemeClr val="accent1"/>
-          </a:fillRef>
-          <a:effectRef idx="0">
-            <a:schemeClr val="accent1"/>
-          </a:effectRef>
-          <a:fontRef idx="minor">
-            <a:schemeClr val="lt1"/>
-          </a:fontRef>
-        </p:style>
-        <p:txBody>
-          <a:bodyPr rtlCol="0" anchor="ctr"/>
-          <a:lstStyle/>
-          <a:p>
-            <a:pPr algn="ctr"/>
-            <a:endParaRPr lang="en-CN">
-              <a:solidFill>
-                <a:schemeClr val="tx1"/>
-              </a:solidFill>
-            </a:endParaRPr>
-          </a:p>
-        </p:txBody>
-      </p:sp>
     </p:spTree>
     <p:extLst>
       <p:ext uri="{BB962C8B-B14F-4D97-AF65-F5344CB8AC3E}">
@@ -11738,10 +11734,10 @@
       </p:grpSpPr>
       <p:grpSp>
         <p:nvGrpSpPr>
-          <p:cNvPr id="2" name="Group 1">
+          <p:cNvPr id="8" name="Group 7">
             <a:extLst>
               <a:ext uri="{FF2B5EF4-FFF2-40B4-BE49-F238E27FC236}">
-                <a16:creationId xmlns:a16="http://schemas.microsoft.com/office/drawing/2014/main" id="{9A97242E-F0B3-F80F-2830-863B0C559596}"/>
+                <a16:creationId xmlns:a16="http://schemas.microsoft.com/office/drawing/2014/main" id="{882CA3E6-EF37-B73D-B453-0B360DE5D8BE}"/>
               </a:ext>
             </a:extLst>
           </p:cNvPr>
@@ -12031,7 +12027,7 @@
             <a:prstGeom prst="straightConnector1">
               <a:avLst/>
             </a:prstGeom>
-            <a:ln w="25400">
+            <a:ln w="19050">
               <a:solidFill>
                 <a:schemeClr val="tx1"/>
               </a:solidFill>
@@ -12394,123 +12390,123 @@
             </p:txBody>
           </p:sp>
         </p:grpSp>
+        <p:sp>
+          <p:nvSpPr>
+            <p:cNvPr id="4" name="Cross 3">
+              <a:extLst>
+                <a:ext uri="{FF2B5EF4-FFF2-40B4-BE49-F238E27FC236}">
+                  <a16:creationId xmlns:a16="http://schemas.microsoft.com/office/drawing/2014/main" id="{BE35B54C-3653-6856-AAC1-4C29262540BA}"/>
+                </a:ext>
+              </a:extLst>
+            </p:cNvPr>
+            <p:cNvSpPr/>
+            <p:nvPr/>
+          </p:nvSpPr>
+          <p:spPr>
+            <a:xfrm>
+              <a:off x="6575079" y="2737758"/>
+              <a:ext cx="180000" cy="180000"/>
+            </a:xfrm>
+            <a:prstGeom prst="plus">
+              <a:avLst>
+                <a:gd name="adj" fmla="val 33021"/>
+              </a:avLst>
+            </a:prstGeom>
+            <a:solidFill>
+              <a:schemeClr val="tx1"/>
+            </a:solidFill>
+            <a:ln>
+              <a:noFill/>
+            </a:ln>
+          </p:spPr>
+          <p:style>
+            <a:lnRef idx="2">
+              <a:schemeClr val="accent1">
+                <a:shade val="50000"/>
+              </a:schemeClr>
+            </a:lnRef>
+            <a:fillRef idx="1">
+              <a:schemeClr val="accent1"/>
+            </a:fillRef>
+            <a:effectRef idx="0">
+              <a:schemeClr val="accent1"/>
+            </a:effectRef>
+            <a:fontRef idx="minor">
+              <a:schemeClr val="lt1"/>
+            </a:fontRef>
+          </p:style>
+          <p:txBody>
+            <a:bodyPr rtlCol="0" anchor="ctr"/>
+            <a:lstStyle/>
+            <a:p>
+              <a:pPr algn="ctr"/>
+              <a:endParaRPr lang="en-CN">
+                <a:solidFill>
+                  <a:schemeClr val="tx1"/>
+                </a:solidFill>
+              </a:endParaRPr>
+            </a:p>
+          </p:txBody>
+        </p:sp>
+        <p:sp>
+          <p:nvSpPr>
+            <p:cNvPr id="7" name="Cross 6">
+              <a:extLst>
+                <a:ext uri="{FF2B5EF4-FFF2-40B4-BE49-F238E27FC236}">
+                  <a16:creationId xmlns:a16="http://schemas.microsoft.com/office/drawing/2014/main" id="{4D81C3B3-5ED2-0845-EDB7-4FD5F3C8A947}"/>
+                </a:ext>
+              </a:extLst>
+            </p:cNvPr>
+            <p:cNvSpPr/>
+            <p:nvPr/>
+          </p:nvSpPr>
+          <p:spPr>
+            <a:xfrm>
+              <a:off x="2085252" y="2917758"/>
+              <a:ext cx="180000" cy="180000"/>
+            </a:xfrm>
+            <a:prstGeom prst="plus">
+              <a:avLst>
+                <a:gd name="adj" fmla="val 33021"/>
+              </a:avLst>
+            </a:prstGeom>
+            <a:solidFill>
+              <a:schemeClr val="tx1"/>
+            </a:solidFill>
+            <a:ln>
+              <a:noFill/>
+            </a:ln>
+          </p:spPr>
+          <p:style>
+            <a:lnRef idx="2">
+              <a:schemeClr val="accent1">
+                <a:shade val="50000"/>
+              </a:schemeClr>
+            </a:lnRef>
+            <a:fillRef idx="1">
+              <a:schemeClr val="accent1"/>
+            </a:fillRef>
+            <a:effectRef idx="0">
+              <a:schemeClr val="accent1"/>
+            </a:effectRef>
+            <a:fontRef idx="minor">
+              <a:schemeClr val="lt1"/>
+            </a:fontRef>
+          </p:style>
+          <p:txBody>
+            <a:bodyPr rtlCol="0" anchor="ctr"/>
+            <a:lstStyle/>
+            <a:p>
+              <a:pPr algn="ctr"/>
+              <a:endParaRPr lang="en-CN">
+                <a:solidFill>
+                  <a:schemeClr val="tx1"/>
+                </a:solidFill>
+              </a:endParaRPr>
+            </a:p>
+          </p:txBody>
+        </p:sp>
       </p:grpSp>
-      <p:sp>
-        <p:nvSpPr>
-          <p:cNvPr id="4" name="Cross 3">
-            <a:extLst>
-              <a:ext uri="{FF2B5EF4-FFF2-40B4-BE49-F238E27FC236}">
-                <a16:creationId xmlns:a16="http://schemas.microsoft.com/office/drawing/2014/main" id="{BE35B54C-3653-6856-AAC1-4C29262540BA}"/>
-              </a:ext>
-            </a:extLst>
-          </p:cNvPr>
-          <p:cNvSpPr/>
-          <p:nvPr/>
-        </p:nvSpPr>
-        <p:spPr>
-          <a:xfrm>
-            <a:off x="6575079" y="2737758"/>
-            <a:ext cx="180000" cy="180000"/>
-          </a:xfrm>
-          <a:prstGeom prst="plus">
-            <a:avLst>
-              <a:gd name="adj" fmla="val 33021"/>
-            </a:avLst>
-          </a:prstGeom>
-          <a:solidFill>
-            <a:schemeClr val="tx1"/>
-          </a:solidFill>
-          <a:ln>
-            <a:noFill/>
-          </a:ln>
-        </p:spPr>
-        <p:style>
-          <a:lnRef idx="2">
-            <a:schemeClr val="accent1">
-              <a:shade val="50000"/>
-            </a:schemeClr>
-          </a:lnRef>
-          <a:fillRef idx="1">
-            <a:schemeClr val="accent1"/>
-          </a:fillRef>
-          <a:effectRef idx="0">
-            <a:schemeClr val="accent1"/>
-          </a:effectRef>
-          <a:fontRef idx="minor">
-            <a:schemeClr val="lt1"/>
-          </a:fontRef>
-        </p:style>
-        <p:txBody>
-          <a:bodyPr rtlCol="0" anchor="ctr"/>
-          <a:lstStyle/>
-          <a:p>
-            <a:pPr algn="ctr"/>
-            <a:endParaRPr lang="en-CN">
-              <a:solidFill>
-                <a:schemeClr val="tx1"/>
-              </a:solidFill>
-            </a:endParaRPr>
-          </a:p>
-        </p:txBody>
-      </p:sp>
-      <p:sp>
-        <p:nvSpPr>
-          <p:cNvPr id="7" name="Cross 6">
-            <a:extLst>
-              <a:ext uri="{FF2B5EF4-FFF2-40B4-BE49-F238E27FC236}">
-                <a16:creationId xmlns:a16="http://schemas.microsoft.com/office/drawing/2014/main" id="{4D81C3B3-5ED2-0845-EDB7-4FD5F3C8A947}"/>
-              </a:ext>
-            </a:extLst>
-          </p:cNvPr>
-          <p:cNvSpPr/>
-          <p:nvPr/>
-        </p:nvSpPr>
-        <p:spPr>
-          <a:xfrm>
-            <a:off x="2085252" y="2917758"/>
-            <a:ext cx="180000" cy="180000"/>
-          </a:xfrm>
-          <a:prstGeom prst="plus">
-            <a:avLst>
-              <a:gd name="adj" fmla="val 33021"/>
-            </a:avLst>
-          </a:prstGeom>
-          <a:solidFill>
-            <a:schemeClr val="tx1"/>
-          </a:solidFill>
-          <a:ln>
-            <a:noFill/>
-          </a:ln>
-        </p:spPr>
-        <p:style>
-          <a:lnRef idx="2">
-            <a:schemeClr val="accent1">
-              <a:shade val="50000"/>
-            </a:schemeClr>
-          </a:lnRef>
-          <a:fillRef idx="1">
-            <a:schemeClr val="accent1"/>
-          </a:fillRef>
-          <a:effectRef idx="0">
-            <a:schemeClr val="accent1"/>
-          </a:effectRef>
-          <a:fontRef idx="minor">
-            <a:schemeClr val="lt1"/>
-          </a:fontRef>
-        </p:style>
-        <p:txBody>
-          <a:bodyPr rtlCol="0" anchor="ctr"/>
-          <a:lstStyle/>
-          <a:p>
-            <a:pPr algn="ctr"/>
-            <a:endParaRPr lang="en-CN">
-              <a:solidFill>
-                <a:schemeClr val="tx1"/>
-              </a:solidFill>
-            </a:endParaRPr>
-          </a:p>
-        </p:txBody>
-      </p:sp>
     </p:spTree>
     <p:extLst>
       <p:ext uri="{BB962C8B-B14F-4D97-AF65-F5344CB8AC3E}">
@@ -12543,10 +12539,10 @@
       </p:grpSpPr>
       <p:grpSp>
         <p:nvGrpSpPr>
-          <p:cNvPr id="4" name="Group 3">
+          <p:cNvPr id="8" name="Group 7">
             <a:extLst>
               <a:ext uri="{FF2B5EF4-FFF2-40B4-BE49-F238E27FC236}">
-                <a16:creationId xmlns:a16="http://schemas.microsoft.com/office/drawing/2014/main" id="{DDA8FBC4-CA9C-4841-432F-D684C0A1347D}"/>
+                <a16:creationId xmlns:a16="http://schemas.microsoft.com/office/drawing/2014/main" id="{F3431A2C-ADD4-45DA-332A-E93E49E74140}"/>
               </a:ext>
             </a:extLst>
           </p:cNvPr>
@@ -12555,10 +12551,10 @@
         </p:nvGrpSpPr>
         <p:grpSpPr>
           <a:xfrm>
-            <a:off x="1981200" y="2247425"/>
-            <a:ext cx="8472601" cy="1521012"/>
-            <a:chOff x="1981200" y="2247425"/>
-            <a:chExt cx="8472601" cy="1521012"/>
+            <a:off x="1981200" y="2876394"/>
+            <a:ext cx="8472601" cy="1532124"/>
+            <a:chOff x="1981200" y="2876394"/>
+            <a:chExt cx="8472601" cy="1532124"/>
           </a:xfrm>
         </p:grpSpPr>
         <p:grpSp>
@@ -12575,7 +12571,7 @@
           </p:nvGrpSpPr>
           <p:grpSpPr>
             <a:xfrm>
-              <a:off x="1981200" y="2364301"/>
+              <a:off x="1981200" y="3004382"/>
               <a:ext cx="2977350" cy="1064694"/>
               <a:chOff x="1488974" y="3906297"/>
               <a:chExt cx="1803118" cy="734665"/>
@@ -12802,7 +12798,7 @@
           </p:nvGrpSpPr>
           <p:grpSpPr>
             <a:xfrm>
-              <a:off x="7476452" y="2364299"/>
+              <a:off x="7476452" y="3004380"/>
               <a:ext cx="2977349" cy="1404138"/>
               <a:chOff x="9132407" y="3125108"/>
               <a:chExt cx="2302184" cy="968890"/>
@@ -13084,13 +13080,13 @@
           </p:nvCxnSpPr>
           <p:spPr>
             <a:xfrm>
-              <a:off x="4958550" y="2676138"/>
+              <a:off x="4958550" y="3316219"/>
               <a:ext cx="2517901" cy="3"/>
             </a:xfrm>
             <a:prstGeom prst="straightConnector1">
               <a:avLst/>
             </a:prstGeom>
-            <a:ln w="25400">
+            <a:ln w="19050">
               <a:solidFill>
                 <a:schemeClr val="tx1"/>
               </a:solidFill>
@@ -13127,7 +13123,7 @@
           </p:nvSpPr>
           <p:spPr>
             <a:xfrm>
-              <a:off x="5188809" y="2247425"/>
+              <a:off x="5188809" y="2887506"/>
               <a:ext cx="2057383" cy="338554"/>
             </a:xfrm>
             <a:prstGeom prst="rect">
@@ -13170,7 +13166,7 @@
           </p:nvSpPr>
           <p:spPr>
             <a:xfrm>
-              <a:off x="5070083" y="2766302"/>
+              <a:off x="5070083" y="3406383"/>
               <a:ext cx="2294832" cy="307777"/>
             </a:xfrm>
             <a:prstGeom prst="rect">
@@ -13227,123 +13223,123 @@
             </a:p>
           </p:txBody>
         </p:sp>
+        <p:sp>
+          <p:nvSpPr>
+            <p:cNvPr id="2" name="Cross 1">
+              <a:extLst>
+                <a:ext uri="{FF2B5EF4-FFF2-40B4-BE49-F238E27FC236}">
+                  <a16:creationId xmlns:a16="http://schemas.microsoft.com/office/drawing/2014/main" id="{2C92516A-FF90-A754-0835-287CDB73D16A}"/>
+                </a:ext>
+              </a:extLst>
+            </p:cNvPr>
+            <p:cNvSpPr/>
+            <p:nvPr/>
+          </p:nvSpPr>
+          <p:spPr>
+            <a:xfrm>
+              <a:off x="6535751" y="2876394"/>
+              <a:ext cx="180000" cy="180000"/>
+            </a:xfrm>
+            <a:prstGeom prst="plus">
+              <a:avLst>
+                <a:gd name="adj" fmla="val 33021"/>
+              </a:avLst>
+            </a:prstGeom>
+            <a:solidFill>
+              <a:schemeClr val="tx1"/>
+            </a:solidFill>
+            <a:ln>
+              <a:noFill/>
+            </a:ln>
+          </p:spPr>
+          <p:style>
+            <a:lnRef idx="2">
+              <a:schemeClr val="accent1">
+                <a:shade val="50000"/>
+              </a:schemeClr>
+            </a:lnRef>
+            <a:fillRef idx="1">
+              <a:schemeClr val="accent1"/>
+            </a:fillRef>
+            <a:effectRef idx="0">
+              <a:schemeClr val="accent1"/>
+            </a:effectRef>
+            <a:fontRef idx="minor">
+              <a:schemeClr val="lt1"/>
+            </a:fontRef>
+          </p:style>
+          <p:txBody>
+            <a:bodyPr rtlCol="0" anchor="ctr"/>
+            <a:lstStyle/>
+            <a:p>
+              <a:pPr algn="ctr"/>
+              <a:endParaRPr lang="en-CN">
+                <a:solidFill>
+                  <a:schemeClr val="tx1"/>
+                </a:solidFill>
+              </a:endParaRPr>
+            </a:p>
+          </p:txBody>
+        </p:sp>
+        <p:sp>
+          <p:nvSpPr>
+            <p:cNvPr id="7" name="Cross 6">
+              <a:extLst>
+                <a:ext uri="{FF2B5EF4-FFF2-40B4-BE49-F238E27FC236}">
+                  <a16:creationId xmlns:a16="http://schemas.microsoft.com/office/drawing/2014/main" id="{E28E2677-B5CC-E9CE-BDD2-8E9D216DCFC5}"/>
+                </a:ext>
+              </a:extLst>
+            </p:cNvPr>
+            <p:cNvSpPr/>
+            <p:nvPr/>
+          </p:nvSpPr>
+          <p:spPr>
+            <a:xfrm>
+              <a:off x="7561820" y="3066226"/>
+              <a:ext cx="180000" cy="180000"/>
+            </a:xfrm>
+            <a:prstGeom prst="plus">
+              <a:avLst>
+                <a:gd name="adj" fmla="val 33021"/>
+              </a:avLst>
+            </a:prstGeom>
+            <a:solidFill>
+              <a:schemeClr val="tx1"/>
+            </a:solidFill>
+            <a:ln>
+              <a:noFill/>
+            </a:ln>
+          </p:spPr>
+          <p:style>
+            <a:lnRef idx="2">
+              <a:schemeClr val="accent1">
+                <a:shade val="50000"/>
+              </a:schemeClr>
+            </a:lnRef>
+            <a:fillRef idx="1">
+              <a:schemeClr val="accent1"/>
+            </a:fillRef>
+            <a:effectRef idx="0">
+              <a:schemeClr val="accent1"/>
+            </a:effectRef>
+            <a:fontRef idx="minor">
+              <a:schemeClr val="lt1"/>
+            </a:fontRef>
+          </p:style>
+          <p:txBody>
+            <a:bodyPr rtlCol="0" anchor="ctr"/>
+            <a:lstStyle/>
+            <a:p>
+              <a:pPr algn="ctr"/>
+              <a:endParaRPr lang="en-CN">
+                <a:solidFill>
+                  <a:schemeClr val="tx1"/>
+                </a:solidFill>
+              </a:endParaRPr>
+            </a:p>
+          </p:txBody>
+        </p:sp>
       </p:grpSp>
-      <p:sp>
-        <p:nvSpPr>
-          <p:cNvPr id="2" name="Cross 1">
-            <a:extLst>
-              <a:ext uri="{FF2B5EF4-FFF2-40B4-BE49-F238E27FC236}">
-                <a16:creationId xmlns:a16="http://schemas.microsoft.com/office/drawing/2014/main" id="{2C92516A-FF90-A754-0835-287CDB73D16A}"/>
-              </a:ext>
-            </a:extLst>
-          </p:cNvPr>
-          <p:cNvSpPr/>
-          <p:nvPr/>
-        </p:nvSpPr>
-        <p:spPr>
-          <a:xfrm>
-            <a:off x="6535751" y="2236313"/>
-            <a:ext cx="180000" cy="180000"/>
-          </a:xfrm>
-          <a:prstGeom prst="plus">
-            <a:avLst>
-              <a:gd name="adj" fmla="val 33021"/>
-            </a:avLst>
-          </a:prstGeom>
-          <a:solidFill>
-            <a:schemeClr val="tx1"/>
-          </a:solidFill>
-          <a:ln>
-            <a:noFill/>
-          </a:ln>
-        </p:spPr>
-        <p:style>
-          <a:lnRef idx="2">
-            <a:schemeClr val="accent1">
-              <a:shade val="50000"/>
-            </a:schemeClr>
-          </a:lnRef>
-          <a:fillRef idx="1">
-            <a:schemeClr val="accent1"/>
-          </a:fillRef>
-          <a:effectRef idx="0">
-            <a:schemeClr val="accent1"/>
-          </a:effectRef>
-          <a:fontRef idx="minor">
-            <a:schemeClr val="lt1"/>
-          </a:fontRef>
-        </p:style>
-        <p:txBody>
-          <a:bodyPr rtlCol="0" anchor="ctr"/>
-          <a:lstStyle/>
-          <a:p>
-            <a:pPr algn="ctr"/>
-            <a:endParaRPr lang="en-CN">
-              <a:solidFill>
-                <a:schemeClr val="tx1"/>
-              </a:solidFill>
-            </a:endParaRPr>
-          </a:p>
-        </p:txBody>
-      </p:sp>
-      <p:sp>
-        <p:nvSpPr>
-          <p:cNvPr id="7" name="Cross 6">
-            <a:extLst>
-              <a:ext uri="{FF2B5EF4-FFF2-40B4-BE49-F238E27FC236}">
-                <a16:creationId xmlns:a16="http://schemas.microsoft.com/office/drawing/2014/main" id="{E28E2677-B5CC-E9CE-BDD2-8E9D216DCFC5}"/>
-              </a:ext>
-            </a:extLst>
-          </p:cNvPr>
-          <p:cNvSpPr/>
-          <p:nvPr/>
-        </p:nvSpPr>
-        <p:spPr>
-          <a:xfrm>
-            <a:off x="7561820" y="2426145"/>
-            <a:ext cx="180000" cy="180000"/>
-          </a:xfrm>
-          <a:prstGeom prst="plus">
-            <a:avLst>
-              <a:gd name="adj" fmla="val 33021"/>
-            </a:avLst>
-          </a:prstGeom>
-          <a:solidFill>
-            <a:schemeClr val="tx1"/>
-          </a:solidFill>
-          <a:ln>
-            <a:noFill/>
-          </a:ln>
-        </p:spPr>
-        <p:style>
-          <a:lnRef idx="2">
-            <a:schemeClr val="accent1">
-              <a:shade val="50000"/>
-            </a:schemeClr>
-          </a:lnRef>
-          <a:fillRef idx="1">
-            <a:schemeClr val="accent1"/>
-          </a:fillRef>
-          <a:effectRef idx="0">
-            <a:schemeClr val="accent1"/>
-          </a:effectRef>
-          <a:fontRef idx="minor">
-            <a:schemeClr val="lt1"/>
-          </a:fontRef>
-        </p:style>
-        <p:txBody>
-          <a:bodyPr rtlCol="0" anchor="ctr"/>
-          <a:lstStyle/>
-          <a:p>
-            <a:pPr algn="ctr"/>
-            <a:endParaRPr lang="en-CN">
-              <a:solidFill>
-                <a:schemeClr val="tx1"/>
-              </a:solidFill>
-            </a:endParaRPr>
-          </a:p>
-        </p:txBody>
-      </p:sp>
     </p:spTree>
     <p:extLst>
       <p:ext uri="{BB962C8B-B14F-4D97-AF65-F5344CB8AC3E}">
@@ -13376,10 +13372,10 @@
       </p:grpSpPr>
       <p:grpSp>
         <p:nvGrpSpPr>
-          <p:cNvPr id="2" name="Group 1">
+          <p:cNvPr id="8" name="Group 7">
             <a:extLst>
               <a:ext uri="{FF2B5EF4-FFF2-40B4-BE49-F238E27FC236}">
-                <a16:creationId xmlns:a16="http://schemas.microsoft.com/office/drawing/2014/main" id="{74A315EB-A0E3-8C7D-5149-B2A1EEA03A9A}"/>
+                <a16:creationId xmlns:a16="http://schemas.microsoft.com/office/drawing/2014/main" id="{CBF08C8C-D120-6F9C-0240-3F6845DBB350}"/>
               </a:ext>
             </a:extLst>
           </p:cNvPr>
@@ -13388,10 +13384,10 @@
         </p:nvGrpSpPr>
         <p:grpSpPr>
           <a:xfrm>
-            <a:off x="1852279" y="2790825"/>
-            <a:ext cx="8487442" cy="1276350"/>
-            <a:chOff x="2003503" y="2737758"/>
-            <a:chExt cx="8487442" cy="1276350"/>
+            <a:off x="1878405" y="2897885"/>
+            <a:ext cx="8487442" cy="1299920"/>
+            <a:chOff x="1878405" y="2897885"/>
+            <a:chExt cx="8487442" cy="1299920"/>
           </a:xfrm>
         </p:grpSpPr>
         <p:grpSp>
@@ -13408,7 +13404,7 @@
           </p:nvGrpSpPr>
           <p:grpSpPr>
             <a:xfrm>
-              <a:off x="2003503" y="2854630"/>
+              <a:off x="1878405" y="3038327"/>
               <a:ext cx="2977350" cy="1159478"/>
               <a:chOff x="1488974" y="3906297"/>
               <a:chExt cx="1803118" cy="800069"/>
@@ -13639,13 +13635,13 @@
           </p:nvCxnSpPr>
           <p:spPr>
             <a:xfrm flipV="1">
-              <a:off x="4980853" y="3161102"/>
+              <a:off x="4855755" y="3344799"/>
               <a:ext cx="2532742" cy="5369"/>
             </a:xfrm>
             <a:prstGeom prst="straightConnector1">
               <a:avLst/>
             </a:prstGeom>
-            <a:ln w="25400">
+            <a:ln w="19050">
               <a:solidFill>
                 <a:schemeClr val="tx1"/>
               </a:solidFill>
@@ -13682,7 +13678,7 @@
           </p:nvSpPr>
           <p:spPr>
             <a:xfrm>
-              <a:off x="5211112" y="2737758"/>
+              <a:off x="5086014" y="2921455"/>
               <a:ext cx="2057383" cy="338554"/>
             </a:xfrm>
             <a:prstGeom prst="rect">
@@ -13725,798 +13721,7 @@
           </p:nvSpPr>
           <p:spPr>
             <a:xfrm>
-              <a:off x="5092386" y="3256635"/>
-              <a:ext cx="2294832" cy="523220"/>
-            </a:xfrm>
-            <a:prstGeom prst="rect">
-              <a:avLst/>
-            </a:prstGeom>
-            <a:noFill/>
-          </p:spPr>
-          <p:txBody>
-            <a:bodyPr wrap="square" rtlCol="0">
-              <a:spAutoFit/>
-            </a:bodyPr>
-            <a:lstStyle/>
-            <a:p>
-              <a:pPr algn="ctr"/>
-              <a:r>
-                <a:rPr kumimoji="1" lang="en-US" altLang="zh-CN" sz="1400" dirty="0">
-                  <a:latin typeface="DengXian" panose="02010600030101010101" pitchFamily="2" charset="-122"/>
-                  <a:ea typeface="DengXian" panose="02010600030101010101" pitchFamily="2" charset="-122"/>
-                </a:rPr>
-                <a:t>timestamp</a:t>
-              </a:r>
-              <a:r>
-                <a:rPr kumimoji="1" lang="zh-CN" altLang="en-US" sz="1400" dirty="0">
-                  <a:latin typeface="DengXian" panose="02010600030101010101" pitchFamily="2" charset="-122"/>
-                  <a:ea typeface="DengXian" panose="02010600030101010101" pitchFamily="2" charset="-122"/>
-                </a:rPr>
-                <a:t> </a:t>
-              </a:r>
-              <a:r>
-                <a:rPr kumimoji="1" lang="en-US" altLang="zh-CN" sz="1400" dirty="0">
-                  <a:latin typeface="DengXian" panose="02010600030101010101" pitchFamily="2" charset="-122"/>
-                  <a:ea typeface="DengXian" panose="02010600030101010101" pitchFamily="2" charset="-122"/>
-                </a:rPr>
-                <a:t>&lt;-</a:t>
-              </a:r>
-              <a:r>
-                <a:rPr kumimoji="1" lang="zh-CN" altLang="en-US" sz="1400" dirty="0">
-                  <a:latin typeface="DengXian" panose="02010600030101010101" pitchFamily="2" charset="-122"/>
-                  <a:ea typeface="DengXian" panose="02010600030101010101" pitchFamily="2" charset="-122"/>
-                </a:rPr>
-                <a:t> </a:t>
-              </a:r>
-              <a:r>
-                <a:rPr kumimoji="1" lang="en-US" altLang="zh-CN" sz="1400" dirty="0" err="1">
-                  <a:latin typeface="DengXian" panose="02010600030101010101" pitchFamily="2" charset="-122"/>
-                  <a:ea typeface="DengXian" panose="02010600030101010101" pitchFamily="2" charset="-122"/>
-                </a:rPr>
-                <a:t>currentTime</a:t>
-              </a:r>
-              <a:endParaRPr kumimoji="1" lang="en-US" altLang="zh-CN" sz="1400" dirty="0">
-                <a:latin typeface="DengXian" panose="02010600030101010101" pitchFamily="2" charset="-122"/>
-                <a:ea typeface="DengXian" panose="02010600030101010101" pitchFamily="2" charset="-122"/>
-              </a:endParaRPr>
-            </a:p>
-            <a:p>
-              <a:pPr algn="ctr"/>
-              <a:r>
-                <a:rPr kumimoji="1" lang="en-US" altLang="zh-CN" sz="1400" dirty="0">
-                  <a:latin typeface="DengXian" panose="02010600030101010101" pitchFamily="2" charset="-122"/>
-                  <a:ea typeface="DengXian" panose="02010600030101010101" pitchFamily="2" charset="-122"/>
-                </a:rPr>
-                <a:t>amount</a:t>
-              </a:r>
-              <a:r>
-                <a:rPr kumimoji="1" lang="zh-CN" altLang="en-US" sz="1400" dirty="0">
-                  <a:latin typeface="DengXian" panose="02010600030101010101" pitchFamily="2" charset="-122"/>
-                  <a:ea typeface="DengXian" panose="02010600030101010101" pitchFamily="2" charset="-122"/>
-                </a:rPr>
-                <a:t> </a:t>
-              </a:r>
-              <a:r>
-                <a:rPr kumimoji="1" lang="en-US" altLang="zh-CN" sz="1400" dirty="0">
-                  <a:latin typeface="DengXian" panose="02010600030101010101" pitchFamily="2" charset="-122"/>
-                  <a:ea typeface="DengXian" panose="02010600030101010101" pitchFamily="2" charset="-122"/>
-                </a:rPr>
-                <a:t>&lt;-</a:t>
-              </a:r>
-              <a:r>
-                <a:rPr kumimoji="1" lang="zh-CN" altLang="en-US" sz="1400" dirty="0">
-                  <a:latin typeface="DengXian" panose="02010600030101010101" pitchFamily="2" charset="-122"/>
-                  <a:ea typeface="DengXian" panose="02010600030101010101" pitchFamily="2" charset="-122"/>
-                </a:rPr>
-                <a:t> </a:t>
-              </a:r>
-              <a:r>
-                <a:rPr kumimoji="1" lang="en-US" altLang="zh-CN" sz="1400" dirty="0">
-                  <a:latin typeface="DengXian" panose="02010600030101010101" pitchFamily="2" charset="-122"/>
-                  <a:ea typeface="DengXian" panose="02010600030101010101" pitchFamily="2" charset="-122"/>
-                </a:rPr>
-                <a:t>amount</a:t>
-              </a:r>
-            </a:p>
-          </p:txBody>
-        </p:sp>
-        <p:grpSp>
-          <p:nvGrpSpPr>
-            <p:cNvPr id="19" name="Group 18">
-              <a:extLst>
-                <a:ext uri="{FF2B5EF4-FFF2-40B4-BE49-F238E27FC236}">
-                  <a16:creationId xmlns:a16="http://schemas.microsoft.com/office/drawing/2014/main" id="{CB52BBC1-C4CE-8642-A108-879A9B82D3D7}"/>
-                </a:ext>
-              </a:extLst>
-            </p:cNvPr>
-            <p:cNvGrpSpPr/>
-            <p:nvPr/>
-          </p:nvGrpSpPr>
-          <p:grpSpPr>
-            <a:xfrm>
-              <a:off x="7513595" y="2849261"/>
-              <a:ext cx="2977350" cy="1159478"/>
-              <a:chOff x="1488974" y="3906297"/>
-              <a:chExt cx="1803118" cy="800069"/>
-            </a:xfrm>
-          </p:grpSpPr>
-          <p:sp>
-            <p:nvSpPr>
-              <p:cNvPr id="20" name="矩形 4">
-                <a:extLst>
-                  <a:ext uri="{FF2B5EF4-FFF2-40B4-BE49-F238E27FC236}">
-                    <a16:creationId xmlns:a16="http://schemas.microsoft.com/office/drawing/2014/main" id="{F1D97759-78F2-F74F-94A8-9E052A4A9460}"/>
-                  </a:ext>
-                </a:extLst>
-              </p:cNvPr>
-              <p:cNvSpPr/>
-              <p:nvPr/>
-            </p:nvSpPr>
-            <p:spPr>
-              <a:xfrm>
-                <a:off x="1488974" y="3906297"/>
-                <a:ext cx="1803118" cy="430356"/>
-              </a:xfrm>
-              <a:prstGeom prst="rect">
-                <a:avLst/>
-              </a:prstGeom>
-              <a:solidFill>
-                <a:schemeClr val="accent2">
-                  <a:lumMod val="60000"/>
-                  <a:lumOff val="40000"/>
-                </a:schemeClr>
-              </a:solidFill>
-              <a:ln w="25400">
-                <a:solidFill>
-                  <a:schemeClr val="tx1"/>
-                </a:solidFill>
-              </a:ln>
-            </p:spPr>
-            <p:style>
-              <a:lnRef idx="2">
-                <a:schemeClr val="accent2">
-                  <a:shade val="50000"/>
-                </a:schemeClr>
-              </a:lnRef>
-              <a:fillRef idx="1">
-                <a:schemeClr val="accent2"/>
-              </a:fillRef>
-              <a:effectRef idx="0">
-                <a:schemeClr val="accent2"/>
-              </a:effectRef>
-              <a:fontRef idx="minor">
-                <a:schemeClr val="lt1"/>
-              </a:fontRef>
-            </p:style>
-            <p:txBody>
-              <a:bodyPr rtlCol="0" anchor="ctr"/>
-              <a:lstStyle/>
-              <a:p>
-                <a:pPr algn="ctr"/>
-                <a:r>
-                  <a:rPr kumimoji="1" lang="en-US" altLang="zh-CN" b="1" dirty="0">
-                    <a:solidFill>
-                      <a:sysClr val="windowText" lastClr="000000"/>
-                    </a:solidFill>
-                  </a:rPr>
-                  <a:t>Loan</a:t>
-                </a:r>
-                <a:endParaRPr kumimoji="1" lang="zh-CN" altLang="en-US" sz="1600" b="1" dirty="0">
-                  <a:solidFill>
-                    <a:sysClr val="windowText" lastClr="000000"/>
-                  </a:solidFill>
-                </a:endParaRPr>
-              </a:p>
-            </p:txBody>
-          </p:sp>
-          <p:sp>
-            <p:nvSpPr>
-              <p:cNvPr id="25" name="矩形 5">
-                <a:extLst>
-                  <a:ext uri="{FF2B5EF4-FFF2-40B4-BE49-F238E27FC236}">
-                    <a16:creationId xmlns:a16="http://schemas.microsoft.com/office/drawing/2014/main" id="{D82F4FBE-796F-284B-BD68-423A9E362735}"/>
-                  </a:ext>
-                </a:extLst>
-              </p:cNvPr>
-              <p:cNvSpPr/>
-              <p:nvPr/>
-            </p:nvSpPr>
-            <p:spPr>
-              <a:xfrm>
-                <a:off x="1488974" y="4336653"/>
-                <a:ext cx="1803117" cy="369713"/>
-              </a:xfrm>
-              <a:prstGeom prst="rect">
-                <a:avLst/>
-              </a:prstGeom>
-              <a:noFill/>
-              <a:ln w="25400">
-                <a:solidFill>
-                  <a:schemeClr val="tx1"/>
-                </a:solidFill>
-              </a:ln>
-            </p:spPr>
-            <p:style>
-              <a:lnRef idx="2">
-                <a:schemeClr val="accent2">
-                  <a:shade val="50000"/>
-                </a:schemeClr>
-              </a:lnRef>
-              <a:fillRef idx="1">
-                <a:schemeClr val="accent2"/>
-              </a:fillRef>
-              <a:effectRef idx="0">
-                <a:schemeClr val="accent2"/>
-              </a:effectRef>
-              <a:fontRef idx="minor">
-                <a:schemeClr val="lt1"/>
-              </a:fontRef>
-            </p:style>
-            <p:txBody>
-              <a:bodyPr rtlCol="0" anchor="ctr"/>
-              <a:lstStyle/>
-              <a:p>
-                <a:pPr algn="ctr"/>
-                <a:r>
-                  <a:rPr kumimoji="1" lang="en-US" altLang="zh-CN" sz="1600" dirty="0">
-                    <a:solidFill>
-                      <a:sysClr val="windowText" lastClr="000000"/>
-                    </a:solidFill>
-                    <a:latin typeface="DengXian" panose="02010600030101010101" pitchFamily="2" charset="-122"/>
-                    <a:ea typeface="DengXian" panose="02010600030101010101" pitchFamily="2" charset="-122"/>
-                  </a:rPr>
-                  <a:t>id</a:t>
-                </a:r>
-                <a:r>
-                  <a:rPr kumimoji="1" lang="zh-CN" altLang="en-US" sz="1600" dirty="0">
-                    <a:solidFill>
-                      <a:sysClr val="windowText" lastClr="000000"/>
-                    </a:solidFill>
-                    <a:latin typeface="DengXian" panose="02010600030101010101" pitchFamily="2" charset="-122"/>
-                    <a:ea typeface="DengXian" panose="02010600030101010101" pitchFamily="2" charset="-122"/>
-                  </a:rPr>
-                  <a:t> </a:t>
-                </a:r>
-                <a:r>
-                  <a:rPr kumimoji="1" lang="en-US" altLang="zh-CN" sz="1600" dirty="0">
-                    <a:solidFill>
-                      <a:sysClr val="windowText" lastClr="000000"/>
-                    </a:solidFill>
-                    <a:latin typeface="DengXian" panose="02010600030101010101" pitchFamily="2" charset="-122"/>
-                    <a:ea typeface="DengXian" panose="02010600030101010101" pitchFamily="2" charset="-122"/>
-                  </a:rPr>
-                  <a:t>&lt;-</a:t>
-                </a:r>
-                <a:r>
-                  <a:rPr kumimoji="1" lang="zh-CN" altLang="en-US" sz="1600" dirty="0">
-                    <a:solidFill>
-                      <a:sysClr val="windowText" lastClr="000000"/>
-                    </a:solidFill>
-                    <a:latin typeface="DengXian" panose="02010600030101010101" pitchFamily="2" charset="-122"/>
-                    <a:ea typeface="DengXian" panose="02010600030101010101" pitchFamily="2" charset="-122"/>
-                  </a:rPr>
-                  <a:t> </a:t>
-                </a:r>
-                <a:r>
-                  <a:rPr kumimoji="1" lang="en-US" altLang="zh-CN" sz="1600" dirty="0" err="1">
-                    <a:solidFill>
-                      <a:sysClr val="windowText" lastClr="000000"/>
-                    </a:solidFill>
-                    <a:latin typeface="DengXian" panose="02010600030101010101" pitchFamily="2" charset="-122"/>
-                    <a:ea typeface="DengXian" panose="02010600030101010101" pitchFamily="2" charset="-122"/>
-                  </a:rPr>
-                  <a:t>loanId</a:t>
-                </a:r>
-                <a:endParaRPr kumimoji="1" lang="en-US" altLang="zh-CN" sz="1600" dirty="0">
-                  <a:solidFill>
-                    <a:sysClr val="windowText" lastClr="000000"/>
-                  </a:solidFill>
-                  <a:latin typeface="DengXian" panose="02010600030101010101" pitchFamily="2" charset="-122"/>
-                  <a:ea typeface="DengXian" panose="02010600030101010101" pitchFamily="2" charset="-122"/>
-                </a:endParaRPr>
-              </a:p>
-            </p:txBody>
-          </p:sp>
-        </p:grpSp>
-      </p:grpSp>
-      <p:sp>
-        <p:nvSpPr>
-          <p:cNvPr id="4" name="Cross 3">
-            <a:extLst>
-              <a:ext uri="{FF2B5EF4-FFF2-40B4-BE49-F238E27FC236}">
-                <a16:creationId xmlns:a16="http://schemas.microsoft.com/office/drawing/2014/main" id="{94A17D3B-E94A-0ED9-925A-2B1A9477FA5A}"/>
-              </a:ext>
-            </a:extLst>
-          </p:cNvPr>
-          <p:cNvSpPr/>
-          <p:nvPr/>
-        </p:nvSpPr>
-        <p:spPr>
-          <a:xfrm>
-            <a:off x="6486590" y="2767255"/>
-            <a:ext cx="180000" cy="180000"/>
-          </a:xfrm>
-          <a:prstGeom prst="plus">
-            <a:avLst>
-              <a:gd name="adj" fmla="val 33021"/>
-            </a:avLst>
-          </a:prstGeom>
-          <a:solidFill>
-            <a:schemeClr val="tx1"/>
-          </a:solidFill>
-          <a:ln>
-            <a:noFill/>
-          </a:ln>
-        </p:spPr>
-        <p:style>
-          <a:lnRef idx="2">
-            <a:schemeClr val="accent1">
-              <a:shade val="50000"/>
-            </a:schemeClr>
-          </a:lnRef>
-          <a:fillRef idx="1">
-            <a:schemeClr val="accent1"/>
-          </a:fillRef>
-          <a:effectRef idx="0">
-            <a:schemeClr val="accent1"/>
-          </a:effectRef>
-          <a:fontRef idx="minor">
-            <a:schemeClr val="lt1"/>
-          </a:fontRef>
-        </p:style>
-        <p:txBody>
-          <a:bodyPr rtlCol="0" anchor="ctr"/>
-          <a:lstStyle/>
-          <a:p>
-            <a:pPr algn="ctr"/>
-            <a:endParaRPr lang="en-CN">
-              <a:solidFill>
-                <a:schemeClr val="tx1"/>
-              </a:solidFill>
-            </a:endParaRPr>
-          </a:p>
-        </p:txBody>
-      </p:sp>
-      <p:sp>
-        <p:nvSpPr>
-          <p:cNvPr id="7" name="Cross 6">
-            <a:extLst>
-              <a:ext uri="{FF2B5EF4-FFF2-40B4-BE49-F238E27FC236}">
-                <a16:creationId xmlns:a16="http://schemas.microsoft.com/office/drawing/2014/main" id="{5A219355-574B-9392-FB7C-ADE9FDBCE4AC}"/>
-              </a:ext>
-            </a:extLst>
-          </p:cNvPr>
-          <p:cNvSpPr/>
-          <p:nvPr/>
-        </p:nvSpPr>
-        <p:spPr>
-          <a:xfrm>
-            <a:off x="7453667" y="2957087"/>
-            <a:ext cx="180000" cy="180000"/>
-          </a:xfrm>
-          <a:prstGeom prst="plus">
-            <a:avLst>
-              <a:gd name="adj" fmla="val 33021"/>
-            </a:avLst>
-          </a:prstGeom>
-          <a:solidFill>
-            <a:schemeClr val="tx1"/>
-          </a:solidFill>
-          <a:ln>
-            <a:noFill/>
-          </a:ln>
-        </p:spPr>
-        <p:style>
-          <a:lnRef idx="2">
-            <a:schemeClr val="accent1">
-              <a:shade val="50000"/>
-            </a:schemeClr>
-          </a:lnRef>
-          <a:fillRef idx="1">
-            <a:schemeClr val="accent1"/>
-          </a:fillRef>
-          <a:effectRef idx="0">
-            <a:schemeClr val="accent1"/>
-          </a:effectRef>
-          <a:fontRef idx="minor">
-            <a:schemeClr val="lt1"/>
-          </a:fontRef>
-        </p:style>
-        <p:txBody>
-          <a:bodyPr rtlCol="0" anchor="ctr"/>
-          <a:lstStyle/>
-          <a:p>
-            <a:pPr algn="ctr"/>
-            <a:endParaRPr lang="en-CN">
-              <a:solidFill>
-                <a:schemeClr val="tx1"/>
-              </a:solidFill>
-            </a:endParaRPr>
-          </a:p>
-        </p:txBody>
-      </p:sp>
-    </p:spTree>
-    <p:extLst>
-      <p:ext uri="{BB962C8B-B14F-4D97-AF65-F5344CB8AC3E}">
-        <p14:creationId xmlns:p14="http://schemas.microsoft.com/office/powerpoint/2010/main" val="33099864"/>
-      </p:ext>
-    </p:extLst>
-  </p:cSld>
-  <p:clrMapOvr>
-    <a:masterClrMapping/>
-  </p:clrMapOvr>
-</p:sld>
-</file>
-
-<file path=ppt/slides/slide9.xml><?xml version="1.0" encoding="utf-8"?>
-<p:sld xmlns:a="http://schemas.openxmlformats.org/drawingml/2006/main" xmlns:r="http://schemas.openxmlformats.org/officeDocument/2006/relationships" xmlns:p="http://schemas.openxmlformats.org/presentationml/2006/main">
-  <p:cSld>
-    <p:spTree>
-      <p:nvGrpSpPr>
-        <p:cNvPr id="1" name=""/>
-        <p:cNvGrpSpPr/>
-        <p:nvPr/>
-      </p:nvGrpSpPr>
-      <p:grpSpPr>
-        <a:xfrm>
-          <a:off x="0" y="0"/>
-          <a:ext cx="0" cy="0"/>
-          <a:chOff x="0" y="0"/>
-          <a:chExt cx="0" cy="0"/>
-        </a:xfrm>
-      </p:grpSpPr>
-      <p:grpSp>
-        <p:nvGrpSpPr>
-          <p:cNvPr id="2" name="Group 1">
-            <a:extLst>
-              <a:ext uri="{FF2B5EF4-FFF2-40B4-BE49-F238E27FC236}">
-                <a16:creationId xmlns:a16="http://schemas.microsoft.com/office/drawing/2014/main" id="{05C3A7B5-83CA-A947-0193-EF6CD621469B}"/>
-              </a:ext>
-            </a:extLst>
-          </p:cNvPr>
-          <p:cNvGrpSpPr/>
-          <p:nvPr/>
-        </p:nvGrpSpPr>
-        <p:grpSpPr>
-          <a:xfrm>
-            <a:off x="2003503" y="2737758"/>
-            <a:ext cx="8487442" cy="1276350"/>
-            <a:chOff x="2003503" y="2737758"/>
-            <a:chExt cx="8487442" cy="1276350"/>
-          </a:xfrm>
-        </p:grpSpPr>
-        <p:grpSp>
-          <p:nvGrpSpPr>
-            <p:cNvPr id="3" name="Group 2">
-              <a:extLst>
-                <a:ext uri="{FF2B5EF4-FFF2-40B4-BE49-F238E27FC236}">
-                  <a16:creationId xmlns:a16="http://schemas.microsoft.com/office/drawing/2014/main" id="{D543F2FB-A178-5C43-9632-9F2D7941D522}"/>
-                </a:ext>
-              </a:extLst>
-            </p:cNvPr>
-            <p:cNvGrpSpPr/>
-            <p:nvPr/>
-          </p:nvGrpSpPr>
-          <p:grpSpPr>
-            <a:xfrm>
-              <a:off x="2003503" y="2854630"/>
-              <a:ext cx="2977350" cy="1159478"/>
-              <a:chOff x="1488974" y="3906297"/>
-              <a:chExt cx="1803118" cy="800069"/>
-            </a:xfrm>
-          </p:grpSpPr>
-          <p:sp>
-            <p:nvSpPr>
-              <p:cNvPr id="5" name="矩形 4">
-                <a:extLst>
-                  <a:ext uri="{FF2B5EF4-FFF2-40B4-BE49-F238E27FC236}">
-                    <a16:creationId xmlns:a16="http://schemas.microsoft.com/office/drawing/2014/main" id="{4F7CE573-D2EE-B544-9AF9-A133E6C5E6B5}"/>
-                  </a:ext>
-                </a:extLst>
-              </p:cNvPr>
-              <p:cNvSpPr/>
-              <p:nvPr/>
-            </p:nvSpPr>
-            <p:spPr>
-              <a:xfrm>
-                <a:off x="1488974" y="3906297"/>
-                <a:ext cx="1803118" cy="430356"/>
-              </a:xfrm>
-              <a:prstGeom prst="rect">
-                <a:avLst/>
-              </a:prstGeom>
-              <a:solidFill>
-                <a:schemeClr val="accent5">
-                  <a:lumMod val="60000"/>
-                  <a:lumOff val="40000"/>
-                </a:schemeClr>
-              </a:solidFill>
-              <a:ln w="25400">
-                <a:solidFill>
-                  <a:schemeClr val="tx1"/>
-                </a:solidFill>
-              </a:ln>
-            </p:spPr>
-            <p:style>
-              <a:lnRef idx="2">
-                <a:schemeClr val="accent2">
-                  <a:shade val="50000"/>
-                </a:schemeClr>
-              </a:lnRef>
-              <a:fillRef idx="1">
-                <a:schemeClr val="accent2"/>
-              </a:fillRef>
-              <a:effectRef idx="0">
-                <a:schemeClr val="accent2"/>
-              </a:effectRef>
-              <a:fontRef idx="minor">
-                <a:schemeClr val="lt1"/>
-              </a:fontRef>
-            </p:style>
-            <p:txBody>
-              <a:bodyPr rtlCol="0" anchor="ctr"/>
-              <a:lstStyle/>
-              <a:p>
-                <a:pPr algn="ctr"/>
-                <a:r>
-                  <a:rPr kumimoji="1" lang="en-US" altLang="zh-CN" b="1" dirty="0">
-                    <a:solidFill>
-                      <a:sysClr val="windowText" lastClr="000000"/>
-                    </a:solidFill>
-                  </a:rPr>
-                  <a:t>acc:</a:t>
-                </a:r>
-                <a:r>
-                  <a:rPr kumimoji="1" lang="zh-CN" altLang="en-US" b="1" dirty="0">
-                    <a:solidFill>
-                      <a:sysClr val="windowText" lastClr="000000"/>
-                    </a:solidFill>
-                  </a:rPr>
-                  <a:t> </a:t>
-                </a:r>
-                <a:r>
-                  <a:rPr kumimoji="1" lang="en-US" altLang="zh-CN" dirty="0">
-                    <a:solidFill>
-                      <a:sysClr val="windowText" lastClr="000000"/>
-                    </a:solidFill>
-                  </a:rPr>
-                  <a:t>Account</a:t>
-                </a:r>
-                <a:endParaRPr kumimoji="1" lang="zh-CN" altLang="en-US" sz="1600" dirty="0">
-                  <a:solidFill>
-                    <a:sysClr val="windowText" lastClr="000000"/>
-                  </a:solidFill>
-                </a:endParaRPr>
-              </a:p>
-            </p:txBody>
-          </p:sp>
-          <p:sp>
-            <p:nvSpPr>
-              <p:cNvPr id="6" name="矩形 5">
-                <a:extLst>
-                  <a:ext uri="{FF2B5EF4-FFF2-40B4-BE49-F238E27FC236}">
-                    <a16:creationId xmlns:a16="http://schemas.microsoft.com/office/drawing/2014/main" id="{D9E4A41A-CB40-AC47-87AB-621C9DE49842}"/>
-                  </a:ext>
-                </a:extLst>
-              </p:cNvPr>
-              <p:cNvSpPr/>
-              <p:nvPr/>
-            </p:nvSpPr>
-            <p:spPr>
-              <a:xfrm>
-                <a:off x="1488974" y="4336653"/>
-                <a:ext cx="1803117" cy="369713"/>
-              </a:xfrm>
-              <a:prstGeom prst="rect">
-                <a:avLst/>
-              </a:prstGeom>
-              <a:noFill/>
-              <a:ln w="25400">
-                <a:solidFill>
-                  <a:schemeClr val="tx1"/>
-                </a:solidFill>
-              </a:ln>
-            </p:spPr>
-            <p:style>
-              <a:lnRef idx="2">
-                <a:schemeClr val="accent2">
-                  <a:shade val="50000"/>
-                </a:schemeClr>
-              </a:lnRef>
-              <a:fillRef idx="1">
-                <a:schemeClr val="accent2"/>
-              </a:fillRef>
-              <a:effectRef idx="0">
-                <a:schemeClr val="accent2"/>
-              </a:effectRef>
-              <a:fontRef idx="minor">
-                <a:schemeClr val="lt1"/>
-              </a:fontRef>
-            </p:style>
-            <p:txBody>
-              <a:bodyPr rtlCol="0" anchor="ctr"/>
-              <a:lstStyle/>
-              <a:p>
-                <a:pPr algn="ctr"/>
-                <a:r>
-                  <a:rPr kumimoji="1" lang="en-US" altLang="zh-CN" sz="1600" dirty="0" err="1">
-                    <a:solidFill>
-                      <a:sysClr val="windowText" lastClr="000000"/>
-                    </a:solidFill>
-                    <a:latin typeface="DengXian" panose="02010600030101010101" pitchFamily="2" charset="-122"/>
-                    <a:ea typeface="DengXian" panose="02010600030101010101" pitchFamily="2" charset="-122"/>
-                  </a:rPr>
-                  <a:t>acc.id</a:t>
-                </a:r>
-                <a:r>
-                  <a:rPr kumimoji="1" lang="zh-CN" altLang="en-US" sz="1600" dirty="0">
-                    <a:solidFill>
-                      <a:sysClr val="windowText" lastClr="000000"/>
-                    </a:solidFill>
-                    <a:latin typeface="DengXian" panose="02010600030101010101" pitchFamily="2" charset="-122"/>
-                    <a:ea typeface="DengXian" panose="02010600030101010101" pitchFamily="2" charset="-122"/>
-                  </a:rPr>
-                  <a:t> </a:t>
-                </a:r>
-                <a:r>
-                  <a:rPr kumimoji="1" lang="en-US" altLang="zh-CN" sz="1600" dirty="0">
-                    <a:solidFill>
-                      <a:sysClr val="windowText" lastClr="000000"/>
-                    </a:solidFill>
-                    <a:latin typeface="DengXian" panose="02010600030101010101" pitchFamily="2" charset="-122"/>
-                    <a:ea typeface="DengXian" panose="02010600030101010101" pitchFamily="2" charset="-122"/>
-                  </a:rPr>
-                  <a:t>=</a:t>
-                </a:r>
-                <a:r>
-                  <a:rPr kumimoji="1" lang="zh-CN" altLang="en-US" sz="1600" dirty="0">
-                    <a:solidFill>
-                      <a:sysClr val="windowText" lastClr="000000"/>
-                    </a:solidFill>
-                    <a:latin typeface="DengXian" panose="02010600030101010101" pitchFamily="2" charset="-122"/>
-                    <a:ea typeface="DengXian" panose="02010600030101010101" pitchFamily="2" charset="-122"/>
-                  </a:rPr>
-                  <a:t> </a:t>
-                </a:r>
-                <a:r>
-                  <a:rPr kumimoji="1" lang="en-US" altLang="zh-CN" sz="1600" dirty="0">
-                    <a:solidFill>
-                      <a:sysClr val="windowText" lastClr="000000"/>
-                    </a:solidFill>
-                    <a:latin typeface="DengXian" panose="02010600030101010101" pitchFamily="2" charset="-122"/>
-                    <a:ea typeface="DengXian" panose="02010600030101010101" pitchFamily="2" charset="-122"/>
-                  </a:rPr>
-                  <a:t>${</a:t>
-                </a:r>
-                <a:r>
-                  <a:rPr kumimoji="1" lang="en-US" altLang="zh-CN" sz="1600" dirty="0" err="1">
-                    <a:solidFill>
-                      <a:sysClr val="windowText" lastClr="000000"/>
-                    </a:solidFill>
-                    <a:latin typeface="DengXian" panose="02010600030101010101" pitchFamily="2" charset="-122"/>
-                    <a:ea typeface="DengXian" panose="02010600030101010101" pitchFamily="2" charset="-122"/>
-                  </a:rPr>
-                  <a:t>accountId</a:t>
-                </a:r>
-                <a:r>
-                  <a:rPr kumimoji="1" lang="en-US" altLang="zh-CN" sz="1600" dirty="0">
-                    <a:solidFill>
-                      <a:sysClr val="windowText" lastClr="000000"/>
-                    </a:solidFill>
-                    <a:latin typeface="DengXian" panose="02010600030101010101" pitchFamily="2" charset="-122"/>
-                    <a:ea typeface="DengXian" panose="02010600030101010101" pitchFamily="2" charset="-122"/>
-                  </a:rPr>
-                  <a:t>}</a:t>
-                </a:r>
-              </a:p>
-            </p:txBody>
-          </p:sp>
-        </p:grpSp>
-        <p:cxnSp>
-          <p:nvCxnSpPr>
-            <p:cNvPr id="24" name="直线箭头连接符 6" descr="jytjh">
-              <a:extLst>
-                <a:ext uri="{FF2B5EF4-FFF2-40B4-BE49-F238E27FC236}">
-                  <a16:creationId xmlns:a16="http://schemas.microsoft.com/office/drawing/2014/main" id="{3DA09880-1005-9344-94A5-98749DDEA913}"/>
-                </a:ext>
-              </a:extLst>
-            </p:cNvPr>
-            <p:cNvCxnSpPr>
-              <a:cxnSpLocks/>
-              <a:stCxn id="20" idx="1"/>
-              <a:endCxn id="5" idx="3"/>
-            </p:cNvCxnSpPr>
-            <p:nvPr/>
-          </p:nvCxnSpPr>
-          <p:spPr>
-            <a:xfrm flipH="1">
-              <a:off x="4980853" y="3161102"/>
-              <a:ext cx="2532742" cy="5369"/>
-            </a:xfrm>
-            <a:prstGeom prst="straightConnector1">
-              <a:avLst/>
-            </a:prstGeom>
-            <a:ln w="25400">
-              <a:solidFill>
-                <a:schemeClr val="tx1"/>
-              </a:solidFill>
-              <a:headEnd type="arrow" w="sm" len="lg"/>
-              <a:tailEnd type="none"/>
-            </a:ln>
-          </p:spPr>
-          <p:style>
-            <a:lnRef idx="1">
-              <a:schemeClr val="accent1"/>
-            </a:lnRef>
-            <a:fillRef idx="0">
-              <a:schemeClr val="accent1"/>
-            </a:fillRef>
-            <a:effectRef idx="0">
-              <a:schemeClr val="accent1"/>
-            </a:effectRef>
-            <a:fontRef idx="minor">
-              <a:schemeClr val="tx1"/>
-            </a:fontRef>
-          </p:style>
-        </p:cxnSp>
-        <p:sp>
-          <p:nvSpPr>
-            <p:cNvPr id="28" name="文本框 7">
-              <a:extLst>
-                <a:ext uri="{FF2B5EF4-FFF2-40B4-BE49-F238E27FC236}">
-                  <a16:creationId xmlns:a16="http://schemas.microsoft.com/office/drawing/2014/main" id="{6DE928EA-B974-BB48-AC67-2225429003BC}"/>
-                </a:ext>
-              </a:extLst>
-            </p:cNvPr>
-            <p:cNvSpPr txBox="1"/>
-            <p:nvPr/>
-          </p:nvSpPr>
-          <p:spPr>
-            <a:xfrm>
-              <a:off x="5211112" y="2737758"/>
-              <a:ext cx="2057383" cy="338554"/>
-            </a:xfrm>
-            <a:prstGeom prst="rect">
-              <a:avLst/>
-            </a:prstGeom>
-            <a:noFill/>
-          </p:spPr>
-          <p:txBody>
-            <a:bodyPr wrap="square" rtlCol="0">
-              <a:spAutoFit/>
-            </a:bodyPr>
-            <a:lstStyle/>
-            <a:p>
-              <a:pPr algn="ctr"/>
-              <a:r>
-                <a:rPr kumimoji="1" lang="en-US" altLang="zh-CN" sz="1600" b="1" dirty="0">
-                  <a:latin typeface="DengXian" panose="02010600030101010101" pitchFamily="2" charset="-122"/>
-                  <a:ea typeface="DengXian" panose="02010600030101010101" pitchFamily="2" charset="-122"/>
-                </a:rPr>
-                <a:t>repay</a:t>
-              </a:r>
-              <a:endParaRPr kumimoji="1" lang="en-US" altLang="zh-CN" sz="1600" dirty="0">
-                <a:latin typeface="DengXian" panose="02010600030101010101" pitchFamily="2" charset="-122"/>
-                <a:ea typeface="DengXian" panose="02010600030101010101" pitchFamily="2" charset="-122"/>
-              </a:endParaRPr>
-            </a:p>
-          </p:txBody>
-        </p:sp>
-        <p:sp>
-          <p:nvSpPr>
-            <p:cNvPr id="32" name="文本框 7">
-              <a:extLst>
-                <a:ext uri="{FF2B5EF4-FFF2-40B4-BE49-F238E27FC236}">
-                  <a16:creationId xmlns:a16="http://schemas.microsoft.com/office/drawing/2014/main" id="{DAE693AC-E3B8-214C-BA31-8102FC1A750D}"/>
-                </a:ext>
-              </a:extLst>
-            </p:cNvPr>
-            <p:cNvSpPr txBox="1"/>
-            <p:nvPr/>
-          </p:nvSpPr>
-          <p:spPr>
-            <a:xfrm>
-              <a:off x="5092386" y="3256635"/>
+              <a:off x="4967288" y="3440332"/>
               <a:ext cx="2294832" cy="523220"/>
             </a:xfrm>
             <a:prstGeom prst="rect">
@@ -14625,7 +13830,7 @@
           </p:nvGrpSpPr>
           <p:grpSpPr>
             <a:xfrm>
-              <a:off x="7513595" y="2849261"/>
+              <a:off x="7388497" y="3032958"/>
               <a:ext cx="2977350" cy="1159478"/>
               <a:chOff x="1488974" y="3906297"/>
               <a:chExt cx="1803118" cy="800069"/>
@@ -14690,6 +13895,813 @@
                       <a:sysClr val="windowText" lastClr="000000"/>
                     </a:solidFill>
                   </a:rPr>
+                  <a:t>loan:</a:t>
+                </a:r>
+                <a:r>
+                  <a:rPr kumimoji="1" lang="zh-CN" altLang="en-US" b="1" dirty="0">
+                    <a:solidFill>
+                      <a:sysClr val="windowText" lastClr="000000"/>
+                    </a:solidFill>
+                  </a:rPr>
+                  <a:t> </a:t>
+                </a:r>
+                <a:r>
+                  <a:rPr kumimoji="1" lang="en-US" altLang="zh-CN" dirty="0">
+                    <a:solidFill>
+                      <a:sysClr val="windowText" lastClr="000000"/>
+                    </a:solidFill>
+                  </a:rPr>
+                  <a:t>Loan</a:t>
+                </a:r>
+                <a:endParaRPr kumimoji="1" lang="zh-CN" altLang="en-US" sz="1600" dirty="0">
+                  <a:solidFill>
+                    <a:sysClr val="windowText" lastClr="000000"/>
+                  </a:solidFill>
+                </a:endParaRPr>
+              </a:p>
+            </p:txBody>
+          </p:sp>
+          <p:sp>
+            <p:nvSpPr>
+              <p:cNvPr id="25" name="矩形 5">
+                <a:extLst>
+                  <a:ext uri="{FF2B5EF4-FFF2-40B4-BE49-F238E27FC236}">
+                    <a16:creationId xmlns:a16="http://schemas.microsoft.com/office/drawing/2014/main" id="{D82F4FBE-796F-284B-BD68-423A9E362735}"/>
+                  </a:ext>
+                </a:extLst>
+              </p:cNvPr>
+              <p:cNvSpPr/>
+              <p:nvPr/>
+            </p:nvSpPr>
+            <p:spPr>
+              <a:xfrm>
+                <a:off x="1488974" y="4336653"/>
+                <a:ext cx="1803117" cy="369713"/>
+              </a:xfrm>
+              <a:prstGeom prst="rect">
+                <a:avLst/>
+              </a:prstGeom>
+              <a:noFill/>
+              <a:ln w="25400">
+                <a:solidFill>
+                  <a:schemeClr val="tx1"/>
+                </a:solidFill>
+              </a:ln>
+            </p:spPr>
+            <p:style>
+              <a:lnRef idx="2">
+                <a:schemeClr val="accent2">
+                  <a:shade val="50000"/>
+                </a:schemeClr>
+              </a:lnRef>
+              <a:fillRef idx="1">
+                <a:schemeClr val="accent2"/>
+              </a:fillRef>
+              <a:effectRef idx="0">
+                <a:schemeClr val="accent2"/>
+              </a:effectRef>
+              <a:fontRef idx="minor">
+                <a:schemeClr val="lt1"/>
+              </a:fontRef>
+            </p:style>
+            <p:txBody>
+              <a:bodyPr rtlCol="0" anchor="ctr"/>
+              <a:lstStyle/>
+              <a:p>
+                <a:pPr algn="ctr"/>
+                <a:r>
+                  <a:rPr kumimoji="1" lang="en-US" altLang="zh-CN" sz="1600" dirty="0">
+                    <a:solidFill>
+                      <a:sysClr val="windowText" lastClr="000000"/>
+                    </a:solidFill>
+                    <a:latin typeface="DengXian" panose="02010600030101010101" pitchFamily="2" charset="-122"/>
+                    <a:ea typeface="DengXian" panose="02010600030101010101" pitchFamily="2" charset="-122"/>
+                  </a:rPr>
+                  <a:t>id</a:t>
+                </a:r>
+                <a:r>
+                  <a:rPr kumimoji="1" lang="zh-CN" altLang="en-US" sz="1600" dirty="0">
+                    <a:solidFill>
+                      <a:sysClr val="windowText" lastClr="000000"/>
+                    </a:solidFill>
+                    <a:latin typeface="DengXian" panose="02010600030101010101" pitchFamily="2" charset="-122"/>
+                    <a:ea typeface="DengXian" panose="02010600030101010101" pitchFamily="2" charset="-122"/>
+                  </a:rPr>
+                  <a:t> </a:t>
+                </a:r>
+                <a:r>
+                  <a:rPr kumimoji="1" lang="en-US" altLang="zh-CN" sz="1600" dirty="0">
+                    <a:solidFill>
+                      <a:sysClr val="windowText" lastClr="000000"/>
+                    </a:solidFill>
+                    <a:latin typeface="DengXian" panose="02010600030101010101" pitchFamily="2" charset="-122"/>
+                    <a:ea typeface="DengXian" panose="02010600030101010101" pitchFamily="2" charset="-122"/>
+                  </a:rPr>
+                  <a:t>&lt;-</a:t>
+                </a:r>
+                <a:r>
+                  <a:rPr kumimoji="1" lang="zh-CN" altLang="en-US" sz="1600" dirty="0">
+                    <a:solidFill>
+                      <a:sysClr val="windowText" lastClr="000000"/>
+                    </a:solidFill>
+                    <a:latin typeface="DengXian" panose="02010600030101010101" pitchFamily="2" charset="-122"/>
+                    <a:ea typeface="DengXian" panose="02010600030101010101" pitchFamily="2" charset="-122"/>
+                  </a:rPr>
+                  <a:t> </a:t>
+                </a:r>
+                <a:r>
+                  <a:rPr kumimoji="1" lang="en-US" altLang="zh-CN" sz="1600" dirty="0" err="1">
+                    <a:solidFill>
+                      <a:sysClr val="windowText" lastClr="000000"/>
+                    </a:solidFill>
+                    <a:latin typeface="DengXian" panose="02010600030101010101" pitchFamily="2" charset="-122"/>
+                    <a:ea typeface="DengXian" panose="02010600030101010101" pitchFamily="2" charset="-122"/>
+                  </a:rPr>
+                  <a:t>loanId</a:t>
+                </a:r>
+                <a:endParaRPr kumimoji="1" lang="en-US" altLang="zh-CN" sz="1600" dirty="0">
+                  <a:solidFill>
+                    <a:sysClr val="windowText" lastClr="000000"/>
+                  </a:solidFill>
+                  <a:latin typeface="DengXian" panose="02010600030101010101" pitchFamily="2" charset="-122"/>
+                  <a:ea typeface="DengXian" panose="02010600030101010101" pitchFamily="2" charset="-122"/>
+                </a:endParaRPr>
+              </a:p>
+            </p:txBody>
+          </p:sp>
+        </p:grpSp>
+        <p:sp>
+          <p:nvSpPr>
+            <p:cNvPr id="4" name="Cross 3">
+              <a:extLst>
+                <a:ext uri="{FF2B5EF4-FFF2-40B4-BE49-F238E27FC236}">
+                  <a16:creationId xmlns:a16="http://schemas.microsoft.com/office/drawing/2014/main" id="{94A17D3B-E94A-0ED9-925A-2B1A9477FA5A}"/>
+                </a:ext>
+              </a:extLst>
+            </p:cNvPr>
+            <p:cNvSpPr/>
+            <p:nvPr/>
+          </p:nvSpPr>
+          <p:spPr>
+            <a:xfrm>
+              <a:off x="6512716" y="2897885"/>
+              <a:ext cx="180000" cy="180000"/>
+            </a:xfrm>
+            <a:prstGeom prst="plus">
+              <a:avLst>
+                <a:gd name="adj" fmla="val 33021"/>
+              </a:avLst>
+            </a:prstGeom>
+            <a:solidFill>
+              <a:schemeClr val="tx1"/>
+            </a:solidFill>
+            <a:ln>
+              <a:noFill/>
+            </a:ln>
+          </p:spPr>
+          <p:style>
+            <a:lnRef idx="2">
+              <a:schemeClr val="accent1">
+                <a:shade val="50000"/>
+              </a:schemeClr>
+            </a:lnRef>
+            <a:fillRef idx="1">
+              <a:schemeClr val="accent1"/>
+            </a:fillRef>
+            <a:effectRef idx="0">
+              <a:schemeClr val="accent1"/>
+            </a:effectRef>
+            <a:fontRef idx="minor">
+              <a:schemeClr val="lt1"/>
+            </a:fontRef>
+          </p:style>
+          <p:txBody>
+            <a:bodyPr rtlCol="0" anchor="ctr"/>
+            <a:lstStyle/>
+            <a:p>
+              <a:pPr algn="ctr"/>
+              <a:endParaRPr lang="en-CN">
+                <a:solidFill>
+                  <a:schemeClr val="tx1"/>
+                </a:solidFill>
+              </a:endParaRPr>
+            </a:p>
+          </p:txBody>
+        </p:sp>
+        <p:sp>
+          <p:nvSpPr>
+            <p:cNvPr id="7" name="Cross 6">
+              <a:extLst>
+                <a:ext uri="{FF2B5EF4-FFF2-40B4-BE49-F238E27FC236}">
+                  <a16:creationId xmlns:a16="http://schemas.microsoft.com/office/drawing/2014/main" id="{5A219355-574B-9392-FB7C-ADE9FDBCE4AC}"/>
+                </a:ext>
+              </a:extLst>
+            </p:cNvPr>
+            <p:cNvSpPr/>
+            <p:nvPr/>
+          </p:nvSpPr>
+          <p:spPr>
+            <a:xfrm>
+              <a:off x="7479793" y="3087717"/>
+              <a:ext cx="180000" cy="180000"/>
+            </a:xfrm>
+            <a:prstGeom prst="plus">
+              <a:avLst>
+                <a:gd name="adj" fmla="val 33021"/>
+              </a:avLst>
+            </a:prstGeom>
+            <a:solidFill>
+              <a:schemeClr val="tx1"/>
+            </a:solidFill>
+            <a:ln>
+              <a:noFill/>
+            </a:ln>
+          </p:spPr>
+          <p:style>
+            <a:lnRef idx="2">
+              <a:schemeClr val="accent1">
+                <a:shade val="50000"/>
+              </a:schemeClr>
+            </a:lnRef>
+            <a:fillRef idx="1">
+              <a:schemeClr val="accent1"/>
+            </a:fillRef>
+            <a:effectRef idx="0">
+              <a:schemeClr val="accent1"/>
+            </a:effectRef>
+            <a:fontRef idx="minor">
+              <a:schemeClr val="lt1"/>
+            </a:fontRef>
+          </p:style>
+          <p:txBody>
+            <a:bodyPr rtlCol="0" anchor="ctr"/>
+            <a:lstStyle/>
+            <a:p>
+              <a:pPr algn="ctr"/>
+              <a:endParaRPr lang="en-CN">
+                <a:solidFill>
+                  <a:schemeClr val="tx1"/>
+                </a:solidFill>
+              </a:endParaRPr>
+            </a:p>
+          </p:txBody>
+        </p:sp>
+      </p:grpSp>
+    </p:spTree>
+    <p:extLst>
+      <p:ext uri="{BB962C8B-B14F-4D97-AF65-F5344CB8AC3E}">
+        <p14:creationId xmlns:p14="http://schemas.microsoft.com/office/powerpoint/2010/main" val="33099864"/>
+      </p:ext>
+    </p:extLst>
+  </p:cSld>
+  <p:clrMapOvr>
+    <a:masterClrMapping/>
+  </p:clrMapOvr>
+</p:sld>
+</file>
+
+<file path=ppt/slides/slide9.xml><?xml version="1.0" encoding="utf-8"?>
+<p:sld xmlns:a="http://schemas.openxmlformats.org/drawingml/2006/main" xmlns:r="http://schemas.openxmlformats.org/officeDocument/2006/relationships" xmlns:p="http://schemas.openxmlformats.org/presentationml/2006/main">
+  <p:cSld>
+    <p:spTree>
+      <p:nvGrpSpPr>
+        <p:cNvPr id="1" name=""/>
+        <p:cNvGrpSpPr/>
+        <p:nvPr/>
+      </p:nvGrpSpPr>
+      <p:grpSpPr>
+        <a:xfrm>
+          <a:off x="0" y="0"/>
+          <a:ext cx="0" cy="0"/>
+          <a:chOff x="0" y="0"/>
+          <a:chExt cx="0" cy="0"/>
+        </a:xfrm>
+      </p:grpSpPr>
+      <p:grpSp>
+        <p:nvGrpSpPr>
+          <p:cNvPr id="8" name="Group 7">
+            <a:extLst>
+              <a:ext uri="{FF2B5EF4-FFF2-40B4-BE49-F238E27FC236}">
+                <a16:creationId xmlns:a16="http://schemas.microsoft.com/office/drawing/2014/main" id="{42099A22-0AF1-084D-7874-17BE566DE353}"/>
+              </a:ext>
+            </a:extLst>
+          </p:cNvPr>
+          <p:cNvGrpSpPr/>
+          <p:nvPr/>
+        </p:nvGrpSpPr>
+        <p:grpSpPr>
+          <a:xfrm>
+            <a:off x="1833684" y="2985955"/>
+            <a:ext cx="8487442" cy="1276350"/>
+            <a:chOff x="1833684" y="2985955"/>
+            <a:chExt cx="8487442" cy="1276350"/>
+          </a:xfrm>
+        </p:grpSpPr>
+        <p:grpSp>
+          <p:nvGrpSpPr>
+            <p:cNvPr id="3" name="Group 2">
+              <a:extLst>
+                <a:ext uri="{FF2B5EF4-FFF2-40B4-BE49-F238E27FC236}">
+                  <a16:creationId xmlns:a16="http://schemas.microsoft.com/office/drawing/2014/main" id="{D543F2FB-A178-5C43-9632-9F2D7941D522}"/>
+                </a:ext>
+              </a:extLst>
+            </p:cNvPr>
+            <p:cNvGrpSpPr/>
+            <p:nvPr/>
+          </p:nvGrpSpPr>
+          <p:grpSpPr>
+            <a:xfrm>
+              <a:off x="1833684" y="3102827"/>
+              <a:ext cx="2977350" cy="1159478"/>
+              <a:chOff x="1488974" y="3906297"/>
+              <a:chExt cx="1803118" cy="800069"/>
+            </a:xfrm>
+          </p:grpSpPr>
+          <p:sp>
+            <p:nvSpPr>
+              <p:cNvPr id="5" name="矩形 4">
+                <a:extLst>
+                  <a:ext uri="{FF2B5EF4-FFF2-40B4-BE49-F238E27FC236}">
+                    <a16:creationId xmlns:a16="http://schemas.microsoft.com/office/drawing/2014/main" id="{4F7CE573-D2EE-B544-9AF9-A133E6C5E6B5}"/>
+                  </a:ext>
+                </a:extLst>
+              </p:cNvPr>
+              <p:cNvSpPr/>
+              <p:nvPr/>
+            </p:nvSpPr>
+            <p:spPr>
+              <a:xfrm>
+                <a:off x="1488974" y="3906297"/>
+                <a:ext cx="1803118" cy="430356"/>
+              </a:xfrm>
+              <a:prstGeom prst="rect">
+                <a:avLst/>
+              </a:prstGeom>
+              <a:solidFill>
+                <a:schemeClr val="accent5">
+                  <a:lumMod val="60000"/>
+                  <a:lumOff val="40000"/>
+                </a:schemeClr>
+              </a:solidFill>
+              <a:ln w="25400">
+                <a:solidFill>
+                  <a:schemeClr val="tx1"/>
+                </a:solidFill>
+              </a:ln>
+            </p:spPr>
+            <p:style>
+              <a:lnRef idx="2">
+                <a:schemeClr val="accent2">
+                  <a:shade val="50000"/>
+                </a:schemeClr>
+              </a:lnRef>
+              <a:fillRef idx="1">
+                <a:schemeClr val="accent2"/>
+              </a:fillRef>
+              <a:effectRef idx="0">
+                <a:schemeClr val="accent2"/>
+              </a:effectRef>
+              <a:fontRef idx="minor">
+                <a:schemeClr val="lt1"/>
+              </a:fontRef>
+            </p:style>
+            <p:txBody>
+              <a:bodyPr rtlCol="0" anchor="ctr"/>
+              <a:lstStyle/>
+              <a:p>
+                <a:pPr algn="ctr"/>
+                <a:r>
+                  <a:rPr kumimoji="1" lang="en-US" altLang="zh-CN" b="1" dirty="0">
+                    <a:solidFill>
+                      <a:sysClr val="windowText" lastClr="000000"/>
+                    </a:solidFill>
+                  </a:rPr>
+                  <a:t>acc:</a:t>
+                </a:r>
+                <a:r>
+                  <a:rPr kumimoji="1" lang="zh-CN" altLang="en-US" b="1" dirty="0">
+                    <a:solidFill>
+                      <a:sysClr val="windowText" lastClr="000000"/>
+                    </a:solidFill>
+                  </a:rPr>
+                  <a:t> </a:t>
+                </a:r>
+                <a:r>
+                  <a:rPr kumimoji="1" lang="en-US" altLang="zh-CN" dirty="0">
+                    <a:solidFill>
+                      <a:sysClr val="windowText" lastClr="000000"/>
+                    </a:solidFill>
+                  </a:rPr>
+                  <a:t>Account</a:t>
+                </a:r>
+                <a:endParaRPr kumimoji="1" lang="zh-CN" altLang="en-US" sz="1600" dirty="0">
+                  <a:solidFill>
+                    <a:sysClr val="windowText" lastClr="000000"/>
+                  </a:solidFill>
+                </a:endParaRPr>
+              </a:p>
+            </p:txBody>
+          </p:sp>
+          <p:sp>
+            <p:nvSpPr>
+              <p:cNvPr id="6" name="矩形 5">
+                <a:extLst>
+                  <a:ext uri="{FF2B5EF4-FFF2-40B4-BE49-F238E27FC236}">
+                    <a16:creationId xmlns:a16="http://schemas.microsoft.com/office/drawing/2014/main" id="{D9E4A41A-CB40-AC47-87AB-621C9DE49842}"/>
+                  </a:ext>
+                </a:extLst>
+              </p:cNvPr>
+              <p:cNvSpPr/>
+              <p:nvPr/>
+            </p:nvSpPr>
+            <p:spPr>
+              <a:xfrm>
+                <a:off x="1488974" y="4336653"/>
+                <a:ext cx="1803117" cy="369713"/>
+              </a:xfrm>
+              <a:prstGeom prst="rect">
+                <a:avLst/>
+              </a:prstGeom>
+              <a:noFill/>
+              <a:ln w="25400">
+                <a:solidFill>
+                  <a:schemeClr val="tx1"/>
+                </a:solidFill>
+              </a:ln>
+            </p:spPr>
+            <p:style>
+              <a:lnRef idx="2">
+                <a:schemeClr val="accent2">
+                  <a:shade val="50000"/>
+                </a:schemeClr>
+              </a:lnRef>
+              <a:fillRef idx="1">
+                <a:schemeClr val="accent2"/>
+              </a:fillRef>
+              <a:effectRef idx="0">
+                <a:schemeClr val="accent2"/>
+              </a:effectRef>
+              <a:fontRef idx="minor">
+                <a:schemeClr val="lt1"/>
+              </a:fontRef>
+            </p:style>
+            <p:txBody>
+              <a:bodyPr rtlCol="0" anchor="ctr"/>
+              <a:lstStyle/>
+              <a:p>
+                <a:pPr algn="ctr"/>
+                <a:r>
+                  <a:rPr kumimoji="1" lang="en-US" altLang="zh-CN" sz="1600" dirty="0" err="1">
+                    <a:solidFill>
+                      <a:sysClr val="windowText" lastClr="000000"/>
+                    </a:solidFill>
+                    <a:latin typeface="DengXian" panose="02010600030101010101" pitchFamily="2" charset="-122"/>
+                    <a:ea typeface="DengXian" panose="02010600030101010101" pitchFamily="2" charset="-122"/>
+                  </a:rPr>
+                  <a:t>acc.id</a:t>
+                </a:r>
+                <a:r>
+                  <a:rPr kumimoji="1" lang="zh-CN" altLang="en-US" sz="1600" dirty="0">
+                    <a:solidFill>
+                      <a:sysClr val="windowText" lastClr="000000"/>
+                    </a:solidFill>
+                    <a:latin typeface="DengXian" panose="02010600030101010101" pitchFamily="2" charset="-122"/>
+                    <a:ea typeface="DengXian" panose="02010600030101010101" pitchFamily="2" charset="-122"/>
+                  </a:rPr>
+                  <a:t> </a:t>
+                </a:r>
+                <a:r>
+                  <a:rPr kumimoji="1" lang="en-US" altLang="zh-CN" sz="1600" dirty="0">
+                    <a:solidFill>
+                      <a:sysClr val="windowText" lastClr="000000"/>
+                    </a:solidFill>
+                    <a:latin typeface="DengXian" panose="02010600030101010101" pitchFamily="2" charset="-122"/>
+                    <a:ea typeface="DengXian" panose="02010600030101010101" pitchFamily="2" charset="-122"/>
+                  </a:rPr>
+                  <a:t>=</a:t>
+                </a:r>
+                <a:r>
+                  <a:rPr kumimoji="1" lang="zh-CN" altLang="en-US" sz="1600" dirty="0">
+                    <a:solidFill>
+                      <a:sysClr val="windowText" lastClr="000000"/>
+                    </a:solidFill>
+                    <a:latin typeface="DengXian" panose="02010600030101010101" pitchFamily="2" charset="-122"/>
+                    <a:ea typeface="DengXian" panose="02010600030101010101" pitchFamily="2" charset="-122"/>
+                  </a:rPr>
+                  <a:t> </a:t>
+                </a:r>
+                <a:r>
+                  <a:rPr kumimoji="1" lang="en-US" altLang="zh-CN" sz="1600" dirty="0">
+                    <a:solidFill>
+                      <a:sysClr val="windowText" lastClr="000000"/>
+                    </a:solidFill>
+                    <a:latin typeface="DengXian" panose="02010600030101010101" pitchFamily="2" charset="-122"/>
+                    <a:ea typeface="DengXian" panose="02010600030101010101" pitchFamily="2" charset="-122"/>
+                  </a:rPr>
+                  <a:t>${</a:t>
+                </a:r>
+                <a:r>
+                  <a:rPr kumimoji="1" lang="en-US" altLang="zh-CN" sz="1600" dirty="0" err="1">
+                    <a:solidFill>
+                      <a:sysClr val="windowText" lastClr="000000"/>
+                    </a:solidFill>
+                    <a:latin typeface="DengXian" panose="02010600030101010101" pitchFamily="2" charset="-122"/>
+                    <a:ea typeface="DengXian" panose="02010600030101010101" pitchFamily="2" charset="-122"/>
+                  </a:rPr>
+                  <a:t>accountId</a:t>
+                </a:r>
+                <a:r>
+                  <a:rPr kumimoji="1" lang="en-US" altLang="zh-CN" sz="1600" dirty="0">
+                    <a:solidFill>
+                      <a:sysClr val="windowText" lastClr="000000"/>
+                    </a:solidFill>
+                    <a:latin typeface="DengXian" panose="02010600030101010101" pitchFamily="2" charset="-122"/>
+                    <a:ea typeface="DengXian" panose="02010600030101010101" pitchFamily="2" charset="-122"/>
+                  </a:rPr>
+                  <a:t>}</a:t>
+                </a:r>
+              </a:p>
+            </p:txBody>
+          </p:sp>
+        </p:grpSp>
+        <p:cxnSp>
+          <p:nvCxnSpPr>
+            <p:cNvPr id="24" name="直线箭头连接符 6" descr="jytjh">
+              <a:extLst>
+                <a:ext uri="{FF2B5EF4-FFF2-40B4-BE49-F238E27FC236}">
+                  <a16:creationId xmlns:a16="http://schemas.microsoft.com/office/drawing/2014/main" id="{3DA09880-1005-9344-94A5-98749DDEA913}"/>
+                </a:ext>
+              </a:extLst>
+            </p:cNvPr>
+            <p:cNvCxnSpPr>
+              <a:cxnSpLocks/>
+              <a:stCxn id="20" idx="1"/>
+              <a:endCxn id="5" idx="3"/>
+            </p:cNvCxnSpPr>
+            <p:nvPr/>
+          </p:nvCxnSpPr>
+          <p:spPr>
+            <a:xfrm flipH="1">
+              <a:off x="4811034" y="3409299"/>
+              <a:ext cx="2532742" cy="5369"/>
+            </a:xfrm>
+            <a:prstGeom prst="straightConnector1">
+              <a:avLst/>
+            </a:prstGeom>
+            <a:ln w="19050">
+              <a:solidFill>
+                <a:schemeClr val="tx1"/>
+              </a:solidFill>
+              <a:headEnd type="arrow" w="sm" len="lg"/>
+              <a:tailEnd type="none"/>
+            </a:ln>
+          </p:spPr>
+          <p:style>
+            <a:lnRef idx="1">
+              <a:schemeClr val="accent1"/>
+            </a:lnRef>
+            <a:fillRef idx="0">
+              <a:schemeClr val="accent1"/>
+            </a:fillRef>
+            <a:effectRef idx="0">
+              <a:schemeClr val="accent1"/>
+            </a:effectRef>
+            <a:fontRef idx="minor">
+              <a:schemeClr val="tx1"/>
+            </a:fontRef>
+          </p:style>
+        </p:cxnSp>
+        <p:sp>
+          <p:nvSpPr>
+            <p:cNvPr id="28" name="文本框 7">
+              <a:extLst>
+                <a:ext uri="{FF2B5EF4-FFF2-40B4-BE49-F238E27FC236}">
+                  <a16:creationId xmlns:a16="http://schemas.microsoft.com/office/drawing/2014/main" id="{6DE928EA-B974-BB48-AC67-2225429003BC}"/>
+                </a:ext>
+              </a:extLst>
+            </p:cNvPr>
+            <p:cNvSpPr txBox="1"/>
+            <p:nvPr/>
+          </p:nvSpPr>
+          <p:spPr>
+            <a:xfrm>
+              <a:off x="5041293" y="2985955"/>
+              <a:ext cx="2057383" cy="338554"/>
+            </a:xfrm>
+            <a:prstGeom prst="rect">
+              <a:avLst/>
+            </a:prstGeom>
+            <a:noFill/>
+          </p:spPr>
+          <p:txBody>
+            <a:bodyPr wrap="square" rtlCol="0">
+              <a:spAutoFit/>
+            </a:bodyPr>
+            <a:lstStyle/>
+            <a:p>
+              <a:pPr algn="ctr"/>
+              <a:r>
+                <a:rPr kumimoji="1" lang="en-US" altLang="zh-CN" sz="1600" b="1" dirty="0">
+                  <a:latin typeface="DengXian" panose="02010600030101010101" pitchFamily="2" charset="-122"/>
+                  <a:ea typeface="DengXian" panose="02010600030101010101" pitchFamily="2" charset="-122"/>
+                </a:rPr>
+                <a:t>repay</a:t>
+              </a:r>
+              <a:endParaRPr kumimoji="1" lang="en-US" altLang="zh-CN" sz="1600" dirty="0">
+                <a:latin typeface="DengXian" panose="02010600030101010101" pitchFamily="2" charset="-122"/>
+                <a:ea typeface="DengXian" panose="02010600030101010101" pitchFamily="2" charset="-122"/>
+              </a:endParaRPr>
+            </a:p>
+          </p:txBody>
+        </p:sp>
+        <p:sp>
+          <p:nvSpPr>
+            <p:cNvPr id="32" name="文本框 7">
+              <a:extLst>
+                <a:ext uri="{FF2B5EF4-FFF2-40B4-BE49-F238E27FC236}">
+                  <a16:creationId xmlns:a16="http://schemas.microsoft.com/office/drawing/2014/main" id="{DAE693AC-E3B8-214C-BA31-8102FC1A750D}"/>
+                </a:ext>
+              </a:extLst>
+            </p:cNvPr>
+            <p:cNvSpPr txBox="1"/>
+            <p:nvPr/>
+          </p:nvSpPr>
+          <p:spPr>
+            <a:xfrm>
+              <a:off x="4922567" y="3504832"/>
+              <a:ext cx="2294832" cy="523220"/>
+            </a:xfrm>
+            <a:prstGeom prst="rect">
+              <a:avLst/>
+            </a:prstGeom>
+            <a:noFill/>
+          </p:spPr>
+          <p:txBody>
+            <a:bodyPr wrap="square" rtlCol="0">
+              <a:spAutoFit/>
+            </a:bodyPr>
+            <a:lstStyle/>
+            <a:p>
+              <a:pPr algn="ctr"/>
+              <a:r>
+                <a:rPr kumimoji="1" lang="en-US" altLang="zh-CN" sz="1400" dirty="0">
+                  <a:latin typeface="DengXian" panose="02010600030101010101" pitchFamily="2" charset="-122"/>
+                  <a:ea typeface="DengXian" panose="02010600030101010101" pitchFamily="2" charset="-122"/>
+                </a:rPr>
+                <a:t>timestamp</a:t>
+              </a:r>
+              <a:r>
+                <a:rPr kumimoji="1" lang="zh-CN" altLang="en-US" sz="1400" dirty="0">
+                  <a:latin typeface="DengXian" panose="02010600030101010101" pitchFamily="2" charset="-122"/>
+                  <a:ea typeface="DengXian" panose="02010600030101010101" pitchFamily="2" charset="-122"/>
+                </a:rPr>
+                <a:t> </a:t>
+              </a:r>
+              <a:r>
+                <a:rPr kumimoji="1" lang="en-US" altLang="zh-CN" sz="1400" dirty="0">
+                  <a:latin typeface="DengXian" panose="02010600030101010101" pitchFamily="2" charset="-122"/>
+                  <a:ea typeface="DengXian" panose="02010600030101010101" pitchFamily="2" charset="-122"/>
+                </a:rPr>
+                <a:t>&lt;-</a:t>
+              </a:r>
+              <a:r>
+                <a:rPr kumimoji="1" lang="zh-CN" altLang="en-US" sz="1400" dirty="0">
+                  <a:latin typeface="DengXian" panose="02010600030101010101" pitchFamily="2" charset="-122"/>
+                  <a:ea typeface="DengXian" panose="02010600030101010101" pitchFamily="2" charset="-122"/>
+                </a:rPr>
+                <a:t> </a:t>
+              </a:r>
+              <a:r>
+                <a:rPr kumimoji="1" lang="en-US" altLang="zh-CN" sz="1400" dirty="0" err="1">
+                  <a:latin typeface="DengXian" panose="02010600030101010101" pitchFamily="2" charset="-122"/>
+                  <a:ea typeface="DengXian" panose="02010600030101010101" pitchFamily="2" charset="-122"/>
+                </a:rPr>
+                <a:t>currentTime</a:t>
+              </a:r>
+              <a:endParaRPr kumimoji="1" lang="en-US" altLang="zh-CN" sz="1400" dirty="0">
+                <a:latin typeface="DengXian" panose="02010600030101010101" pitchFamily="2" charset="-122"/>
+                <a:ea typeface="DengXian" panose="02010600030101010101" pitchFamily="2" charset="-122"/>
+              </a:endParaRPr>
+            </a:p>
+            <a:p>
+              <a:pPr algn="ctr"/>
+              <a:r>
+                <a:rPr kumimoji="1" lang="en-US" altLang="zh-CN" sz="1400" dirty="0">
+                  <a:latin typeface="DengXian" panose="02010600030101010101" pitchFamily="2" charset="-122"/>
+                  <a:ea typeface="DengXian" panose="02010600030101010101" pitchFamily="2" charset="-122"/>
+                </a:rPr>
+                <a:t>amount</a:t>
+              </a:r>
+              <a:r>
+                <a:rPr kumimoji="1" lang="zh-CN" altLang="en-US" sz="1400" dirty="0">
+                  <a:latin typeface="DengXian" panose="02010600030101010101" pitchFamily="2" charset="-122"/>
+                  <a:ea typeface="DengXian" panose="02010600030101010101" pitchFamily="2" charset="-122"/>
+                </a:rPr>
+                <a:t> </a:t>
+              </a:r>
+              <a:r>
+                <a:rPr kumimoji="1" lang="en-US" altLang="zh-CN" sz="1400" dirty="0">
+                  <a:latin typeface="DengXian" panose="02010600030101010101" pitchFamily="2" charset="-122"/>
+                  <a:ea typeface="DengXian" panose="02010600030101010101" pitchFamily="2" charset="-122"/>
+                </a:rPr>
+                <a:t>&lt;-</a:t>
+              </a:r>
+              <a:r>
+                <a:rPr kumimoji="1" lang="zh-CN" altLang="en-US" sz="1400" dirty="0">
+                  <a:latin typeface="DengXian" panose="02010600030101010101" pitchFamily="2" charset="-122"/>
+                  <a:ea typeface="DengXian" panose="02010600030101010101" pitchFamily="2" charset="-122"/>
+                </a:rPr>
+                <a:t> </a:t>
+              </a:r>
+              <a:r>
+                <a:rPr kumimoji="1" lang="en-US" altLang="zh-CN" sz="1400" dirty="0">
+                  <a:latin typeface="DengXian" panose="02010600030101010101" pitchFamily="2" charset="-122"/>
+                  <a:ea typeface="DengXian" panose="02010600030101010101" pitchFamily="2" charset="-122"/>
+                </a:rPr>
+                <a:t>amt</a:t>
+              </a:r>
+            </a:p>
+          </p:txBody>
+        </p:sp>
+        <p:grpSp>
+          <p:nvGrpSpPr>
+            <p:cNvPr id="19" name="Group 18">
+              <a:extLst>
+                <a:ext uri="{FF2B5EF4-FFF2-40B4-BE49-F238E27FC236}">
+                  <a16:creationId xmlns:a16="http://schemas.microsoft.com/office/drawing/2014/main" id="{CB52BBC1-C4CE-8642-A108-879A9B82D3D7}"/>
+                </a:ext>
+              </a:extLst>
+            </p:cNvPr>
+            <p:cNvGrpSpPr/>
+            <p:nvPr/>
+          </p:nvGrpSpPr>
+          <p:grpSpPr>
+            <a:xfrm>
+              <a:off x="7343776" y="3097458"/>
+              <a:ext cx="2977350" cy="1159478"/>
+              <a:chOff x="1488974" y="3906297"/>
+              <a:chExt cx="1803118" cy="800069"/>
+            </a:xfrm>
+          </p:grpSpPr>
+          <p:sp>
+            <p:nvSpPr>
+              <p:cNvPr id="20" name="矩形 4">
+                <a:extLst>
+                  <a:ext uri="{FF2B5EF4-FFF2-40B4-BE49-F238E27FC236}">
+                    <a16:creationId xmlns:a16="http://schemas.microsoft.com/office/drawing/2014/main" id="{F1D97759-78F2-F74F-94A8-9E052A4A9460}"/>
+                  </a:ext>
+                </a:extLst>
+              </p:cNvPr>
+              <p:cNvSpPr/>
+              <p:nvPr/>
+            </p:nvSpPr>
+            <p:spPr>
+              <a:xfrm>
+                <a:off x="1488974" y="3906297"/>
+                <a:ext cx="1803118" cy="430356"/>
+              </a:xfrm>
+              <a:prstGeom prst="rect">
+                <a:avLst/>
+              </a:prstGeom>
+              <a:solidFill>
+                <a:schemeClr val="accent2">
+                  <a:lumMod val="60000"/>
+                  <a:lumOff val="40000"/>
+                </a:schemeClr>
+              </a:solidFill>
+              <a:ln w="25400">
+                <a:solidFill>
+                  <a:schemeClr val="tx1"/>
+                </a:solidFill>
+              </a:ln>
+            </p:spPr>
+            <p:style>
+              <a:lnRef idx="2">
+                <a:schemeClr val="accent2">
+                  <a:shade val="50000"/>
+                </a:schemeClr>
+              </a:lnRef>
+              <a:fillRef idx="1">
+                <a:schemeClr val="accent2"/>
+              </a:fillRef>
+              <a:effectRef idx="0">
+                <a:schemeClr val="accent2"/>
+              </a:effectRef>
+              <a:fontRef idx="minor">
+                <a:schemeClr val="lt1"/>
+              </a:fontRef>
+            </p:style>
+            <p:txBody>
+              <a:bodyPr rtlCol="0" anchor="ctr"/>
+              <a:lstStyle/>
+              <a:p>
+                <a:pPr algn="ctr"/>
+                <a:r>
+                  <a:rPr kumimoji="1" lang="en-US" altLang="zh-CN" b="1" dirty="0">
+                    <a:solidFill>
+                      <a:sysClr val="windowText" lastClr="000000"/>
+                    </a:solidFill>
+                  </a:rPr>
                   <a:t>Loan</a:t>
                 </a:r>
                 <a:endParaRPr kumimoji="1" lang="zh-CN" altLang="en-US" sz="1600" b="1" dirty="0">
@@ -14809,123 +14821,123 @@
             </p:txBody>
           </p:sp>
         </p:grpSp>
+        <p:sp>
+          <p:nvSpPr>
+            <p:cNvPr id="4" name="Cross 3">
+              <a:extLst>
+                <a:ext uri="{FF2B5EF4-FFF2-40B4-BE49-F238E27FC236}">
+                  <a16:creationId xmlns:a16="http://schemas.microsoft.com/office/drawing/2014/main" id="{4189C50B-BC2C-45DB-08DB-CCF56FE4A1A2}"/>
+                </a:ext>
+              </a:extLst>
+            </p:cNvPr>
+            <p:cNvSpPr/>
+            <p:nvPr/>
+          </p:nvSpPr>
+          <p:spPr>
+            <a:xfrm>
+              <a:off x="6415094" y="3015452"/>
+              <a:ext cx="180000" cy="180000"/>
+            </a:xfrm>
+            <a:prstGeom prst="plus">
+              <a:avLst>
+                <a:gd name="adj" fmla="val 33021"/>
+              </a:avLst>
+            </a:prstGeom>
+            <a:solidFill>
+              <a:schemeClr val="tx1"/>
+            </a:solidFill>
+            <a:ln>
+              <a:noFill/>
+            </a:ln>
+          </p:spPr>
+          <p:style>
+            <a:lnRef idx="2">
+              <a:schemeClr val="accent1">
+                <a:shade val="50000"/>
+              </a:schemeClr>
+            </a:lnRef>
+            <a:fillRef idx="1">
+              <a:schemeClr val="accent1"/>
+            </a:fillRef>
+            <a:effectRef idx="0">
+              <a:schemeClr val="accent1"/>
+            </a:effectRef>
+            <a:fontRef idx="minor">
+              <a:schemeClr val="lt1"/>
+            </a:fontRef>
+          </p:style>
+          <p:txBody>
+            <a:bodyPr rtlCol="0" anchor="ctr"/>
+            <a:lstStyle/>
+            <a:p>
+              <a:pPr algn="ctr"/>
+              <a:endParaRPr lang="en-CN">
+                <a:solidFill>
+                  <a:schemeClr val="tx1"/>
+                </a:solidFill>
+              </a:endParaRPr>
+            </a:p>
+          </p:txBody>
+        </p:sp>
+        <p:sp>
+          <p:nvSpPr>
+            <p:cNvPr id="7" name="Cross 6">
+              <a:extLst>
+                <a:ext uri="{FF2B5EF4-FFF2-40B4-BE49-F238E27FC236}">
+                  <a16:creationId xmlns:a16="http://schemas.microsoft.com/office/drawing/2014/main" id="{0141C050-1173-7F60-7772-917311FF5ED1}"/>
+                </a:ext>
+              </a:extLst>
+            </p:cNvPr>
+            <p:cNvSpPr/>
+            <p:nvPr/>
+          </p:nvSpPr>
+          <p:spPr>
+            <a:xfrm>
+              <a:off x="7421499" y="3165956"/>
+              <a:ext cx="180000" cy="180000"/>
+            </a:xfrm>
+            <a:prstGeom prst="plus">
+              <a:avLst>
+                <a:gd name="adj" fmla="val 33021"/>
+              </a:avLst>
+            </a:prstGeom>
+            <a:solidFill>
+              <a:schemeClr val="tx1"/>
+            </a:solidFill>
+            <a:ln>
+              <a:noFill/>
+            </a:ln>
+          </p:spPr>
+          <p:style>
+            <a:lnRef idx="2">
+              <a:schemeClr val="accent1">
+                <a:shade val="50000"/>
+              </a:schemeClr>
+            </a:lnRef>
+            <a:fillRef idx="1">
+              <a:schemeClr val="accent1"/>
+            </a:fillRef>
+            <a:effectRef idx="0">
+              <a:schemeClr val="accent1"/>
+            </a:effectRef>
+            <a:fontRef idx="minor">
+              <a:schemeClr val="lt1"/>
+            </a:fontRef>
+          </p:style>
+          <p:txBody>
+            <a:bodyPr rtlCol="0" anchor="ctr"/>
+            <a:lstStyle/>
+            <a:p>
+              <a:pPr algn="ctr"/>
+              <a:endParaRPr lang="en-CN">
+                <a:solidFill>
+                  <a:schemeClr val="tx1"/>
+                </a:solidFill>
+              </a:endParaRPr>
+            </a:p>
+          </p:txBody>
+        </p:sp>
       </p:grpSp>
-      <p:sp>
-        <p:nvSpPr>
-          <p:cNvPr id="4" name="Cross 3">
-            <a:extLst>
-              <a:ext uri="{FF2B5EF4-FFF2-40B4-BE49-F238E27FC236}">
-                <a16:creationId xmlns:a16="http://schemas.microsoft.com/office/drawing/2014/main" id="{4189C50B-BC2C-45DB-08DB-CCF56FE4A1A2}"/>
-              </a:ext>
-            </a:extLst>
-          </p:cNvPr>
-          <p:cNvSpPr/>
-          <p:nvPr/>
-        </p:nvSpPr>
-        <p:spPr>
-          <a:xfrm>
-            <a:off x="6584913" y="2767255"/>
-            <a:ext cx="180000" cy="180000"/>
-          </a:xfrm>
-          <a:prstGeom prst="plus">
-            <a:avLst>
-              <a:gd name="adj" fmla="val 33021"/>
-            </a:avLst>
-          </a:prstGeom>
-          <a:solidFill>
-            <a:schemeClr val="tx1"/>
-          </a:solidFill>
-          <a:ln>
-            <a:noFill/>
-          </a:ln>
-        </p:spPr>
-        <p:style>
-          <a:lnRef idx="2">
-            <a:schemeClr val="accent1">
-              <a:shade val="50000"/>
-            </a:schemeClr>
-          </a:lnRef>
-          <a:fillRef idx="1">
-            <a:schemeClr val="accent1"/>
-          </a:fillRef>
-          <a:effectRef idx="0">
-            <a:schemeClr val="accent1"/>
-          </a:effectRef>
-          <a:fontRef idx="minor">
-            <a:schemeClr val="lt1"/>
-          </a:fontRef>
-        </p:style>
-        <p:txBody>
-          <a:bodyPr rtlCol="0" anchor="ctr"/>
-          <a:lstStyle/>
-          <a:p>
-            <a:pPr algn="ctr"/>
-            <a:endParaRPr lang="en-CN">
-              <a:solidFill>
-                <a:schemeClr val="tx1"/>
-              </a:solidFill>
-            </a:endParaRPr>
-          </a:p>
-        </p:txBody>
-      </p:sp>
-      <p:sp>
-        <p:nvSpPr>
-          <p:cNvPr id="7" name="Cross 6">
-            <a:extLst>
-              <a:ext uri="{FF2B5EF4-FFF2-40B4-BE49-F238E27FC236}">
-                <a16:creationId xmlns:a16="http://schemas.microsoft.com/office/drawing/2014/main" id="{0141C050-1173-7F60-7772-917311FF5ED1}"/>
-              </a:ext>
-            </a:extLst>
-          </p:cNvPr>
-          <p:cNvSpPr/>
-          <p:nvPr/>
-        </p:nvSpPr>
-        <p:spPr>
-          <a:xfrm>
-            <a:off x="7591318" y="2917759"/>
-            <a:ext cx="180000" cy="180000"/>
-          </a:xfrm>
-          <a:prstGeom prst="plus">
-            <a:avLst>
-              <a:gd name="adj" fmla="val 33021"/>
-            </a:avLst>
-          </a:prstGeom>
-          <a:solidFill>
-            <a:schemeClr val="tx1"/>
-          </a:solidFill>
-          <a:ln>
-            <a:noFill/>
-          </a:ln>
-        </p:spPr>
-        <p:style>
-          <a:lnRef idx="2">
-            <a:schemeClr val="accent1">
-              <a:shade val="50000"/>
-            </a:schemeClr>
-          </a:lnRef>
-          <a:fillRef idx="1">
-            <a:schemeClr val="accent1"/>
-          </a:fillRef>
-          <a:effectRef idx="0">
-            <a:schemeClr val="accent1"/>
-          </a:effectRef>
-          <a:fontRef idx="minor">
-            <a:schemeClr val="lt1"/>
-          </a:fontRef>
-        </p:style>
-        <p:txBody>
-          <a:bodyPr rtlCol="0" anchor="ctr"/>
-          <a:lstStyle/>
-          <a:p>
-            <a:pPr algn="ctr"/>
-            <a:endParaRPr lang="en-CN">
-              <a:solidFill>
-                <a:schemeClr val="tx1"/>
-              </a:solidFill>
-            </a:endParaRPr>
-          </a:p>
-        </p:txBody>
-      </p:sp>
     </p:spTree>
     <p:extLst>
       <p:ext uri="{BB962C8B-B14F-4D97-AF65-F5344CB8AC3E}">

</xml_diff>

<commit_message>
update patterns format and symbol
</commit_message>
<xml_diff>
--- a/patterns/transaction-write.pptx
+++ b/patterns/transaction-write.pptx
@@ -7833,7 +7833,7 @@
         <p:spPr>
           <a:xfrm>
             <a:off x="4315460" y="2705735"/>
-            <a:ext cx="501650" cy="307975"/>
+            <a:ext cx="527050" cy="306705"/>
           </a:xfrm>
           <a:prstGeom prst="rect">
             <a:avLst/>
@@ -7847,10 +7847,10 @@
           <a:lstStyle/>
           <a:p>
             <a:r>
-              <a:rPr lang="en-US" altLang="zh-CN" sz="1400" dirty="0"/>
+              <a:rPr lang="en-US" altLang="zh-CN" sz="1400" b="1" dirty="0"/>
               <a:t>own</a:t>
             </a:r>
-            <a:endParaRPr lang="en-US" sz="1600" dirty="0"/>
+            <a:endParaRPr lang="en-US" altLang="zh-CN" sz="1400" b="1" dirty="0"/>
           </a:p>
         </p:txBody>
       </p:sp>
@@ -7863,7 +7863,7 @@
         <p:spPr>
           <a:xfrm>
             <a:off x="6910705" y="2760345"/>
-            <a:ext cx="644525" cy="307975"/>
+            <a:ext cx="672465" cy="306705"/>
           </a:xfrm>
           <a:prstGeom prst="rect">
             <a:avLst/>
@@ -7877,10 +7877,10 @@
           <a:lstStyle/>
           <a:p>
             <a:r>
-              <a:rPr lang="en-US" altLang="zh-CN" sz="1400" dirty="0" err="1"/>
+              <a:rPr lang="en-US" altLang="zh-CN" sz="1400" b="1" dirty="0" err="1"/>
               <a:t>signIn</a:t>
             </a:r>
-            <a:endParaRPr lang="en-US" sz="1400" dirty="0"/>
+            <a:endParaRPr lang="en-US" altLang="zh-CN" sz="1400" b="1" dirty="0" err="1"/>
           </a:p>
         </p:txBody>
       </p:sp>
@@ -7994,7 +7994,7 @@
         <p:spPr>
           <a:xfrm>
             <a:off x="6118860" y="3991610"/>
-            <a:ext cx="756920" cy="307975"/>
+            <a:ext cx="785495" cy="306705"/>
           </a:xfrm>
           <a:prstGeom prst="rect">
             <a:avLst/>
@@ -8008,10 +8008,10 @@
           <a:lstStyle/>
           <a:p>
             <a:r>
-              <a:rPr lang="en-US" altLang="zh-CN" sz="1400" dirty="0"/>
+              <a:rPr lang="en-US" altLang="zh-CN" sz="1400" b="1" dirty="0"/>
               <a:t>deposit</a:t>
             </a:r>
-            <a:endParaRPr lang="en-US" sz="1600" dirty="0"/>
+            <a:endParaRPr lang="en-US" altLang="zh-CN" sz="1400" b="1" dirty="0"/>
           </a:p>
         </p:txBody>
       </p:sp>
@@ -8062,7 +8062,7 @@
         <p:spPr>
           <a:xfrm>
             <a:off x="4930775" y="3991610"/>
-            <a:ext cx="614045" cy="307975"/>
+            <a:ext cx="633730" cy="306705"/>
           </a:xfrm>
           <a:prstGeom prst="rect">
             <a:avLst/>
@@ -8076,10 +8076,10 @@
           <a:lstStyle/>
           <a:p>
             <a:r>
-              <a:rPr lang="en-US" altLang="zh-CN" sz="1400" dirty="0"/>
+              <a:rPr lang="en-US" altLang="zh-CN" sz="1400" b="1" dirty="0"/>
               <a:t>repay</a:t>
             </a:r>
-            <a:endParaRPr lang="en-US" sz="1600" dirty="0"/>
+            <a:endParaRPr lang="en-US" altLang="zh-CN" sz="1400" b="1" dirty="0"/>
           </a:p>
         </p:txBody>
       </p:sp>
@@ -8091,8 +8091,8 @@
         </p:nvSpPr>
         <p:spPr>
           <a:xfrm>
-            <a:off x="4794250" y="2323465"/>
-            <a:ext cx="772795" cy="307975"/>
+            <a:off x="4784725" y="2323465"/>
+            <a:ext cx="808355" cy="306705"/>
           </a:xfrm>
           <a:prstGeom prst="rect">
             <a:avLst/>
@@ -8106,10 +8106,10 @@
           <a:lstStyle/>
           <a:p>
             <a:r>
-              <a:rPr lang="en-US" altLang="zh-CN" sz="1400" dirty="0"/>
+              <a:rPr lang="en-US" altLang="zh-CN" sz="1400" b="1" dirty="0"/>
               <a:t>transfer</a:t>
             </a:r>
-            <a:endParaRPr lang="en-US" altLang="zh-CN" sz="1400" dirty="0"/>
+            <a:endParaRPr lang="en-US" altLang="zh-CN" sz="1400" b="1" dirty="0"/>
           </a:p>
         </p:txBody>
       </p:sp>
@@ -8152,7 +8152,7 @@
         <p:spPr>
           <a:xfrm>
             <a:off x="6083300" y="2323465"/>
-            <a:ext cx="885190" cy="307975"/>
+            <a:ext cx="932180" cy="306705"/>
           </a:xfrm>
           <a:prstGeom prst="rect">
             <a:avLst/>
@@ -8166,10 +8166,10 @@
           <a:lstStyle/>
           <a:p>
             <a:r>
-              <a:rPr lang="en-US" altLang="zh-CN" sz="1400" dirty="0"/>
+              <a:rPr lang="en-US" altLang="zh-CN" sz="1400" b="1" dirty="0"/>
               <a:t>withdraw</a:t>
             </a:r>
-            <a:endParaRPr lang="en-US" sz="1600" dirty="0"/>
+            <a:endParaRPr lang="en-US" altLang="zh-CN" sz="1400" b="1" dirty="0"/>
           </a:p>
         </p:txBody>
       </p:sp>
@@ -12976,58 +12976,6 @@
         <p:spPr>
           <a:xfrm>
             <a:off x="7563485" y="2235200"/>
-            <a:ext cx="179705" cy="179705"/>
-          </a:xfrm>
-          <a:prstGeom prst="plus">
-            <a:avLst>
-              <a:gd name="adj" fmla="val 33021"/>
-            </a:avLst>
-          </a:prstGeom>
-          <a:solidFill>
-            <a:schemeClr val="tx1"/>
-          </a:solidFill>
-          <a:ln>
-            <a:noFill/>
-          </a:ln>
-        </p:spPr>
-        <p:style>
-          <a:lnRef idx="2">
-            <a:schemeClr val="accent1">
-              <a:shade val="50000"/>
-            </a:schemeClr>
-          </a:lnRef>
-          <a:fillRef idx="1">
-            <a:schemeClr val="accent1"/>
-          </a:fillRef>
-          <a:effectRef idx="0">
-            <a:schemeClr val="accent1"/>
-          </a:effectRef>
-          <a:fontRef idx="minor">
-            <a:schemeClr val="lt1"/>
-          </a:fontRef>
-        </p:style>
-        <p:txBody>
-          <a:bodyPr rtlCol="0" anchor="ctr"/>
-          <a:lstStyle/>
-          <a:p>
-            <a:pPr algn="ctr"/>
-            <a:endParaRPr lang="en-US">
-              <a:solidFill>
-                <a:schemeClr val="tx1"/>
-              </a:solidFill>
-            </a:endParaRPr>
-          </a:p>
-        </p:txBody>
-      </p:sp>
-      <p:sp>
-        <p:nvSpPr>
-          <p:cNvPr id="9" name="Cross 8"/>
-          <p:cNvSpPr/>
-          <p:nvPr/>
-        </p:nvSpPr>
-        <p:spPr>
-          <a:xfrm>
-            <a:off x="1747520" y="2225040"/>
             <a:ext cx="179705" cy="179705"/>
           </a:xfrm>
           <a:prstGeom prst="plus">

</xml_diff>